<commit_message>
quite a few new slides ;-)
</commit_message>
<xml_diff>
--- a/Slides/DWX 2017.pptx
+++ b/Slides/DWX 2017.pptx
@@ -6,12 +6,29 @@
     <p:sldMasterId id="2147483676" r:id="rId2"/>
   </p:sldMasterIdLst>
   <p:notesMasterIdLst>
-    <p:notesMasterId r:id="rId6"/>
+    <p:notesMasterId r:id="rId23"/>
   </p:notesMasterIdLst>
   <p:sldIdLst>
     <p:sldId id="257" r:id="rId3"/>
-    <p:sldId id="259" r:id="rId4"/>
-    <p:sldId id="258" r:id="rId5"/>
+    <p:sldId id="262" r:id="rId4"/>
+    <p:sldId id="260" r:id="rId5"/>
+    <p:sldId id="263" r:id="rId6"/>
+    <p:sldId id="265" r:id="rId7"/>
+    <p:sldId id="264" r:id="rId8"/>
+    <p:sldId id="266" r:id="rId9"/>
+    <p:sldId id="268" r:id="rId10"/>
+    <p:sldId id="267" r:id="rId11"/>
+    <p:sldId id="269" r:id="rId12"/>
+    <p:sldId id="271" r:id="rId13"/>
+    <p:sldId id="270" r:id="rId14"/>
+    <p:sldId id="273" r:id="rId15"/>
+    <p:sldId id="274" r:id="rId16"/>
+    <p:sldId id="275" r:id="rId17"/>
+    <p:sldId id="272" r:id="rId18"/>
+    <p:sldId id="276" r:id="rId19"/>
+    <p:sldId id="277" r:id="rId20"/>
+    <p:sldId id="259" r:id="rId21"/>
+    <p:sldId id="258" r:id="rId22"/>
   </p:sldIdLst>
   <p:sldSz cx="9144000" cy="6858000" type="screen4x3"/>
   <p:notesSz cx="6858000" cy="9144000"/>
@@ -3850,7 +3867,7 @@
 </p:sld>
 </file>
 
-<file path=ppt/slides/slide2.xml><?xml version="1.0" encoding="utf-8"?>
+<file path=ppt/slides/slide10.xml><?xml version="1.0" encoding="utf-8"?>
 <p:sld xmlns:a="http://schemas.openxmlformats.org/drawingml/2006/main" xmlns:r="http://schemas.openxmlformats.org/officeDocument/2006/relationships" xmlns:p="http://schemas.openxmlformats.org/presentationml/2006/main">
   <p:cSld>
     <p:spTree>
@@ -3872,7 +3889,7 @@
           <p:cNvPr id="2" name="Titel 1">
             <a:extLst>
               <a:ext uri="{FF2B5EF4-FFF2-40B4-BE49-F238E27FC236}">
-                <a16:creationId xmlns:a16="http://schemas.microsoft.com/office/drawing/2014/main" id="{AF57D7D0-637A-4912-846B-D3D86AC1380E}"/>
+                <a16:creationId xmlns:a16="http://schemas.microsoft.com/office/drawing/2014/main" id="{03234785-1ED7-4CD8-AD31-76060DA30230}"/>
               </a:ext>
             </a:extLst>
           </p:cNvPr>
@@ -3889,9 +3906,976 @@
           <a:lstStyle/>
           <a:p>
             <a:r>
-              <a:rPr lang="de-DE" dirty="0"/>
-              <a:t>https://github.com/tkuenneth/Xamarin_Talks</a:t>
-            </a:r>
+              <a:rPr lang="de-DE" dirty="0" err="1"/>
+              <a:t>AsyncTask</a:t>
+            </a:r>
+            <a:endParaRPr lang="de-DE" dirty="0"/>
+          </a:p>
+        </p:txBody>
+      </p:sp>
+      <p:sp>
+        <p:nvSpPr>
+          <p:cNvPr id="3" name="Inhaltsplatzhalter 2">
+            <a:extLst>
+              <a:ext uri="{FF2B5EF4-FFF2-40B4-BE49-F238E27FC236}">
+                <a16:creationId xmlns:a16="http://schemas.microsoft.com/office/drawing/2014/main" id="{20C0159A-2D5A-4D3B-99D4-5C989C7BDB6F}"/>
+              </a:ext>
+            </a:extLst>
+          </p:cNvPr>
+          <p:cNvSpPr>
+            <a:spLocks noGrp="1"/>
+          </p:cNvSpPr>
+          <p:nvPr>
+            <p:ph sz="quarter" idx="13"/>
+          </p:nvPr>
+        </p:nvSpPr>
+        <p:spPr/>
+        <p:txBody>
+          <a:bodyPr/>
+          <a:lstStyle/>
+          <a:p>
+            <a:r>
+              <a:rPr lang="de-DE" dirty="0" err="1"/>
+              <a:t>To</a:t>
+            </a:r>
+            <a:r>
+              <a:rPr lang="de-DE" dirty="0"/>
+              <a:t> do: Listing</a:t>
+            </a:r>
+          </a:p>
+        </p:txBody>
+      </p:sp>
+    </p:spTree>
+    <p:extLst>
+      <p:ext uri="{BB962C8B-B14F-4D97-AF65-F5344CB8AC3E}">
+        <p14:creationId xmlns:p14="http://schemas.microsoft.com/office/powerpoint/2010/main" val="2515296030"/>
+      </p:ext>
+    </p:extLst>
+  </p:cSld>
+  <p:clrMapOvr>
+    <a:masterClrMapping/>
+  </p:clrMapOvr>
+</p:sld>
+</file>
+
+<file path=ppt/slides/slide11.xml><?xml version="1.0" encoding="utf-8"?>
+<p:sld xmlns:a="http://schemas.openxmlformats.org/drawingml/2006/main" xmlns:r="http://schemas.openxmlformats.org/officeDocument/2006/relationships" xmlns:p="http://schemas.openxmlformats.org/presentationml/2006/main">
+  <p:cSld>
+    <p:spTree>
+      <p:nvGrpSpPr>
+        <p:cNvPr id="1" name=""/>
+        <p:cNvGrpSpPr/>
+        <p:nvPr/>
+      </p:nvGrpSpPr>
+      <p:grpSpPr>
+        <a:xfrm>
+          <a:off x="0" y="0"/>
+          <a:ext cx="0" cy="0"/>
+          <a:chOff x="0" y="0"/>
+          <a:chExt cx="0" cy="0"/>
+        </a:xfrm>
+      </p:grpSpPr>
+      <p:sp>
+        <p:nvSpPr>
+          <p:cNvPr id="2" name="Titel 1">
+            <a:extLst>
+              <a:ext uri="{FF2B5EF4-FFF2-40B4-BE49-F238E27FC236}">
+                <a16:creationId xmlns:a16="http://schemas.microsoft.com/office/drawing/2014/main" id="{51CF2B99-8491-42F1-AC60-B47238792118}"/>
+              </a:ext>
+            </a:extLst>
+          </p:cNvPr>
+          <p:cNvSpPr>
+            <a:spLocks noGrp="1"/>
+          </p:cNvSpPr>
+          <p:nvPr>
+            <p:ph type="title"/>
+          </p:nvPr>
+        </p:nvSpPr>
+        <p:spPr/>
+        <p:txBody>
+          <a:bodyPr/>
+          <a:lstStyle/>
+          <a:p>
+            <a:r>
+              <a:rPr lang="de-DE" dirty="0"/>
+              <a:t>Gebundene Services</a:t>
+            </a:r>
+          </a:p>
+        </p:txBody>
+      </p:sp>
+      <p:sp>
+        <p:nvSpPr>
+          <p:cNvPr id="3" name="Inhaltsplatzhalter 2">
+            <a:extLst>
+              <a:ext uri="{FF2B5EF4-FFF2-40B4-BE49-F238E27FC236}">
+                <a16:creationId xmlns:a16="http://schemas.microsoft.com/office/drawing/2014/main" id="{6A078299-3F7D-4D7D-9F9B-B11B9CFC8854}"/>
+              </a:ext>
+            </a:extLst>
+          </p:cNvPr>
+          <p:cNvSpPr>
+            <a:spLocks noGrp="1"/>
+          </p:cNvSpPr>
+          <p:nvPr>
+            <p:ph sz="quarter" idx="13"/>
+          </p:nvPr>
+        </p:nvSpPr>
+        <p:spPr/>
+        <p:txBody>
+          <a:bodyPr/>
+          <a:lstStyle/>
+          <a:p>
+            <a:r>
+              <a:rPr lang="de-DE" dirty="0"/>
+              <a:t>Werden für die bidirektionale Kommunikation mit einem oder mehreren Aufrufern verwendet</a:t>
+            </a:r>
+          </a:p>
+          <a:p>
+            <a:r>
+              <a:rPr lang="de-DE" dirty="0"/>
+              <a:t>Stellen ihre Dienste über klassische Serviceoperationen einschließlich Parametern und Rückgabewerten zur Verfügung</a:t>
+            </a:r>
+          </a:p>
+          <a:p>
+            <a:r>
+              <a:rPr lang="de-DE" dirty="0"/>
+              <a:t>Werden gestartet, wenn sich eine andere Anwendungskomponente durch den Aufruf von </a:t>
+            </a:r>
+            <a:r>
+              <a:rPr lang="de-DE" dirty="0" err="1"/>
+              <a:t>bindService</a:t>
+            </a:r>
+            <a:r>
+              <a:rPr lang="de-DE" dirty="0"/>
+              <a:t>() an sie bindet</a:t>
+            </a:r>
+          </a:p>
+          <a:p>
+            <a:r>
+              <a:rPr lang="de-DE" dirty="0"/>
+              <a:t>Werden beendet, wenn keine solche Bindung mehr besteht. </a:t>
+            </a:r>
+          </a:p>
+          <a:p>
+            <a:r>
+              <a:rPr lang="de-DE" dirty="0"/>
+              <a:t>Ähneln klassischen </a:t>
+            </a:r>
+            <a:r>
+              <a:rPr lang="de-DE" dirty="0" err="1"/>
+              <a:t>Remoting</a:t>
+            </a:r>
+            <a:r>
+              <a:rPr lang="de-DE" dirty="0"/>
+              <a:t>-Schnittstellen (u. a. weil Aufrufe auch über Prozessgrenzen hinweg möglich sind)</a:t>
+            </a:r>
+          </a:p>
+        </p:txBody>
+      </p:sp>
+    </p:spTree>
+    <p:extLst>
+      <p:ext uri="{BB962C8B-B14F-4D97-AF65-F5344CB8AC3E}">
+        <p14:creationId xmlns:p14="http://schemas.microsoft.com/office/powerpoint/2010/main" val="19868841"/>
+      </p:ext>
+    </p:extLst>
+  </p:cSld>
+  <p:clrMapOvr>
+    <a:masterClrMapping/>
+  </p:clrMapOvr>
+</p:sld>
+</file>
+
+<file path=ppt/slides/slide12.xml><?xml version="1.0" encoding="utf-8"?>
+<p:sld xmlns:a="http://schemas.openxmlformats.org/drawingml/2006/main" xmlns:r="http://schemas.openxmlformats.org/officeDocument/2006/relationships" xmlns:p="http://schemas.openxmlformats.org/presentationml/2006/main">
+  <p:cSld>
+    <p:spTree>
+      <p:nvGrpSpPr>
+        <p:cNvPr id="1" name=""/>
+        <p:cNvGrpSpPr/>
+        <p:nvPr/>
+      </p:nvGrpSpPr>
+      <p:grpSpPr>
+        <a:xfrm>
+          <a:off x="0" y="0"/>
+          <a:ext cx="0" cy="0"/>
+          <a:chOff x="0" y="0"/>
+          <a:chExt cx="0" cy="0"/>
+        </a:xfrm>
+      </p:grpSpPr>
+      <p:sp>
+        <p:nvSpPr>
+          <p:cNvPr id="2" name="Titel 1">
+            <a:extLst>
+              <a:ext uri="{FF2B5EF4-FFF2-40B4-BE49-F238E27FC236}">
+                <a16:creationId xmlns:a16="http://schemas.microsoft.com/office/drawing/2014/main" id="{5F3DA215-C693-42B1-A611-50521B7EC8DD}"/>
+              </a:ext>
+            </a:extLst>
+          </p:cNvPr>
+          <p:cNvSpPr>
+            <a:spLocks noGrp="1"/>
+          </p:cNvSpPr>
+          <p:nvPr>
+            <p:ph type="title"/>
+          </p:nvPr>
+        </p:nvSpPr>
+        <p:spPr/>
+        <p:txBody>
+          <a:bodyPr/>
+          <a:lstStyle/>
+          <a:p>
+            <a:r>
+              <a:rPr lang="de-DE" dirty="0"/>
+              <a:t>Gestartete Services</a:t>
+            </a:r>
+          </a:p>
+        </p:txBody>
+      </p:sp>
+      <p:sp>
+        <p:nvSpPr>
+          <p:cNvPr id="3" name="Inhaltsplatzhalter 2">
+            <a:extLst>
+              <a:ext uri="{FF2B5EF4-FFF2-40B4-BE49-F238E27FC236}">
+                <a16:creationId xmlns:a16="http://schemas.microsoft.com/office/drawing/2014/main" id="{372DFFD4-697B-4F32-AC0A-600B7028E099}"/>
+              </a:ext>
+            </a:extLst>
+          </p:cNvPr>
+          <p:cNvSpPr>
+            <a:spLocks noGrp="1"/>
+          </p:cNvSpPr>
+          <p:nvPr>
+            <p:ph sz="quarter" idx="13"/>
+          </p:nvPr>
+        </p:nvSpPr>
+        <p:spPr/>
+        <p:txBody>
+          <a:bodyPr/>
+          <a:lstStyle/>
+          <a:p>
+            <a:r>
+              <a:rPr lang="de-DE" dirty="0"/>
+              <a:t>Führen üblicherweise genau eine Operation aus (z. B. Up- oder Download von Dateien)</a:t>
+            </a:r>
+          </a:p>
+          <a:p>
+            <a:r>
+              <a:rPr lang="de-DE" dirty="0"/>
+              <a:t>Können beliebig lange im Hintergrund laufen</a:t>
+            </a:r>
+          </a:p>
+          <a:p>
+            <a:r>
+              <a:rPr lang="de-DE" dirty="0"/>
+              <a:t>Bleiben auch dann aktiv, wenn die aufrufwende Komponente zerstört wird</a:t>
+            </a:r>
+          </a:p>
+          <a:p>
+            <a:r>
+              <a:rPr lang="de-DE" dirty="0"/>
+              <a:t>Sollten sich nach dem Abschluss der Operation selbst beenden</a:t>
+            </a:r>
+          </a:p>
+          <a:p>
+            <a:r>
+              <a:rPr lang="de-DE" dirty="0"/>
+              <a:t>Werden explizit von anderen Anwendungskomponenten mittels </a:t>
+            </a:r>
+            <a:r>
+              <a:rPr lang="de-DE" dirty="0" err="1"/>
+              <a:t>startService</a:t>
+            </a:r>
+            <a:r>
+              <a:rPr lang="de-DE" dirty="0"/>
+              <a:t>() gestartet</a:t>
+            </a:r>
+          </a:p>
+          <a:p>
+            <a:r>
+              <a:rPr lang="de-DE" dirty="0"/>
+              <a:t>Geben kein Ergebnis direkt an den Aufrufer zurück</a:t>
+            </a:r>
+          </a:p>
+        </p:txBody>
+      </p:sp>
+    </p:spTree>
+    <p:extLst>
+      <p:ext uri="{BB962C8B-B14F-4D97-AF65-F5344CB8AC3E}">
+        <p14:creationId xmlns:p14="http://schemas.microsoft.com/office/powerpoint/2010/main" val="955830019"/>
+      </p:ext>
+    </p:extLst>
+  </p:cSld>
+  <p:clrMapOvr>
+    <a:masterClrMapping/>
+  </p:clrMapOvr>
+</p:sld>
+</file>
+
+<file path=ppt/slides/slide13.xml><?xml version="1.0" encoding="utf-8"?>
+<p:sld xmlns:a="http://schemas.openxmlformats.org/drawingml/2006/main" xmlns:r="http://schemas.openxmlformats.org/officeDocument/2006/relationships" xmlns:p="http://schemas.openxmlformats.org/presentationml/2006/main">
+  <p:cSld>
+    <p:spTree>
+      <p:nvGrpSpPr>
+        <p:cNvPr id="1" name=""/>
+        <p:cNvGrpSpPr/>
+        <p:nvPr/>
+      </p:nvGrpSpPr>
+      <p:grpSpPr>
+        <a:xfrm>
+          <a:off x="0" y="0"/>
+          <a:ext cx="0" cy="0"/>
+          <a:chOff x="0" y="0"/>
+          <a:chExt cx="0" cy="0"/>
+        </a:xfrm>
+      </p:grpSpPr>
+      <p:sp>
+        <p:nvSpPr>
+          <p:cNvPr id="2" name="Titel 1">
+            <a:extLst>
+              <a:ext uri="{FF2B5EF4-FFF2-40B4-BE49-F238E27FC236}">
+                <a16:creationId xmlns:a16="http://schemas.microsoft.com/office/drawing/2014/main" id="{01D1207A-FFB5-429C-BC30-3881E84212E2}"/>
+              </a:ext>
+            </a:extLst>
+          </p:cNvPr>
+          <p:cNvSpPr>
+            <a:spLocks noGrp="1"/>
+          </p:cNvSpPr>
+          <p:nvPr>
+            <p:ph type="title"/>
+          </p:nvPr>
+        </p:nvSpPr>
+        <p:spPr/>
+        <p:txBody>
+          <a:bodyPr/>
+          <a:lstStyle/>
+          <a:p>
+            <a:r>
+              <a:rPr lang="de-DE" dirty="0" err="1"/>
+              <a:t>StartedServiceDemo</a:t>
+            </a:r>
+            <a:endParaRPr lang="de-DE" dirty="0"/>
+          </a:p>
+        </p:txBody>
+      </p:sp>
+      <p:sp>
+        <p:nvSpPr>
+          <p:cNvPr id="3" name="Inhaltsplatzhalter 2">
+            <a:extLst>
+              <a:ext uri="{FF2B5EF4-FFF2-40B4-BE49-F238E27FC236}">
+                <a16:creationId xmlns:a16="http://schemas.microsoft.com/office/drawing/2014/main" id="{6860374A-E820-4FBC-8DF4-C225867A3AB6}"/>
+              </a:ext>
+            </a:extLst>
+          </p:cNvPr>
+          <p:cNvSpPr>
+            <a:spLocks noGrp="1"/>
+          </p:cNvSpPr>
+          <p:nvPr>
+            <p:ph sz="quarter" idx="13"/>
+          </p:nvPr>
+        </p:nvSpPr>
+        <p:spPr/>
+        <p:txBody>
+          <a:bodyPr/>
+          <a:lstStyle/>
+          <a:p>
+            <a:r>
+              <a:rPr lang="de-DE" dirty="0" err="1"/>
+              <a:t>To</a:t>
+            </a:r>
+            <a:r>
+              <a:rPr lang="de-DE" dirty="0"/>
+              <a:t> do: Listing oder Screenshot</a:t>
+            </a:r>
+          </a:p>
+          <a:p>
+            <a:endParaRPr lang="de-DE" dirty="0"/>
+          </a:p>
+        </p:txBody>
+      </p:sp>
+    </p:spTree>
+    <p:extLst>
+      <p:ext uri="{BB962C8B-B14F-4D97-AF65-F5344CB8AC3E}">
+        <p14:creationId xmlns:p14="http://schemas.microsoft.com/office/powerpoint/2010/main" val="1503693138"/>
+      </p:ext>
+    </p:extLst>
+  </p:cSld>
+  <p:clrMapOvr>
+    <a:masterClrMapping/>
+  </p:clrMapOvr>
+</p:sld>
+</file>
+
+<file path=ppt/slides/slide14.xml><?xml version="1.0" encoding="utf-8"?>
+<p:sld xmlns:a="http://schemas.openxmlformats.org/drawingml/2006/main" xmlns:r="http://schemas.openxmlformats.org/officeDocument/2006/relationships" xmlns:p="http://schemas.openxmlformats.org/presentationml/2006/main">
+  <p:cSld>
+    <p:spTree>
+      <p:nvGrpSpPr>
+        <p:cNvPr id="1" name=""/>
+        <p:cNvGrpSpPr/>
+        <p:nvPr/>
+      </p:nvGrpSpPr>
+      <p:grpSpPr>
+        <a:xfrm>
+          <a:off x="0" y="0"/>
+          <a:ext cx="0" cy="0"/>
+          <a:chOff x="0" y="0"/>
+          <a:chExt cx="0" cy="0"/>
+        </a:xfrm>
+      </p:grpSpPr>
+      <p:sp>
+        <p:nvSpPr>
+          <p:cNvPr id="2" name="Titel 1">
+            <a:extLst>
+              <a:ext uri="{FF2B5EF4-FFF2-40B4-BE49-F238E27FC236}">
+                <a16:creationId xmlns:a16="http://schemas.microsoft.com/office/drawing/2014/main" id="{CCF19AE8-BE90-4B95-8BCA-EF7925AD3CDE}"/>
+              </a:ext>
+            </a:extLst>
+          </p:cNvPr>
+          <p:cNvSpPr>
+            <a:spLocks noGrp="1"/>
+          </p:cNvSpPr>
+          <p:nvPr>
+            <p:ph type="title"/>
+          </p:nvPr>
+        </p:nvSpPr>
+        <p:spPr/>
+        <p:txBody>
+          <a:bodyPr/>
+          <a:lstStyle/>
+          <a:p>
+            <a:r>
+              <a:rPr lang="de-DE" dirty="0" err="1"/>
+              <a:t>AlarmDemo</a:t>
+            </a:r>
+            <a:endParaRPr lang="de-DE" dirty="0"/>
+          </a:p>
+        </p:txBody>
+      </p:sp>
+      <p:sp>
+        <p:nvSpPr>
+          <p:cNvPr id="3" name="Inhaltsplatzhalter 2">
+            <a:extLst>
+              <a:ext uri="{FF2B5EF4-FFF2-40B4-BE49-F238E27FC236}">
+                <a16:creationId xmlns:a16="http://schemas.microsoft.com/office/drawing/2014/main" id="{66D9716B-E669-4268-97D9-930307518867}"/>
+              </a:ext>
+            </a:extLst>
+          </p:cNvPr>
+          <p:cNvSpPr>
+            <a:spLocks noGrp="1"/>
+          </p:cNvSpPr>
+          <p:nvPr>
+            <p:ph sz="quarter" idx="13"/>
+          </p:nvPr>
+        </p:nvSpPr>
+        <p:spPr/>
+        <p:txBody>
+          <a:bodyPr/>
+          <a:lstStyle/>
+          <a:p>
+            <a:r>
+              <a:rPr lang="de-DE" dirty="0"/>
+              <a:t>Screenshot oder Listing</a:t>
+            </a:r>
+          </a:p>
+        </p:txBody>
+      </p:sp>
+    </p:spTree>
+    <p:extLst>
+      <p:ext uri="{BB962C8B-B14F-4D97-AF65-F5344CB8AC3E}">
+        <p14:creationId xmlns:p14="http://schemas.microsoft.com/office/powerpoint/2010/main" val="494415678"/>
+      </p:ext>
+    </p:extLst>
+  </p:cSld>
+  <p:clrMapOvr>
+    <a:masterClrMapping/>
+  </p:clrMapOvr>
+</p:sld>
+</file>
+
+<file path=ppt/slides/slide15.xml><?xml version="1.0" encoding="utf-8"?>
+<p:sld xmlns:a="http://schemas.openxmlformats.org/drawingml/2006/main" xmlns:r="http://schemas.openxmlformats.org/officeDocument/2006/relationships" xmlns:p="http://schemas.openxmlformats.org/presentationml/2006/main">
+  <p:cSld>
+    <p:spTree>
+      <p:nvGrpSpPr>
+        <p:cNvPr id="1" name=""/>
+        <p:cNvGrpSpPr/>
+        <p:nvPr/>
+      </p:nvGrpSpPr>
+      <p:grpSpPr>
+        <a:xfrm>
+          <a:off x="0" y="0"/>
+          <a:ext cx="0" cy="0"/>
+          <a:chOff x="0" y="0"/>
+          <a:chExt cx="0" cy="0"/>
+        </a:xfrm>
+      </p:grpSpPr>
+      <p:sp>
+        <p:nvSpPr>
+          <p:cNvPr id="2" name="Titel 1">
+            <a:extLst>
+              <a:ext uri="{FF2B5EF4-FFF2-40B4-BE49-F238E27FC236}">
+                <a16:creationId xmlns:a16="http://schemas.microsoft.com/office/drawing/2014/main" id="{7E697613-A620-4D3D-99DF-DEEAA83D5D1F}"/>
+              </a:ext>
+            </a:extLst>
+          </p:cNvPr>
+          <p:cNvSpPr>
+            <a:spLocks noGrp="1"/>
+          </p:cNvSpPr>
+          <p:nvPr>
+            <p:ph type="title"/>
+          </p:nvPr>
+        </p:nvSpPr>
+        <p:spPr/>
+        <p:txBody>
+          <a:bodyPr/>
+          <a:lstStyle/>
+          <a:p>
+            <a:r>
+              <a:rPr lang="de-DE" dirty="0"/>
+              <a:t>Erhöhter Batterieverbrauch und Performanceengpässe</a:t>
+            </a:r>
+          </a:p>
+        </p:txBody>
+      </p:sp>
+      <p:sp>
+        <p:nvSpPr>
+          <p:cNvPr id="3" name="Inhaltsplatzhalter 2">
+            <a:extLst>
+              <a:ext uri="{FF2B5EF4-FFF2-40B4-BE49-F238E27FC236}">
+                <a16:creationId xmlns:a16="http://schemas.microsoft.com/office/drawing/2014/main" id="{FB5190AA-9C9B-433B-A104-3C2B56A53DDF}"/>
+              </a:ext>
+            </a:extLst>
+          </p:cNvPr>
+          <p:cNvSpPr>
+            <a:spLocks noGrp="1"/>
+          </p:cNvSpPr>
+          <p:nvPr>
+            <p:ph sz="quarter" idx="13"/>
+          </p:nvPr>
+        </p:nvSpPr>
+        <p:spPr/>
+        <p:txBody>
+          <a:bodyPr/>
+          <a:lstStyle/>
+          <a:p>
+            <a:r>
+              <a:rPr lang="de-DE" dirty="0"/>
+              <a:t>Erklären gestartete Services, </a:t>
+            </a:r>
+            <a:r>
+              <a:rPr lang="de-DE" dirty="0" err="1"/>
+              <a:t>Hintergrundaktivitätn</a:t>
+            </a:r>
+            <a:r>
+              <a:rPr lang="de-DE" dirty="0"/>
+              <a:t> in Android 8</a:t>
+            </a:r>
+          </a:p>
+          <a:p>
+            <a:r>
+              <a:rPr lang="de-DE" dirty="0"/>
+              <a:t>Google möchte, dass Entwickler für solche Aufgaben geplante Services verwenden</a:t>
+            </a:r>
+          </a:p>
+          <a:p>
+            <a:pPr indent="0">
+              <a:buNone/>
+            </a:pPr>
+            <a:endParaRPr lang="de-DE" dirty="0"/>
+          </a:p>
+        </p:txBody>
+      </p:sp>
+    </p:spTree>
+    <p:extLst>
+      <p:ext uri="{BB962C8B-B14F-4D97-AF65-F5344CB8AC3E}">
+        <p14:creationId xmlns:p14="http://schemas.microsoft.com/office/powerpoint/2010/main" val="1530569348"/>
+      </p:ext>
+    </p:extLst>
+  </p:cSld>
+  <p:clrMapOvr>
+    <a:masterClrMapping/>
+  </p:clrMapOvr>
+</p:sld>
+</file>
+
+<file path=ppt/slides/slide16.xml><?xml version="1.0" encoding="utf-8"?>
+<p:sld xmlns:a="http://schemas.openxmlformats.org/drawingml/2006/main" xmlns:r="http://schemas.openxmlformats.org/officeDocument/2006/relationships" xmlns:p="http://schemas.openxmlformats.org/presentationml/2006/main">
+  <p:cSld>
+    <p:spTree>
+      <p:nvGrpSpPr>
+        <p:cNvPr id="1" name=""/>
+        <p:cNvGrpSpPr/>
+        <p:nvPr/>
+      </p:nvGrpSpPr>
+      <p:grpSpPr>
+        <a:xfrm>
+          <a:off x="0" y="0"/>
+          <a:ext cx="0" cy="0"/>
+          <a:chOff x="0" y="0"/>
+          <a:chExt cx="0" cy="0"/>
+        </a:xfrm>
+      </p:grpSpPr>
+      <p:sp>
+        <p:nvSpPr>
+          <p:cNvPr id="2" name="Titel 1">
+            <a:extLst>
+              <a:ext uri="{FF2B5EF4-FFF2-40B4-BE49-F238E27FC236}">
+                <a16:creationId xmlns:a16="http://schemas.microsoft.com/office/drawing/2014/main" id="{D62218AF-BF92-4795-841F-CAF75B11C71B}"/>
+              </a:ext>
+            </a:extLst>
+          </p:cNvPr>
+          <p:cNvSpPr>
+            <a:spLocks noGrp="1"/>
+          </p:cNvSpPr>
+          <p:nvPr>
+            <p:ph type="title"/>
+          </p:nvPr>
+        </p:nvSpPr>
+        <p:spPr/>
+        <p:txBody>
+          <a:bodyPr/>
+          <a:lstStyle/>
+          <a:p>
+            <a:r>
+              <a:rPr lang="de-DE" dirty="0"/>
+              <a:t>Geplante Services</a:t>
+            </a:r>
+          </a:p>
+        </p:txBody>
+      </p:sp>
+      <p:sp>
+        <p:nvSpPr>
+          <p:cNvPr id="3" name="Inhaltsplatzhalter 2">
+            <a:extLst>
+              <a:ext uri="{FF2B5EF4-FFF2-40B4-BE49-F238E27FC236}">
+                <a16:creationId xmlns:a16="http://schemas.microsoft.com/office/drawing/2014/main" id="{46E9461E-08FE-4113-8BF1-A79B5B1D63D5}"/>
+              </a:ext>
+            </a:extLst>
+          </p:cNvPr>
+          <p:cNvSpPr>
+            <a:spLocks noGrp="1"/>
+          </p:cNvSpPr>
+          <p:nvPr>
+            <p:ph sz="quarter" idx="13"/>
+          </p:nvPr>
+        </p:nvSpPr>
+        <p:spPr/>
+        <p:txBody>
+          <a:bodyPr/>
+          <a:lstStyle/>
+          <a:p>
+            <a:r>
+              <a:rPr lang="de-DE" dirty="0"/>
+              <a:t>Stehen seit Android 5 zur Verfügung</a:t>
+            </a:r>
+          </a:p>
+          <a:p>
+            <a:r>
+              <a:rPr lang="de-DE" dirty="0"/>
+              <a:t>Werden verwendet, um beim Eintreten bestimmter Bedingungen Aufräumarbeiten oder Aktualisierungsläufe zu starten</a:t>
+            </a:r>
+          </a:p>
+          <a:p>
+            <a:r>
+              <a:rPr lang="de-DE" dirty="0"/>
+              <a:t>Beispiel: eine Datenbank dann optimieren, wenn der Benutzer nicht mit ihr arbeitet (das Gerät lädt und der Bildschirm ist ausgeschaltet</a:t>
+            </a:r>
+          </a:p>
+          <a:p>
+            <a:r>
+              <a:rPr lang="de-DE" dirty="0"/>
+              <a:t>Wann ein solcher Job gestartet wird, steuert das System auf Basis der von Service definierten Startbedingungen und dem Nutzerverhalten</a:t>
+            </a:r>
+          </a:p>
+        </p:txBody>
+      </p:sp>
+    </p:spTree>
+    <p:extLst>
+      <p:ext uri="{BB962C8B-B14F-4D97-AF65-F5344CB8AC3E}">
+        <p14:creationId xmlns:p14="http://schemas.microsoft.com/office/powerpoint/2010/main" val="736742619"/>
+      </p:ext>
+    </p:extLst>
+  </p:cSld>
+  <p:clrMapOvr>
+    <a:masterClrMapping/>
+  </p:clrMapOvr>
+</p:sld>
+</file>
+
+<file path=ppt/slides/slide17.xml><?xml version="1.0" encoding="utf-8"?>
+<p:sld xmlns:a="http://schemas.openxmlformats.org/drawingml/2006/main" xmlns:r="http://schemas.openxmlformats.org/officeDocument/2006/relationships" xmlns:p="http://schemas.openxmlformats.org/presentationml/2006/main">
+  <p:cSld>
+    <p:spTree>
+      <p:nvGrpSpPr>
+        <p:cNvPr id="1" name=""/>
+        <p:cNvGrpSpPr/>
+        <p:nvPr/>
+      </p:nvGrpSpPr>
+      <p:grpSpPr>
+        <a:xfrm>
+          <a:off x="0" y="0"/>
+          <a:ext cx="0" cy="0"/>
+          <a:chOff x="0" y="0"/>
+          <a:chExt cx="0" cy="0"/>
+        </a:xfrm>
+      </p:grpSpPr>
+      <p:sp>
+        <p:nvSpPr>
+          <p:cNvPr id="2" name="Titel 1">
+            <a:extLst>
+              <a:ext uri="{FF2B5EF4-FFF2-40B4-BE49-F238E27FC236}">
+                <a16:creationId xmlns:a16="http://schemas.microsoft.com/office/drawing/2014/main" id="{6F3286F1-F302-47DC-83FE-350315740503}"/>
+              </a:ext>
+            </a:extLst>
+          </p:cNvPr>
+          <p:cNvSpPr>
+            <a:spLocks noGrp="1"/>
+          </p:cNvSpPr>
+          <p:nvPr>
+            <p:ph type="title"/>
+          </p:nvPr>
+        </p:nvSpPr>
+        <p:spPr/>
+        <p:txBody>
+          <a:bodyPr/>
+          <a:lstStyle/>
+          <a:p>
+            <a:r>
+              <a:rPr lang="de-DE" dirty="0" err="1"/>
+              <a:t>JobSchedulerDemo</a:t>
+            </a:r>
+            <a:endParaRPr lang="de-DE" dirty="0"/>
+          </a:p>
+        </p:txBody>
+      </p:sp>
+      <p:sp>
+        <p:nvSpPr>
+          <p:cNvPr id="3" name="Inhaltsplatzhalter 2">
+            <a:extLst>
+              <a:ext uri="{FF2B5EF4-FFF2-40B4-BE49-F238E27FC236}">
+                <a16:creationId xmlns:a16="http://schemas.microsoft.com/office/drawing/2014/main" id="{A98BA5C1-1DDF-44B1-80C7-9B1AAB872590}"/>
+              </a:ext>
+            </a:extLst>
+          </p:cNvPr>
+          <p:cNvSpPr>
+            <a:spLocks noGrp="1"/>
+          </p:cNvSpPr>
+          <p:nvPr>
+            <p:ph sz="quarter" idx="13"/>
+          </p:nvPr>
+        </p:nvSpPr>
+        <p:spPr/>
+        <p:txBody>
+          <a:bodyPr/>
+          <a:lstStyle/>
+          <a:p>
+            <a:r>
+              <a:rPr lang="de-DE" dirty="0" err="1"/>
+              <a:t>To</a:t>
+            </a:r>
+            <a:r>
+              <a:rPr lang="de-DE" dirty="0"/>
+              <a:t> do: Screenshot oder Code</a:t>
+            </a:r>
+          </a:p>
+        </p:txBody>
+      </p:sp>
+    </p:spTree>
+    <p:extLst>
+      <p:ext uri="{BB962C8B-B14F-4D97-AF65-F5344CB8AC3E}">
+        <p14:creationId xmlns:p14="http://schemas.microsoft.com/office/powerpoint/2010/main" val="3748230632"/>
+      </p:ext>
+    </p:extLst>
+  </p:cSld>
+  <p:clrMapOvr>
+    <a:masterClrMapping/>
+  </p:clrMapOvr>
+</p:sld>
+</file>
+
+<file path=ppt/slides/slide18.xml><?xml version="1.0" encoding="utf-8"?>
+<p:sld xmlns:a="http://schemas.openxmlformats.org/drawingml/2006/main" xmlns:r="http://schemas.openxmlformats.org/officeDocument/2006/relationships" xmlns:p="http://schemas.openxmlformats.org/presentationml/2006/main">
+  <p:cSld>
+    <p:spTree>
+      <p:nvGrpSpPr>
+        <p:cNvPr id="1" name=""/>
+        <p:cNvGrpSpPr/>
+        <p:nvPr/>
+      </p:nvGrpSpPr>
+      <p:grpSpPr>
+        <a:xfrm>
+          <a:off x="0" y="0"/>
+          <a:ext cx="0" cy="0"/>
+          <a:chOff x="0" y="0"/>
+          <a:chExt cx="0" cy="0"/>
+        </a:xfrm>
+      </p:grpSpPr>
+      <p:sp>
+        <p:nvSpPr>
+          <p:cNvPr id="2" name="Titel 1">
+            <a:extLst>
+              <a:ext uri="{FF2B5EF4-FFF2-40B4-BE49-F238E27FC236}">
+                <a16:creationId xmlns:a16="http://schemas.microsoft.com/office/drawing/2014/main" id="{21999C01-40E3-482F-B019-502750C3F912}"/>
+              </a:ext>
+            </a:extLst>
+          </p:cNvPr>
+          <p:cNvSpPr>
+            <a:spLocks noGrp="1"/>
+          </p:cNvSpPr>
+          <p:nvPr>
+            <p:ph type="title"/>
+          </p:nvPr>
+        </p:nvSpPr>
+        <p:spPr/>
+        <p:txBody>
+          <a:bodyPr/>
+          <a:lstStyle/>
+          <a:p>
+            <a:r>
+              <a:rPr lang="de-DE" dirty="0"/>
+              <a:t>Unterstützung bei der Entwicklung</a:t>
+            </a:r>
+          </a:p>
+        </p:txBody>
+      </p:sp>
+      <p:sp>
+        <p:nvSpPr>
+          <p:cNvPr id="3" name="Inhaltsplatzhalter 2">
+            <a:extLst>
+              <a:ext uri="{FF2B5EF4-FFF2-40B4-BE49-F238E27FC236}">
+                <a16:creationId xmlns:a16="http://schemas.microsoft.com/office/drawing/2014/main" id="{834992AE-C693-47B1-A9FC-6D24FD10201C}"/>
+              </a:ext>
+            </a:extLst>
+          </p:cNvPr>
+          <p:cNvSpPr>
+            <a:spLocks noGrp="1"/>
+          </p:cNvSpPr>
+          <p:nvPr>
+            <p:ph sz="quarter" idx="13"/>
+          </p:nvPr>
+        </p:nvSpPr>
+        <p:spPr>
+          <a:xfrm>
+            <a:off x="457200" y="1792288"/>
+            <a:ext cx="8229600" cy="1417442"/>
+          </a:xfrm>
+        </p:spPr>
+        <p:txBody>
+          <a:bodyPr/>
+          <a:lstStyle/>
+          <a:p>
+            <a:r>
+              <a:rPr lang="de-DE" dirty="0" err="1">
+                <a:latin typeface="Courier New" panose="02070309020205020404" pitchFamily="49" charset="0"/>
+                <a:cs typeface="Courier New" panose="02070309020205020404" pitchFamily="49" charset="0"/>
+              </a:rPr>
+              <a:t>adb</a:t>
+            </a:r>
+            <a:r>
+              <a:rPr lang="de-DE" dirty="0">
+                <a:latin typeface="Courier New" panose="02070309020205020404" pitchFamily="49" charset="0"/>
+                <a:cs typeface="Courier New" panose="02070309020205020404" pitchFamily="49" charset="0"/>
+              </a:rPr>
+              <a:t> </a:t>
+            </a:r>
+            <a:r>
+              <a:rPr lang="de-DE" dirty="0" err="1">
+                <a:latin typeface="Courier New" panose="02070309020205020404" pitchFamily="49" charset="0"/>
+                <a:cs typeface="Courier New" panose="02070309020205020404" pitchFamily="49" charset="0"/>
+              </a:rPr>
+              <a:t>shell</a:t>
+            </a:r>
+            <a:r>
+              <a:rPr lang="de-DE" dirty="0">
+                <a:latin typeface="Courier New" panose="02070309020205020404" pitchFamily="49" charset="0"/>
+                <a:cs typeface="Courier New" panose="02070309020205020404" pitchFamily="49" charset="0"/>
+              </a:rPr>
+              <a:t> </a:t>
+            </a:r>
+            <a:r>
+              <a:rPr lang="de-DE" dirty="0" err="1">
+                <a:latin typeface="Courier New" panose="02070309020205020404" pitchFamily="49" charset="0"/>
+                <a:cs typeface="Courier New" panose="02070309020205020404" pitchFamily="49" charset="0"/>
+              </a:rPr>
+              <a:t>dumpsys</a:t>
+            </a:r>
+            <a:r>
+              <a:rPr lang="de-DE" dirty="0">
+                <a:latin typeface="Courier New" panose="02070309020205020404" pitchFamily="49" charset="0"/>
+                <a:cs typeface="Courier New" panose="02070309020205020404" pitchFamily="49" charset="0"/>
+              </a:rPr>
+              <a:t> </a:t>
+            </a:r>
+            <a:r>
+              <a:rPr lang="de-DE" dirty="0" err="1">
+                <a:latin typeface="Courier New" panose="02070309020205020404" pitchFamily="49" charset="0"/>
+                <a:cs typeface="Courier New" panose="02070309020205020404" pitchFamily="49" charset="0"/>
+              </a:rPr>
+              <a:t>jobscheduler</a:t>
+            </a:r>
+            <a:endParaRPr lang="de-DE" dirty="0">
+              <a:latin typeface="Courier New" panose="02070309020205020404" pitchFamily="49" charset="0"/>
+              <a:cs typeface="Courier New" panose="02070309020205020404" pitchFamily="49" charset="0"/>
+            </a:endParaRPr>
+          </a:p>
+          <a:p>
+            <a:r>
+              <a:rPr lang="en-US" dirty="0" err="1">
+                <a:latin typeface="Courier New" panose="02070309020205020404" pitchFamily="49" charset="0"/>
+                <a:cs typeface="Courier New" panose="02070309020205020404" pitchFamily="49" charset="0"/>
+              </a:rPr>
+              <a:t>adb</a:t>
+            </a:r>
+            <a:r>
+              <a:rPr lang="en-US" dirty="0">
+                <a:latin typeface="Courier New" panose="02070309020205020404" pitchFamily="49" charset="0"/>
+                <a:cs typeface="Courier New" panose="02070309020205020404" pitchFamily="49" charset="0"/>
+              </a:rPr>
+              <a:t> shell </a:t>
+            </a:r>
+            <a:r>
+              <a:rPr lang="en-US" dirty="0" err="1">
+                <a:latin typeface="Courier New" panose="02070309020205020404" pitchFamily="49" charset="0"/>
+                <a:cs typeface="Courier New" panose="02070309020205020404" pitchFamily="49" charset="0"/>
+              </a:rPr>
+              <a:t>cmd</a:t>
+            </a:r>
+            <a:r>
+              <a:rPr lang="en-US" dirty="0">
+                <a:latin typeface="Courier New" panose="02070309020205020404" pitchFamily="49" charset="0"/>
+                <a:cs typeface="Courier New" panose="02070309020205020404" pitchFamily="49" charset="0"/>
+              </a:rPr>
+              <a:t> </a:t>
+            </a:r>
+            <a:r>
+              <a:rPr lang="en-US" dirty="0" err="1">
+                <a:latin typeface="Courier New" panose="02070309020205020404" pitchFamily="49" charset="0"/>
+                <a:cs typeface="Courier New" panose="02070309020205020404" pitchFamily="49" charset="0"/>
+              </a:rPr>
+              <a:t>jobscheduler</a:t>
+            </a:r>
+            <a:r>
+              <a:rPr lang="en-US" dirty="0">
+                <a:latin typeface="Courier New" panose="02070309020205020404" pitchFamily="49" charset="0"/>
+                <a:cs typeface="Courier New" panose="02070309020205020404" pitchFamily="49" charset="0"/>
+              </a:rPr>
+              <a:t> run -f &lt;</a:t>
+            </a:r>
+            <a:r>
+              <a:rPr lang="en-US" dirty="0" err="1">
+                <a:latin typeface="Courier New" panose="02070309020205020404" pitchFamily="49" charset="0"/>
+                <a:cs typeface="Courier New" panose="02070309020205020404" pitchFamily="49" charset="0"/>
+              </a:rPr>
+              <a:t>packagename</a:t>
+            </a:r>
+            <a:r>
+              <a:rPr lang="en-US" dirty="0">
+                <a:latin typeface="Courier New" panose="02070309020205020404" pitchFamily="49" charset="0"/>
+                <a:cs typeface="Courier New" panose="02070309020205020404" pitchFamily="49" charset="0"/>
+              </a:rPr>
+              <a:t>&gt; &lt;id&gt;</a:t>
+            </a:r>
+            <a:endParaRPr lang="de-DE" dirty="0">
+              <a:latin typeface="Courier New" panose="02070309020205020404" pitchFamily="49" charset="0"/>
+              <a:cs typeface="Courier New" panose="02070309020205020404" pitchFamily="49" charset="0"/>
+            </a:endParaRPr>
           </a:p>
         </p:txBody>
       </p:sp>
@@ -3900,7 +4884,101 @@
           <p:cNvPr id="4" name="Inhaltsplatzhalter 3">
             <a:extLst>
               <a:ext uri="{FF2B5EF4-FFF2-40B4-BE49-F238E27FC236}">
-                <a16:creationId xmlns:a16="http://schemas.microsoft.com/office/drawing/2014/main" id="{A5B1820E-3296-40A7-AE49-D0B911744ED4}"/>
+                <a16:creationId xmlns:a16="http://schemas.microsoft.com/office/drawing/2014/main" id="{F051807D-6FDC-4614-924E-B56B113907F5}"/>
+              </a:ext>
+            </a:extLst>
+          </p:cNvPr>
+          <p:cNvPicPr>
+            <a:picLocks noChangeAspect="1"/>
+          </p:cNvPicPr>
+          <p:nvPr/>
+        </p:nvPicPr>
+        <p:blipFill>
+          <a:blip r:embed="rId2" cstate="screen">
+            <a:extLst>
+              <a:ext uri="{28A0092B-C50C-407E-A947-70E740481C1C}">
+                <a14:useLocalDpi xmlns:a14="http://schemas.microsoft.com/office/drawing/2010/main"/>
+              </a:ext>
+            </a:extLst>
+          </a:blip>
+          <a:stretch>
+            <a:fillRect/>
+          </a:stretch>
+        </p:blipFill>
+        <p:spPr>
+          <a:xfrm>
+            <a:off x="1977227" y="3209730"/>
+            <a:ext cx="5189547" cy="3648269"/>
+          </a:xfrm>
+          <a:prstGeom prst="rect">
+            <a:avLst/>
+          </a:prstGeom>
+        </p:spPr>
+      </p:pic>
+    </p:spTree>
+    <p:extLst>
+      <p:ext uri="{BB962C8B-B14F-4D97-AF65-F5344CB8AC3E}">
+        <p14:creationId xmlns:p14="http://schemas.microsoft.com/office/powerpoint/2010/main" val="641233610"/>
+      </p:ext>
+    </p:extLst>
+  </p:cSld>
+  <p:clrMapOvr>
+    <a:masterClrMapping/>
+  </p:clrMapOvr>
+</p:sld>
+</file>
+
+<file path=ppt/slides/slide19.xml><?xml version="1.0" encoding="utf-8"?>
+<p:sld xmlns:a="http://schemas.openxmlformats.org/drawingml/2006/main" xmlns:r="http://schemas.openxmlformats.org/officeDocument/2006/relationships" xmlns:p="http://schemas.openxmlformats.org/presentationml/2006/main">
+  <p:cSld>
+    <p:spTree>
+      <p:nvGrpSpPr>
+        <p:cNvPr id="1" name=""/>
+        <p:cNvGrpSpPr/>
+        <p:nvPr/>
+      </p:nvGrpSpPr>
+      <p:grpSpPr>
+        <a:xfrm>
+          <a:off x="0" y="0"/>
+          <a:ext cx="0" cy="0"/>
+          <a:chOff x="0" y="0"/>
+          <a:chExt cx="0" cy="0"/>
+        </a:xfrm>
+      </p:grpSpPr>
+      <p:sp>
+        <p:nvSpPr>
+          <p:cNvPr id="2" name="Titel 1">
+            <a:extLst>
+              <a:ext uri="{FF2B5EF4-FFF2-40B4-BE49-F238E27FC236}">
+                <a16:creationId xmlns:a16="http://schemas.microsoft.com/office/drawing/2014/main" id="{AF57D7D0-637A-4912-846B-D3D86AC1380E}"/>
+              </a:ext>
+            </a:extLst>
+          </p:cNvPr>
+          <p:cNvSpPr>
+            <a:spLocks noGrp="1"/>
+          </p:cNvSpPr>
+          <p:nvPr>
+            <p:ph type="title"/>
+          </p:nvPr>
+        </p:nvSpPr>
+        <p:spPr/>
+        <p:txBody>
+          <a:bodyPr/>
+          <a:lstStyle/>
+          <a:p>
+            <a:r>
+              <a:rPr lang="de-DE" dirty="0"/>
+              <a:t>https://github.com/tkuenneth/Xamarin_Talks</a:t>
+            </a:r>
+          </a:p>
+        </p:txBody>
+      </p:sp>
+      <p:pic>
+        <p:nvPicPr>
+          <p:cNvPr id="9" name="Inhaltsplatzhalter 8">
+            <a:extLst>
+              <a:ext uri="{FF2B5EF4-FFF2-40B4-BE49-F238E27FC236}">
+                <a16:creationId xmlns:a16="http://schemas.microsoft.com/office/drawing/2014/main" id="{931A37AF-10E3-41AF-B6AF-4EA696B16E5C}"/>
               </a:ext>
             </a:extLst>
           </p:cNvPr>
@@ -3946,7 +5024,123 @@
 </p:sld>
 </file>
 
-<file path=ppt/slides/slide3.xml><?xml version="1.0" encoding="utf-8"?>
+<file path=ppt/slides/slide2.xml><?xml version="1.0" encoding="utf-8"?>
+<p:sld xmlns:a="http://schemas.openxmlformats.org/drawingml/2006/main" xmlns:r="http://schemas.openxmlformats.org/officeDocument/2006/relationships" xmlns:p="http://schemas.openxmlformats.org/presentationml/2006/main">
+  <p:cSld>
+    <p:spTree>
+      <p:nvGrpSpPr>
+        <p:cNvPr id="1" name=""/>
+        <p:cNvGrpSpPr/>
+        <p:nvPr/>
+      </p:nvGrpSpPr>
+      <p:grpSpPr>
+        <a:xfrm>
+          <a:off x="0" y="0"/>
+          <a:ext cx="0" cy="0"/>
+          <a:chOff x="0" y="0"/>
+          <a:chExt cx="0" cy="0"/>
+        </a:xfrm>
+      </p:grpSpPr>
+      <p:sp>
+        <p:nvSpPr>
+          <p:cNvPr id="2" name="Titel 1"/>
+          <p:cNvSpPr>
+            <a:spLocks noGrp="1"/>
+          </p:cNvSpPr>
+          <p:nvPr>
+            <p:ph type="title"/>
+          </p:nvPr>
+        </p:nvSpPr>
+        <p:spPr/>
+        <p:txBody>
+          <a:bodyPr/>
+          <a:lstStyle/>
+          <a:p>
+            <a:r>
+              <a:rPr lang="de-DE"/>
+              <a:t>Auf Mehrsprachigkeit achten</a:t>
+            </a:r>
+          </a:p>
+        </p:txBody>
+      </p:sp>
+      <p:sp>
+        <p:nvSpPr>
+          <p:cNvPr id="3" name="Inhaltsplatzhalter 2"/>
+          <p:cNvSpPr>
+            <a:spLocks noGrp="1"/>
+          </p:cNvSpPr>
+          <p:nvPr>
+            <p:ph sz="quarter" idx="13"/>
+          </p:nvPr>
+        </p:nvSpPr>
+        <p:spPr/>
+        <p:txBody>
+          <a:bodyPr/>
+          <a:lstStyle/>
+          <a:p>
+            <a:r>
+              <a:rPr lang="de-DE" dirty="0"/>
+              <a:t>Strings werden in Resources/</a:t>
+            </a:r>
+            <a:r>
+              <a:rPr lang="de-DE" dirty="0" err="1"/>
+              <a:t>values</a:t>
+            </a:r>
+            <a:r>
+              <a:rPr lang="de-DE" dirty="0"/>
+              <a:t>/Strings.xml abgelegt</a:t>
+            </a:r>
+          </a:p>
+          <a:p>
+            <a:r>
+              <a:rPr lang="de-DE" dirty="0"/>
+              <a:t>Internationalisierung durch zusätzliche Verzeichnisse </a:t>
+            </a:r>
+            <a:r>
+              <a:rPr lang="de-DE" dirty="0" err="1"/>
+              <a:t>values</a:t>
+            </a:r>
+            <a:r>
+              <a:rPr lang="de-DE" dirty="0"/>
+              <a:t>-&lt;ISO-Ländercode&gt;</a:t>
+            </a:r>
+          </a:p>
+          <a:p>
+            <a:r>
+              <a:rPr lang="de-DE" dirty="0"/>
+              <a:t>Kann im Emulator mit der App Custom </a:t>
+            </a:r>
+            <a:r>
+              <a:rPr lang="de-DE" dirty="0" err="1"/>
+              <a:t>Locales</a:t>
+            </a:r>
+            <a:r>
+              <a:rPr lang="de-DE" dirty="0"/>
+              <a:t> getestet werden</a:t>
+            </a:r>
+          </a:p>
+          <a:p>
+            <a:r>
+              <a:rPr lang="de-DE" dirty="0"/>
+              <a:t>Funktioniert auch mit Grafiken</a:t>
+            </a:r>
+          </a:p>
+        </p:txBody>
+      </p:sp>
+    </p:spTree>
+    <p:extLst>
+      <p:ext uri="{BB962C8B-B14F-4D97-AF65-F5344CB8AC3E}">
+        <p14:creationId xmlns:p14="http://schemas.microsoft.com/office/powerpoint/2010/main" val="839986925"/>
+      </p:ext>
+    </p:extLst>
+  </p:cSld>
+  <p:clrMapOvr>
+    <a:masterClrMapping/>
+  </p:clrMapOvr>
+</p:sld>
+</file>
+
+<file path=ppt/slides/slide20.xml><?xml version="1.0" encoding="utf-8"?>
 <p:sld xmlns:a="http://schemas.openxmlformats.org/drawingml/2006/main" xmlns:r="http://schemas.openxmlformats.org/officeDocument/2006/relationships" xmlns:p="http://schemas.openxmlformats.org/presentationml/2006/main">
   <p:cSld>
     <p:spTree>
@@ -4108,6 +5302,959 @@
     <p:extLst>
       <p:ext uri="{BB962C8B-B14F-4D97-AF65-F5344CB8AC3E}">
         <p14:creationId xmlns:p14="http://schemas.microsoft.com/office/powerpoint/2010/main" val="2065465396"/>
+      </p:ext>
+    </p:extLst>
+  </p:cSld>
+  <p:clrMapOvr>
+    <a:masterClrMapping/>
+  </p:clrMapOvr>
+</p:sld>
+</file>
+
+<file path=ppt/slides/slide3.xml><?xml version="1.0" encoding="utf-8"?>
+<p:sld xmlns:a="http://schemas.openxmlformats.org/drawingml/2006/main" xmlns:r="http://schemas.openxmlformats.org/officeDocument/2006/relationships" xmlns:p="http://schemas.openxmlformats.org/presentationml/2006/main">
+  <p:cSld>
+    <p:spTree>
+      <p:nvGrpSpPr>
+        <p:cNvPr id="1" name=""/>
+        <p:cNvGrpSpPr/>
+        <p:nvPr/>
+      </p:nvGrpSpPr>
+      <p:grpSpPr>
+        <a:xfrm>
+          <a:off x="0" y="0"/>
+          <a:ext cx="0" cy="0"/>
+          <a:chOff x="0" y="0"/>
+          <a:chExt cx="0" cy="0"/>
+        </a:xfrm>
+      </p:grpSpPr>
+      <p:sp>
+        <p:nvSpPr>
+          <p:cNvPr id="2" name="Titel 1">
+            <a:extLst>
+              <a:ext uri="{FF2B5EF4-FFF2-40B4-BE49-F238E27FC236}">
+                <a16:creationId xmlns:a16="http://schemas.microsoft.com/office/drawing/2014/main" id="{B6D54FA7-29D8-4FA7-93DB-9C8AE8022113}"/>
+              </a:ext>
+            </a:extLst>
+          </p:cNvPr>
+          <p:cNvSpPr>
+            <a:spLocks noGrp="1"/>
+          </p:cNvSpPr>
+          <p:nvPr>
+            <p:ph type="title"/>
+          </p:nvPr>
+        </p:nvSpPr>
+        <p:spPr/>
+        <p:txBody>
+          <a:bodyPr/>
+          <a:lstStyle/>
+          <a:p>
+            <a:r>
+              <a:rPr lang="de-DE" dirty="0"/>
+              <a:t>Grafiken optimieren</a:t>
+            </a:r>
+          </a:p>
+        </p:txBody>
+      </p:sp>
+      <p:sp>
+        <p:nvSpPr>
+          <p:cNvPr id="3" name="Inhaltsplatzhalter 2">
+            <a:extLst>
+              <a:ext uri="{FF2B5EF4-FFF2-40B4-BE49-F238E27FC236}">
+                <a16:creationId xmlns:a16="http://schemas.microsoft.com/office/drawing/2014/main" id="{33903689-D7D3-47E1-BA5F-54C302EB9F26}"/>
+              </a:ext>
+            </a:extLst>
+          </p:cNvPr>
+          <p:cNvSpPr>
+            <a:spLocks noGrp="1"/>
+          </p:cNvSpPr>
+          <p:nvPr>
+            <p:ph sz="quarter" idx="13"/>
+          </p:nvPr>
+        </p:nvSpPr>
+        <p:spPr/>
+        <p:txBody>
+          <a:bodyPr/>
+          <a:lstStyle/>
+          <a:p>
+            <a:r>
+              <a:rPr lang="de-DE" dirty="0"/>
+              <a:t>Bitmaps in verschiedenen Auflösungen bereitstellen (</a:t>
+            </a:r>
+            <a:r>
+              <a:rPr lang="de-DE" dirty="0">
+                <a:hlinkClick r:id="rId2"/>
+              </a:rPr>
+              <a:t>https://romannurik.github.io/AndroidAssetStudio/</a:t>
+            </a:r>
+            <a:r>
+              <a:rPr lang="de-DE" dirty="0"/>
+              <a:t>)</a:t>
+            </a:r>
+          </a:p>
+          <a:p>
+            <a:r>
+              <a:rPr lang="de-DE" dirty="0"/>
+              <a:t>Launcher-Icons in </a:t>
+            </a:r>
+            <a:r>
+              <a:rPr lang="de-DE" dirty="0" err="1"/>
+              <a:t>mipmap</a:t>
+            </a:r>
+            <a:r>
+              <a:rPr lang="de-DE" dirty="0"/>
+              <a:t>-Verzeichnisse, alle anderen nach </a:t>
+            </a:r>
+            <a:r>
+              <a:rPr lang="de-DE" dirty="0" err="1"/>
+              <a:t>drawable</a:t>
+            </a:r>
+            <a:endParaRPr lang="de-DE" dirty="0"/>
+          </a:p>
+          <a:p>
+            <a:r>
+              <a:rPr lang="de-DE" dirty="0"/>
+              <a:t>Ggf. </a:t>
+            </a:r>
+            <a:r>
+              <a:rPr lang="de-DE" dirty="0" err="1"/>
+              <a:t>Vector</a:t>
+            </a:r>
+            <a:r>
+              <a:rPr lang="de-DE" dirty="0"/>
+              <a:t> </a:t>
+            </a:r>
+            <a:r>
+              <a:rPr lang="de-DE" dirty="0" err="1"/>
+              <a:t>Drawables</a:t>
+            </a:r>
+            <a:r>
+              <a:rPr lang="de-DE" dirty="0"/>
+              <a:t> verwenden</a:t>
+            </a:r>
+          </a:p>
+          <a:p>
+            <a:pPr lvl="1"/>
+            <a:r>
+              <a:rPr lang="de-DE" dirty="0"/>
+              <a:t>nativ ab Android 5.0 oder mit Support Library: </a:t>
+            </a:r>
+            <a:r>
+              <a:rPr lang="de-DE" dirty="0">
+                <a:hlinkClick r:id="rId3"/>
+              </a:rPr>
+              <a:t>https://components.xamarin.com/gettingstarted/xamandroidsupportvectordrawable?version=23.2.1</a:t>
+            </a:r>
+            <a:endParaRPr lang="de-DE" dirty="0"/>
+          </a:p>
+          <a:p>
+            <a:pPr lvl="1"/>
+            <a:r>
+              <a:rPr lang="de-DE" dirty="0"/>
+              <a:t>Konvertierungstools: z. B. Android Studio oder </a:t>
+            </a:r>
+            <a:r>
+              <a:rPr lang="de-DE" dirty="0">
+                <a:hlinkClick r:id="rId4"/>
+              </a:rPr>
+              <a:t>https://github.com/a-student/SvgToVectorDrawableConverter</a:t>
+            </a:r>
+            <a:endParaRPr lang="de-DE" dirty="0"/>
+          </a:p>
+          <a:p>
+            <a:endParaRPr lang="de-DE" dirty="0"/>
+          </a:p>
+        </p:txBody>
+      </p:sp>
+    </p:spTree>
+    <p:extLst>
+      <p:ext uri="{BB962C8B-B14F-4D97-AF65-F5344CB8AC3E}">
+        <p14:creationId xmlns:p14="http://schemas.microsoft.com/office/powerpoint/2010/main" val="2902312155"/>
+      </p:ext>
+    </p:extLst>
+  </p:cSld>
+  <p:clrMapOvr>
+    <a:masterClrMapping/>
+  </p:clrMapOvr>
+</p:sld>
+</file>
+
+<file path=ppt/slides/slide4.xml><?xml version="1.0" encoding="utf-8"?>
+<p:sld xmlns:a="http://schemas.openxmlformats.org/drawingml/2006/main" xmlns:r="http://schemas.openxmlformats.org/officeDocument/2006/relationships" xmlns:p="http://schemas.openxmlformats.org/presentationml/2006/main">
+  <p:cSld>
+    <p:spTree>
+      <p:nvGrpSpPr>
+        <p:cNvPr id="1" name=""/>
+        <p:cNvGrpSpPr/>
+        <p:nvPr/>
+      </p:nvGrpSpPr>
+      <p:grpSpPr>
+        <a:xfrm>
+          <a:off x="0" y="0"/>
+          <a:ext cx="0" cy="0"/>
+          <a:chOff x="0" y="0"/>
+          <a:chExt cx="0" cy="0"/>
+        </a:xfrm>
+      </p:grpSpPr>
+      <p:sp>
+        <p:nvSpPr>
+          <p:cNvPr id="2" name="Titel 1">
+            <a:extLst>
+              <a:ext uri="{FF2B5EF4-FFF2-40B4-BE49-F238E27FC236}">
+                <a16:creationId xmlns:a16="http://schemas.microsoft.com/office/drawing/2014/main" id="{2B5FF3A6-3600-411C-8FC0-2A69441AFEF5}"/>
+              </a:ext>
+            </a:extLst>
+          </p:cNvPr>
+          <p:cNvSpPr>
+            <a:spLocks noGrp="1"/>
+          </p:cNvSpPr>
+          <p:nvPr>
+            <p:ph type="title"/>
+          </p:nvPr>
+        </p:nvSpPr>
+        <p:spPr/>
+        <p:txBody>
+          <a:bodyPr/>
+          <a:lstStyle/>
+          <a:p>
+            <a:r>
+              <a:rPr lang="de-DE" dirty="0"/>
+              <a:t>Träge reagierende UI vermeiden</a:t>
+            </a:r>
+          </a:p>
+        </p:txBody>
+      </p:sp>
+      <p:sp>
+        <p:nvSpPr>
+          <p:cNvPr id="3" name="Inhaltsplatzhalter 2">
+            <a:extLst>
+              <a:ext uri="{FF2B5EF4-FFF2-40B4-BE49-F238E27FC236}">
+                <a16:creationId xmlns:a16="http://schemas.microsoft.com/office/drawing/2014/main" id="{542746EF-2E04-4BAF-9A81-916FD56596A4}"/>
+              </a:ext>
+            </a:extLst>
+          </p:cNvPr>
+          <p:cNvSpPr>
+            <a:spLocks noGrp="1"/>
+          </p:cNvSpPr>
+          <p:nvPr>
+            <p:ph sz="quarter" idx="13"/>
+          </p:nvPr>
+        </p:nvSpPr>
+        <p:spPr/>
+        <p:txBody>
+          <a:bodyPr/>
+          <a:lstStyle/>
+          <a:p>
+            <a:r>
+              <a:rPr lang="de-DE" dirty="0" err="1"/>
+              <a:t>To</a:t>
+            </a:r>
+            <a:r>
+              <a:rPr lang="de-DE" dirty="0"/>
+              <a:t> do Screenshot ANR</a:t>
+            </a:r>
+          </a:p>
+        </p:txBody>
+      </p:sp>
+    </p:spTree>
+    <p:extLst>
+      <p:ext uri="{BB962C8B-B14F-4D97-AF65-F5344CB8AC3E}">
+        <p14:creationId xmlns:p14="http://schemas.microsoft.com/office/powerpoint/2010/main" val="1423969898"/>
+      </p:ext>
+    </p:extLst>
+  </p:cSld>
+  <p:clrMapOvr>
+    <a:masterClrMapping/>
+  </p:clrMapOvr>
+</p:sld>
+</file>
+
+<file path=ppt/slides/slide5.xml><?xml version="1.0" encoding="utf-8"?>
+<p:sld xmlns:a="http://schemas.openxmlformats.org/drawingml/2006/main" xmlns:r="http://schemas.openxmlformats.org/officeDocument/2006/relationships" xmlns:p="http://schemas.openxmlformats.org/presentationml/2006/main">
+  <p:cSld>
+    <p:spTree>
+      <p:nvGrpSpPr>
+        <p:cNvPr id="1" name=""/>
+        <p:cNvGrpSpPr/>
+        <p:nvPr/>
+      </p:nvGrpSpPr>
+      <p:grpSpPr>
+        <a:xfrm>
+          <a:off x="0" y="0"/>
+          <a:ext cx="0" cy="0"/>
+          <a:chOff x="0" y="0"/>
+          <a:chExt cx="0" cy="0"/>
+        </a:xfrm>
+      </p:grpSpPr>
+      <p:sp>
+        <p:nvSpPr>
+          <p:cNvPr id="2" name="Titel 1">
+            <a:extLst>
+              <a:ext uri="{FF2B5EF4-FFF2-40B4-BE49-F238E27FC236}">
+                <a16:creationId xmlns:a16="http://schemas.microsoft.com/office/drawing/2014/main" id="{1616E3A9-5985-4C7A-82C1-CE098AE704E2}"/>
+              </a:ext>
+            </a:extLst>
+          </p:cNvPr>
+          <p:cNvSpPr>
+            <a:spLocks noGrp="1"/>
+          </p:cNvSpPr>
+          <p:nvPr>
+            <p:ph type="title"/>
+          </p:nvPr>
+        </p:nvSpPr>
+        <p:spPr/>
+        <p:txBody>
+          <a:bodyPr/>
+          <a:lstStyle/>
+          <a:p>
+            <a:r>
+              <a:rPr lang="de-DE" dirty="0"/>
+              <a:t>Die App zur Laufzeit</a:t>
+            </a:r>
+          </a:p>
+        </p:txBody>
+      </p:sp>
+      <p:sp>
+        <p:nvSpPr>
+          <p:cNvPr id="3" name="Inhaltsplatzhalter 2">
+            <a:extLst>
+              <a:ext uri="{FF2B5EF4-FFF2-40B4-BE49-F238E27FC236}">
+                <a16:creationId xmlns:a16="http://schemas.microsoft.com/office/drawing/2014/main" id="{32FDB212-F9B0-45B8-9D6C-F4B26230C676}"/>
+              </a:ext>
+            </a:extLst>
+          </p:cNvPr>
+          <p:cNvSpPr>
+            <a:spLocks noGrp="1"/>
+          </p:cNvSpPr>
+          <p:nvPr>
+            <p:ph sz="quarter" idx="13"/>
+          </p:nvPr>
+        </p:nvSpPr>
+        <p:spPr/>
+        <p:txBody>
+          <a:bodyPr/>
+          <a:lstStyle/>
+          <a:p>
+            <a:r>
+              <a:rPr lang="de-DE" dirty="0"/>
+              <a:t>Läuft standardmäßig in einem Linux-Prozess</a:t>
+            </a:r>
+          </a:p>
+          <a:p>
+            <a:r>
+              <a:rPr lang="de-DE" dirty="0"/>
+              <a:t>Hat standardmäßig einen Thread</a:t>
+            </a:r>
+          </a:p>
+          <a:p>
+            <a:r>
+              <a:rPr lang="de-DE" dirty="0"/>
+              <a:t>Prozess wird (erneut) gestartet, wenn eine Komponente der App angesprochen wird</a:t>
+            </a:r>
+          </a:p>
+          <a:p>
+            <a:r>
+              <a:rPr lang="de-DE" dirty="0"/>
+              <a:t>Prozess-Layout kann in der </a:t>
+            </a:r>
+            <a:r>
+              <a:rPr lang="de-DE" dirty="0" err="1"/>
+              <a:t>Manifestdatei</a:t>
+            </a:r>
+            <a:r>
+              <a:rPr lang="de-DE" dirty="0"/>
+              <a:t> angepasst werden (</a:t>
+            </a:r>
+            <a:r>
+              <a:rPr lang="de-DE" dirty="0" err="1"/>
+              <a:t>android:process</a:t>
+            </a:r>
+            <a:r>
+              <a:rPr lang="de-DE" dirty="0"/>
+              <a:t>)</a:t>
+            </a:r>
+          </a:p>
+        </p:txBody>
+      </p:sp>
+    </p:spTree>
+    <p:extLst>
+      <p:ext uri="{BB962C8B-B14F-4D97-AF65-F5344CB8AC3E}">
+        <p14:creationId xmlns:p14="http://schemas.microsoft.com/office/powerpoint/2010/main" val="453281389"/>
+      </p:ext>
+    </p:extLst>
+  </p:cSld>
+  <p:clrMapOvr>
+    <a:masterClrMapping/>
+  </p:clrMapOvr>
+</p:sld>
+</file>
+
+<file path=ppt/slides/slide6.xml><?xml version="1.0" encoding="utf-8"?>
+<p:sld xmlns:a="http://schemas.openxmlformats.org/drawingml/2006/main" xmlns:r="http://schemas.openxmlformats.org/officeDocument/2006/relationships" xmlns:p="http://schemas.openxmlformats.org/presentationml/2006/main">
+  <p:cSld>
+    <p:spTree>
+      <p:nvGrpSpPr>
+        <p:cNvPr id="1" name=""/>
+        <p:cNvGrpSpPr/>
+        <p:nvPr/>
+      </p:nvGrpSpPr>
+      <p:grpSpPr>
+        <a:xfrm>
+          <a:off x="0" y="0"/>
+          <a:ext cx="0" cy="0"/>
+          <a:chOff x="0" y="0"/>
+          <a:chExt cx="0" cy="0"/>
+        </a:xfrm>
+      </p:grpSpPr>
+      <p:sp>
+        <p:nvSpPr>
+          <p:cNvPr id="2" name="Titel 1">
+            <a:extLst>
+              <a:ext uri="{FF2B5EF4-FFF2-40B4-BE49-F238E27FC236}">
+                <a16:creationId xmlns:a16="http://schemas.microsoft.com/office/drawing/2014/main" id="{8E09C70E-67AA-40A2-8702-34C1E37195A4}"/>
+              </a:ext>
+            </a:extLst>
+          </p:cNvPr>
+          <p:cNvSpPr>
+            <a:spLocks noGrp="1"/>
+          </p:cNvSpPr>
+          <p:nvPr>
+            <p:ph type="title"/>
+          </p:nvPr>
+        </p:nvSpPr>
+        <p:spPr/>
+        <p:txBody>
+          <a:bodyPr/>
+          <a:lstStyle/>
+          <a:p>
+            <a:r>
+              <a:rPr lang="de-DE" dirty="0"/>
+              <a:t>App-Bausteine</a:t>
+            </a:r>
+          </a:p>
+        </p:txBody>
+      </p:sp>
+      <p:sp>
+        <p:nvSpPr>
+          <p:cNvPr id="3" name="Inhaltsplatzhalter 2">
+            <a:extLst>
+              <a:ext uri="{FF2B5EF4-FFF2-40B4-BE49-F238E27FC236}">
+                <a16:creationId xmlns:a16="http://schemas.microsoft.com/office/drawing/2014/main" id="{522F4E51-4D2D-4B1E-90E8-6679EDD15515}"/>
+              </a:ext>
+            </a:extLst>
+          </p:cNvPr>
+          <p:cNvSpPr>
+            <a:spLocks noGrp="1"/>
+          </p:cNvSpPr>
+          <p:nvPr>
+            <p:ph sz="quarter" idx="13"/>
+          </p:nvPr>
+        </p:nvSpPr>
+        <p:spPr/>
+        <p:txBody>
+          <a:bodyPr/>
+          <a:lstStyle/>
+          <a:p>
+            <a:r>
+              <a:rPr lang="de-DE" dirty="0" err="1"/>
+              <a:t>Activities</a:t>
+            </a:r>
+            <a:r>
+              <a:rPr lang="de-DE" dirty="0"/>
+              <a:t> repräsentieren die für den Anwender sichtbaren Teile einer App</a:t>
+            </a:r>
+          </a:p>
+          <a:p>
+            <a:r>
+              <a:rPr lang="de-DE" dirty="0"/>
+              <a:t>Services implementieren lang laufende Funktionen ohne Nutzerinteraktion</a:t>
+            </a:r>
+          </a:p>
+          <a:p>
+            <a:r>
+              <a:rPr lang="de-DE" dirty="0"/>
+              <a:t>Broadcast Receiver sind Empfänger von Nachrichten, die das System oder andere Apps an einen oder mehrere Empfänger geschickt haben</a:t>
+            </a:r>
+          </a:p>
+          <a:p>
+            <a:r>
+              <a:rPr lang="de-DE" dirty="0"/>
+              <a:t>Content Provider ermöglichen über Uniform </a:t>
+            </a:r>
+            <a:r>
+              <a:rPr lang="de-DE" dirty="0" err="1"/>
+              <a:t>Resource</a:t>
+            </a:r>
+            <a:r>
+              <a:rPr lang="de-DE" dirty="0"/>
+              <a:t> Identifier den Zugriff auf Kontakte, Termine, …</a:t>
+            </a:r>
+          </a:p>
+          <a:p>
+            <a:r>
+              <a:rPr lang="de-DE" dirty="0"/>
+              <a:t>Sie werden in die </a:t>
+            </a:r>
+            <a:r>
+              <a:rPr lang="de-DE" dirty="0" err="1"/>
+              <a:t>Manifestdatei</a:t>
+            </a:r>
+            <a:r>
+              <a:rPr lang="de-DE" dirty="0"/>
+              <a:t> eingetragen</a:t>
+            </a:r>
+          </a:p>
+          <a:p>
+            <a:r>
+              <a:rPr lang="de-DE" dirty="0"/>
+              <a:t>Prozess-Layout kann </a:t>
+            </a:r>
+            <a:r>
+              <a:rPr lang="de-DE" dirty="0" err="1"/>
+              <a:t>android:process</a:t>
+            </a:r>
+            <a:r>
+              <a:rPr lang="de-DE" dirty="0"/>
+              <a:t> angepasst werden</a:t>
+            </a:r>
+          </a:p>
+          <a:p>
+            <a:pPr indent="0">
+              <a:buNone/>
+            </a:pPr>
+            <a:endParaRPr lang="de-DE" dirty="0"/>
+          </a:p>
+        </p:txBody>
+      </p:sp>
+    </p:spTree>
+    <p:extLst>
+      <p:ext uri="{BB962C8B-B14F-4D97-AF65-F5344CB8AC3E}">
+        <p14:creationId xmlns:p14="http://schemas.microsoft.com/office/powerpoint/2010/main" val="1823296931"/>
+      </p:ext>
+    </p:extLst>
+  </p:cSld>
+  <p:clrMapOvr>
+    <a:masterClrMapping/>
+  </p:clrMapOvr>
+</p:sld>
+</file>
+
+<file path=ppt/slides/slide7.xml><?xml version="1.0" encoding="utf-8"?>
+<p:sld xmlns:a="http://schemas.openxmlformats.org/drawingml/2006/main" xmlns:r="http://schemas.openxmlformats.org/officeDocument/2006/relationships" xmlns:p="http://schemas.openxmlformats.org/presentationml/2006/main">
+  <p:cSld>
+    <p:spTree>
+      <p:nvGrpSpPr>
+        <p:cNvPr id="1" name=""/>
+        <p:cNvGrpSpPr/>
+        <p:nvPr/>
+      </p:nvGrpSpPr>
+      <p:grpSpPr>
+        <a:xfrm>
+          <a:off x="0" y="0"/>
+          <a:ext cx="0" cy="0"/>
+          <a:chOff x="0" y="0"/>
+          <a:chExt cx="0" cy="0"/>
+        </a:xfrm>
+      </p:grpSpPr>
+      <p:sp>
+        <p:nvSpPr>
+          <p:cNvPr id="2" name="Titel 1">
+            <a:extLst>
+              <a:ext uri="{FF2B5EF4-FFF2-40B4-BE49-F238E27FC236}">
+                <a16:creationId xmlns:a16="http://schemas.microsoft.com/office/drawing/2014/main" id="{C7132D7C-F38E-49AF-A967-8F275A033C3C}"/>
+              </a:ext>
+            </a:extLst>
+          </p:cNvPr>
+          <p:cNvSpPr>
+            <a:spLocks noGrp="1"/>
+          </p:cNvSpPr>
+          <p:nvPr>
+            <p:ph type="title"/>
+          </p:nvPr>
+        </p:nvSpPr>
+        <p:spPr/>
+        <p:txBody>
+          <a:bodyPr/>
+          <a:lstStyle/>
+          <a:p>
+            <a:r>
+              <a:rPr lang="de-DE" dirty="0"/>
+              <a:t>Nebenläufigkeit – direkte Verwendung von Thread</a:t>
+            </a:r>
+          </a:p>
+        </p:txBody>
+      </p:sp>
+      <p:sp>
+        <p:nvSpPr>
+          <p:cNvPr id="3" name="Inhaltsplatzhalter 2">
+            <a:extLst>
+              <a:ext uri="{FF2B5EF4-FFF2-40B4-BE49-F238E27FC236}">
+                <a16:creationId xmlns:a16="http://schemas.microsoft.com/office/drawing/2014/main" id="{C883700D-EC2C-4D40-98E9-EE3E5C790F48}"/>
+              </a:ext>
+            </a:extLst>
+          </p:cNvPr>
+          <p:cNvSpPr>
+            <a:spLocks noGrp="1"/>
+          </p:cNvSpPr>
+          <p:nvPr>
+            <p:ph sz="quarter" idx="13"/>
+          </p:nvPr>
+        </p:nvSpPr>
+        <p:spPr/>
+        <p:txBody>
+          <a:bodyPr/>
+          <a:lstStyle/>
+          <a:p>
+            <a:pPr indent="0">
+              <a:buNone/>
+            </a:pPr>
+            <a:r>
+              <a:rPr lang="en-US" dirty="0">
+                <a:latin typeface="Courier New" panose="02070309020205020404" pitchFamily="49" charset="0"/>
+                <a:cs typeface="Courier New" panose="02070309020205020404" pitchFamily="49" charset="0"/>
+              </a:rPr>
+              <a:t>Thread t = new Thread(() =&gt; </a:t>
+            </a:r>
+            <a:r>
+              <a:rPr lang="en-US" dirty="0" err="1">
+                <a:latin typeface="Courier New" panose="02070309020205020404" pitchFamily="49" charset="0"/>
+                <a:cs typeface="Courier New" panose="02070309020205020404" pitchFamily="49" charset="0"/>
+              </a:rPr>
+              <a:t>DoIt</a:t>
+            </a:r>
+            <a:r>
+              <a:rPr lang="en-US" dirty="0">
+                <a:latin typeface="Courier New" panose="02070309020205020404" pitchFamily="49" charset="0"/>
+                <a:cs typeface="Courier New" panose="02070309020205020404" pitchFamily="49" charset="0"/>
+              </a:rPr>
+              <a:t>() );</a:t>
+            </a:r>
+          </a:p>
+          <a:p>
+            <a:pPr indent="0">
+              <a:buNone/>
+            </a:pPr>
+            <a:r>
+              <a:rPr lang="en-US" dirty="0" err="1">
+                <a:latin typeface="Courier New" panose="02070309020205020404" pitchFamily="49" charset="0"/>
+                <a:cs typeface="Courier New" panose="02070309020205020404" pitchFamily="49" charset="0"/>
+              </a:rPr>
+              <a:t>t.Start</a:t>
+            </a:r>
+            <a:r>
+              <a:rPr lang="en-US" dirty="0">
+                <a:latin typeface="Courier New" panose="02070309020205020404" pitchFamily="49" charset="0"/>
+                <a:cs typeface="Courier New" panose="02070309020205020404" pitchFamily="49" charset="0"/>
+              </a:rPr>
+              <a:t>();</a:t>
+            </a:r>
+          </a:p>
+          <a:p>
+            <a:pPr indent="0">
+              <a:buNone/>
+            </a:pPr>
+            <a:r>
+              <a:rPr lang="en-US" dirty="0" err="1"/>
+              <a:t>oder</a:t>
+            </a:r>
+            <a:endParaRPr lang="en-US" dirty="0"/>
+          </a:p>
+          <a:p>
+            <a:pPr indent="0">
+              <a:buNone/>
+            </a:pPr>
+            <a:r>
+              <a:rPr lang="en-US" dirty="0">
+                <a:latin typeface="Courier New" panose="02070309020205020404" pitchFamily="49" charset="0"/>
+                <a:cs typeface="Courier New" panose="02070309020205020404" pitchFamily="49" charset="0"/>
+              </a:rPr>
+              <a:t>using </a:t>
+            </a:r>
+            <a:r>
+              <a:rPr lang="en-US" dirty="0" err="1">
+                <a:latin typeface="Courier New" panose="02070309020205020404" pitchFamily="49" charset="0"/>
+                <a:cs typeface="Courier New" panose="02070309020205020404" pitchFamily="49" charset="0"/>
+              </a:rPr>
+              <a:t>System.Threading.Tasks</a:t>
+            </a:r>
+            <a:r>
+              <a:rPr lang="en-US" dirty="0">
+                <a:latin typeface="Courier New" panose="02070309020205020404" pitchFamily="49" charset="0"/>
+                <a:cs typeface="Courier New" panose="02070309020205020404" pitchFamily="49" charset="0"/>
+              </a:rPr>
+              <a:t>;</a:t>
+            </a:r>
+          </a:p>
+          <a:p>
+            <a:pPr indent="0">
+              <a:buNone/>
+            </a:pPr>
+            <a:r>
+              <a:rPr lang="de-DE" dirty="0" err="1">
+                <a:latin typeface="Courier New" panose="02070309020205020404" pitchFamily="49" charset="0"/>
+                <a:cs typeface="Courier New" panose="02070309020205020404" pitchFamily="49" charset="0"/>
+              </a:rPr>
+              <a:t>Task.Run</a:t>
+            </a:r>
+            <a:r>
+              <a:rPr lang="de-DE" dirty="0">
+                <a:latin typeface="Courier New" panose="02070309020205020404" pitchFamily="49" charset="0"/>
+                <a:cs typeface="Courier New" panose="02070309020205020404" pitchFamily="49" charset="0"/>
+              </a:rPr>
+              <a:t>(() =&gt; { </a:t>
+            </a:r>
+            <a:r>
+              <a:rPr lang="de-DE" dirty="0" err="1">
+                <a:latin typeface="Courier New" panose="02070309020205020404" pitchFamily="49" charset="0"/>
+                <a:cs typeface="Courier New" panose="02070309020205020404" pitchFamily="49" charset="0"/>
+              </a:rPr>
+              <a:t>DoIt</a:t>
+            </a:r>
+            <a:r>
+              <a:rPr lang="de-DE" dirty="0">
+                <a:latin typeface="Courier New" panose="02070309020205020404" pitchFamily="49" charset="0"/>
+                <a:cs typeface="Courier New" panose="02070309020205020404" pitchFamily="49" charset="0"/>
+              </a:rPr>
+              <a:t>(); });</a:t>
+            </a:r>
+          </a:p>
+        </p:txBody>
+      </p:sp>
+    </p:spTree>
+    <p:extLst>
+      <p:ext uri="{BB962C8B-B14F-4D97-AF65-F5344CB8AC3E}">
+        <p14:creationId xmlns:p14="http://schemas.microsoft.com/office/powerpoint/2010/main" val="3649529016"/>
+      </p:ext>
+    </p:extLst>
+  </p:cSld>
+  <p:clrMapOvr>
+    <a:masterClrMapping/>
+  </p:clrMapOvr>
+</p:sld>
+</file>
+
+<file path=ppt/slides/slide8.xml><?xml version="1.0" encoding="utf-8"?>
+<p:sld xmlns:a="http://schemas.openxmlformats.org/drawingml/2006/main" xmlns:r="http://schemas.openxmlformats.org/officeDocument/2006/relationships" xmlns:p="http://schemas.openxmlformats.org/presentationml/2006/main">
+  <p:cSld>
+    <p:spTree>
+      <p:nvGrpSpPr>
+        <p:cNvPr id="1" name=""/>
+        <p:cNvGrpSpPr/>
+        <p:nvPr/>
+      </p:nvGrpSpPr>
+      <p:grpSpPr>
+        <a:xfrm>
+          <a:off x="0" y="0"/>
+          <a:ext cx="0" cy="0"/>
+          <a:chOff x="0" y="0"/>
+          <a:chExt cx="0" cy="0"/>
+        </a:xfrm>
+      </p:grpSpPr>
+      <p:sp>
+        <p:nvSpPr>
+          <p:cNvPr id="2" name="Titel 1">
+            <a:extLst>
+              <a:ext uri="{FF2B5EF4-FFF2-40B4-BE49-F238E27FC236}">
+                <a16:creationId xmlns:a16="http://schemas.microsoft.com/office/drawing/2014/main" id="{AE92F264-3106-4A6C-9A21-A872BF509D1F}"/>
+              </a:ext>
+            </a:extLst>
+          </p:cNvPr>
+          <p:cNvSpPr>
+            <a:spLocks noGrp="1"/>
+          </p:cNvSpPr>
+          <p:nvPr>
+            <p:ph type="title"/>
+          </p:nvPr>
+        </p:nvSpPr>
+        <p:spPr/>
+        <p:txBody>
+          <a:bodyPr/>
+          <a:lstStyle/>
+          <a:p>
+            <a:r>
+              <a:rPr lang="de-DE" dirty="0" err="1"/>
+              <a:t>Timer</a:t>
+            </a:r>
+            <a:r>
+              <a:rPr lang="de-DE" dirty="0"/>
+              <a:t> und </a:t>
+            </a:r>
+            <a:r>
+              <a:rPr lang="de-DE" dirty="0" err="1"/>
+              <a:t>TimerTask</a:t>
+            </a:r>
+            <a:endParaRPr lang="de-DE" dirty="0"/>
+          </a:p>
+        </p:txBody>
+      </p:sp>
+      <p:sp>
+        <p:nvSpPr>
+          <p:cNvPr id="3" name="Inhaltsplatzhalter 2">
+            <a:extLst>
+              <a:ext uri="{FF2B5EF4-FFF2-40B4-BE49-F238E27FC236}">
+                <a16:creationId xmlns:a16="http://schemas.microsoft.com/office/drawing/2014/main" id="{0465664F-82E4-4870-85F1-D658FBBDAAED}"/>
+              </a:ext>
+            </a:extLst>
+          </p:cNvPr>
+          <p:cNvSpPr>
+            <a:spLocks noGrp="1"/>
+          </p:cNvSpPr>
+          <p:nvPr>
+            <p:ph sz="quarter" idx="13"/>
+          </p:nvPr>
+        </p:nvSpPr>
+        <p:spPr/>
+        <p:txBody>
+          <a:bodyPr/>
+          <a:lstStyle/>
+          <a:p>
+            <a:r>
+              <a:rPr lang="de-DE" dirty="0" err="1"/>
+              <a:t>To</a:t>
+            </a:r>
+            <a:r>
+              <a:rPr lang="de-DE" dirty="0"/>
+              <a:t> do: Listing</a:t>
+            </a:r>
+          </a:p>
+        </p:txBody>
+      </p:sp>
+    </p:spTree>
+    <p:extLst>
+      <p:ext uri="{BB962C8B-B14F-4D97-AF65-F5344CB8AC3E}">
+        <p14:creationId xmlns:p14="http://schemas.microsoft.com/office/powerpoint/2010/main" val="2708726509"/>
+      </p:ext>
+    </p:extLst>
+  </p:cSld>
+  <p:clrMapOvr>
+    <a:masterClrMapping/>
+  </p:clrMapOvr>
+</p:sld>
+</file>
+
+<file path=ppt/slides/slide9.xml><?xml version="1.0" encoding="utf-8"?>
+<p:sld xmlns:a="http://schemas.openxmlformats.org/drawingml/2006/main" xmlns:r="http://schemas.openxmlformats.org/officeDocument/2006/relationships" xmlns:p="http://schemas.openxmlformats.org/presentationml/2006/main">
+  <p:cSld>
+    <p:spTree>
+      <p:nvGrpSpPr>
+        <p:cNvPr id="1" name=""/>
+        <p:cNvGrpSpPr/>
+        <p:nvPr/>
+      </p:nvGrpSpPr>
+      <p:grpSpPr>
+        <a:xfrm>
+          <a:off x="0" y="0"/>
+          <a:ext cx="0" cy="0"/>
+          <a:chOff x="0" y="0"/>
+          <a:chExt cx="0" cy="0"/>
+        </a:xfrm>
+      </p:grpSpPr>
+      <p:sp>
+        <p:nvSpPr>
+          <p:cNvPr id="2" name="Titel 1">
+            <a:extLst>
+              <a:ext uri="{FF2B5EF4-FFF2-40B4-BE49-F238E27FC236}">
+                <a16:creationId xmlns:a16="http://schemas.microsoft.com/office/drawing/2014/main" id="{067E190A-5BAC-4785-8D7E-A00CF93320DF}"/>
+              </a:ext>
+            </a:extLst>
+          </p:cNvPr>
+          <p:cNvSpPr>
+            <a:spLocks noGrp="1"/>
+          </p:cNvSpPr>
+          <p:nvPr>
+            <p:ph type="title"/>
+          </p:nvPr>
+        </p:nvSpPr>
+        <p:spPr/>
+        <p:txBody>
+          <a:bodyPr/>
+          <a:lstStyle/>
+          <a:p>
+            <a:r>
+              <a:rPr lang="de-DE" dirty="0"/>
+              <a:t>Nutzung des UI-Thread</a:t>
+            </a:r>
+          </a:p>
+        </p:txBody>
+      </p:sp>
+      <p:sp>
+        <p:nvSpPr>
+          <p:cNvPr id="3" name="Inhaltsplatzhalter 2">
+            <a:extLst>
+              <a:ext uri="{FF2B5EF4-FFF2-40B4-BE49-F238E27FC236}">
+                <a16:creationId xmlns:a16="http://schemas.microsoft.com/office/drawing/2014/main" id="{0C1DB834-D1B6-4D5F-AA5D-FD2923047E04}"/>
+              </a:ext>
+            </a:extLst>
+          </p:cNvPr>
+          <p:cNvSpPr>
+            <a:spLocks noGrp="1"/>
+          </p:cNvSpPr>
+          <p:nvPr>
+            <p:ph sz="quarter" idx="13"/>
+          </p:nvPr>
+        </p:nvSpPr>
+        <p:spPr/>
+        <p:txBody>
+          <a:bodyPr/>
+          <a:lstStyle/>
+          <a:p>
+            <a:r>
+              <a:rPr lang="de-DE" dirty="0"/>
+              <a:t>Muss für alle Änderungen an der Oberfläche verwendet werden</a:t>
+            </a:r>
+          </a:p>
+          <a:p>
+            <a:r>
+              <a:rPr lang="de-DE" dirty="0"/>
+              <a:t>Geht ganz einfach mit …</a:t>
+            </a:r>
+          </a:p>
+          <a:p>
+            <a:pPr lvl="1"/>
+            <a:r>
+              <a:rPr lang="de-DE" dirty="0" err="1"/>
+              <a:t>runOnUiThread</a:t>
+            </a:r>
+            <a:r>
+              <a:rPr lang="de-DE" dirty="0"/>
+              <a:t>() der Klasse </a:t>
+            </a:r>
+            <a:r>
+              <a:rPr lang="de-DE" dirty="0" err="1"/>
+              <a:t>android.app.Activity</a:t>
+            </a:r>
+            <a:endParaRPr lang="de-DE" dirty="0"/>
+          </a:p>
+          <a:p>
+            <a:pPr lvl="1"/>
+            <a:r>
+              <a:rPr lang="de-DE" dirty="0" err="1"/>
+              <a:t>post</a:t>
+            </a:r>
+            <a:r>
+              <a:rPr lang="de-DE" dirty="0"/>
+              <a:t>() und </a:t>
+            </a:r>
+            <a:r>
+              <a:rPr lang="de-DE" dirty="0" err="1"/>
+              <a:t>postDelayed</a:t>
+            </a:r>
+            <a:r>
+              <a:rPr lang="de-DE" dirty="0"/>
+              <a:t>() von </a:t>
+            </a:r>
+            <a:r>
+              <a:rPr lang="de-DE" dirty="0" err="1"/>
+              <a:t>android.view.View</a:t>
+            </a:r>
+            <a:endParaRPr lang="de-DE" dirty="0"/>
+          </a:p>
+        </p:txBody>
+      </p:sp>
+    </p:spTree>
+    <p:extLst>
+      <p:ext uri="{BB962C8B-B14F-4D97-AF65-F5344CB8AC3E}">
+        <p14:creationId xmlns:p14="http://schemas.microsoft.com/office/powerpoint/2010/main" val="1341360385"/>
       </p:ext>
     </p:extLst>
   </p:cSld>

</xml_diff>

<commit_message>
one more change ;-)
</commit_message>
<xml_diff>
--- a/Slides/DWX 2017.pptx
+++ b/Slides/DWX 2017.pptx
@@ -6,34 +6,33 @@
     <p:sldMasterId id="2147483676" r:id="rId2"/>
   </p:sldMasterIdLst>
   <p:notesMasterIdLst>
-    <p:notesMasterId r:id="rId28"/>
+    <p:notesMasterId r:id="rId27"/>
   </p:notesMasterIdLst>
   <p:sldIdLst>
     <p:sldId id="257" r:id="rId3"/>
     <p:sldId id="279" r:id="rId4"/>
-    <p:sldId id="283" r:id="rId5"/>
-    <p:sldId id="281" r:id="rId6"/>
-    <p:sldId id="282" r:id="rId7"/>
-    <p:sldId id="278" r:id="rId8"/>
-    <p:sldId id="262" r:id="rId9"/>
-    <p:sldId id="260" r:id="rId10"/>
-    <p:sldId id="280" r:id="rId11"/>
-    <p:sldId id="263" r:id="rId12"/>
-    <p:sldId id="265" r:id="rId13"/>
-    <p:sldId id="264" r:id="rId14"/>
-    <p:sldId id="266" r:id="rId15"/>
-    <p:sldId id="268" r:id="rId16"/>
-    <p:sldId id="267" r:id="rId17"/>
-    <p:sldId id="269" r:id="rId18"/>
-    <p:sldId id="271" r:id="rId19"/>
-    <p:sldId id="270" r:id="rId20"/>
-    <p:sldId id="273" r:id="rId21"/>
-    <p:sldId id="274" r:id="rId22"/>
-    <p:sldId id="275" r:id="rId23"/>
-    <p:sldId id="272" r:id="rId24"/>
-    <p:sldId id="276" r:id="rId25"/>
-    <p:sldId id="277" r:id="rId26"/>
-    <p:sldId id="258" r:id="rId27"/>
+    <p:sldId id="281" r:id="rId5"/>
+    <p:sldId id="282" r:id="rId6"/>
+    <p:sldId id="278" r:id="rId7"/>
+    <p:sldId id="262" r:id="rId8"/>
+    <p:sldId id="260" r:id="rId9"/>
+    <p:sldId id="280" r:id="rId10"/>
+    <p:sldId id="263" r:id="rId11"/>
+    <p:sldId id="265" r:id="rId12"/>
+    <p:sldId id="264" r:id="rId13"/>
+    <p:sldId id="266" r:id="rId14"/>
+    <p:sldId id="268" r:id="rId15"/>
+    <p:sldId id="267" r:id="rId16"/>
+    <p:sldId id="269" r:id="rId17"/>
+    <p:sldId id="271" r:id="rId18"/>
+    <p:sldId id="270" r:id="rId19"/>
+    <p:sldId id="273" r:id="rId20"/>
+    <p:sldId id="274" r:id="rId21"/>
+    <p:sldId id="275" r:id="rId22"/>
+    <p:sldId id="272" r:id="rId23"/>
+    <p:sldId id="276" r:id="rId24"/>
+    <p:sldId id="277" r:id="rId25"/>
+    <p:sldId id="258" r:id="rId26"/>
   </p:sldIdLst>
   <p:sldSz cx="9144000" cy="6858000" type="screen4x3"/>
   <p:notesSz cx="6858000" cy="9144000"/>
@@ -3901,7 +3900,7 @@
           <p:cNvPr id="2" name="Titel 1">
             <a:extLst>
               <a:ext uri="{FF2B5EF4-FFF2-40B4-BE49-F238E27FC236}">
-                <a16:creationId xmlns="" xmlns:a16="http://schemas.microsoft.com/office/drawing/2014/main" id="{2B5FF3A6-3600-411C-8FC0-2A69441AFEF5}"/>
+                <a16:creationId xmlns:a16="http://schemas.microsoft.com/office/drawing/2014/main" xmlns="" id="{1616E3A9-5985-4C7A-82C1-CE098AE704E2}"/>
               </a:ext>
             </a:extLst>
           </p:cNvPr>
@@ -3919,45 +3918,81 @@
           <a:p>
             <a:r>
               <a:rPr lang="de-DE" dirty="0"/>
-              <a:t>Träge reagierende UI vermeiden</a:t>
-            </a:r>
-          </a:p>
-        </p:txBody>
-      </p:sp>
-      <p:pic>
-        <p:nvPicPr>
-          <p:cNvPr id="7" name="Bild 6"/>
-          <p:cNvPicPr>
-            <a:picLocks noChangeAspect="1"/>
-          </p:cNvPicPr>
-          <p:nvPr/>
-        </p:nvPicPr>
-        <p:blipFill>
-          <a:blip r:embed="rId2" cstate="screen">
+              <a:t>Die App zur Laufzeit</a:t>
+            </a:r>
+          </a:p>
+        </p:txBody>
+      </p:sp>
+      <p:sp>
+        <p:nvSpPr>
+          <p:cNvPr id="3" name="Inhaltsplatzhalter 2">
             <a:extLst>
-              <a:ext uri="{28A0092B-C50C-407E-A947-70E740481C1C}">
-                <a14:useLocalDpi xmlns:a14="http://schemas.microsoft.com/office/drawing/2010/main"/>
+              <a:ext uri="{FF2B5EF4-FFF2-40B4-BE49-F238E27FC236}">
+                <a16:creationId xmlns:a16="http://schemas.microsoft.com/office/drawing/2014/main" xmlns="" id="{32FDB212-F9B0-45B8-9D6C-F4B26230C676}"/>
               </a:ext>
             </a:extLst>
-          </a:blip>
-          <a:stretch>
-            <a:fillRect/>
-          </a:stretch>
-        </p:blipFill>
-        <p:spPr>
-          <a:xfrm>
-            <a:off x="3141287" y="1589977"/>
-            <a:ext cx="2861425" cy="4564800"/>
-          </a:xfrm>
-          <a:prstGeom prst="rect">
-            <a:avLst/>
-          </a:prstGeom>
-        </p:spPr>
-      </p:pic>
+          </p:cNvPr>
+          <p:cNvSpPr>
+            <a:spLocks noGrp="1"/>
+          </p:cNvSpPr>
+          <p:nvPr>
+            <p:ph sz="quarter" idx="13"/>
+          </p:nvPr>
+        </p:nvSpPr>
+        <p:spPr/>
+        <p:txBody>
+          <a:bodyPr/>
+          <a:lstStyle/>
+          <a:p>
+            <a:r>
+              <a:rPr lang="de-DE" dirty="0"/>
+              <a:t>Läuft standardmäßig in einem Linux-Prozess</a:t>
+            </a:r>
+          </a:p>
+          <a:p>
+            <a:r>
+              <a:rPr lang="de-DE" dirty="0"/>
+              <a:t>Hat standardmäßig einen Thread</a:t>
+            </a:r>
+          </a:p>
+          <a:p>
+            <a:r>
+              <a:rPr lang="de-DE" dirty="0"/>
+              <a:t>Prozess wird (erneut) gestartet, wenn eine Komponente der App angesprochen wird</a:t>
+            </a:r>
+          </a:p>
+          <a:p>
+            <a:r>
+              <a:rPr lang="de-DE" dirty="0"/>
+              <a:t>Prozess-Layout kann in der </a:t>
+            </a:r>
+            <a:r>
+              <a:rPr lang="de-DE" dirty="0" err="1"/>
+              <a:t>Manifestdatei</a:t>
+            </a:r>
+            <a:r>
+              <a:rPr lang="de-DE" dirty="0"/>
+              <a:t> angepasst werden (</a:t>
+            </a:r>
+            <a:r>
+              <a:rPr lang="de-DE" dirty="0" err="1">
+                <a:latin typeface="Courier New" charset="0"/>
+                <a:ea typeface="Courier New" charset="0"/>
+                <a:cs typeface="Courier New" charset="0"/>
+              </a:rPr>
+              <a:t>android:process</a:t>
+            </a:r>
+            <a:r>
+              <a:rPr lang="de-DE" dirty="0"/>
+              <a:t>)</a:t>
+            </a:r>
+          </a:p>
+        </p:txBody>
+      </p:sp>
     </p:spTree>
     <p:extLst>
       <p:ext uri="{BB962C8B-B14F-4D97-AF65-F5344CB8AC3E}">
-        <p14:creationId xmlns:p14="http://schemas.microsoft.com/office/powerpoint/2010/main" val="1423969898"/>
+        <p14:creationId xmlns:p14="http://schemas.microsoft.com/office/powerpoint/2010/main" val="453281389"/>
       </p:ext>
     </p:extLst>
   </p:cSld>
@@ -3996,7 +4031,7 @@
           <p:cNvPr id="2" name="Titel 1">
             <a:extLst>
               <a:ext uri="{FF2B5EF4-FFF2-40B4-BE49-F238E27FC236}">
-                <a16:creationId xmlns="" xmlns:a16="http://schemas.microsoft.com/office/drawing/2014/main" id="{1616E3A9-5985-4C7A-82C1-CE098AE704E2}"/>
+                <a16:creationId xmlns:a16="http://schemas.microsoft.com/office/drawing/2014/main" xmlns="" id="{8E09C70E-67AA-40A2-8702-34C1E37195A4}"/>
               </a:ext>
             </a:extLst>
           </p:cNvPr>
@@ -4014,7 +4049,7 @@
           <a:p>
             <a:r>
               <a:rPr lang="de-DE" dirty="0"/>
-              <a:t>Die App zur Laufzeit</a:t>
+              <a:t>App-Bausteine</a:t>
             </a:r>
           </a:p>
         </p:txBody>
@@ -4024,7 +4059,7 @@
           <p:cNvPr id="3" name="Inhaltsplatzhalter 2">
             <a:extLst>
               <a:ext uri="{FF2B5EF4-FFF2-40B4-BE49-F238E27FC236}">
-                <a16:creationId xmlns="" xmlns:a16="http://schemas.microsoft.com/office/drawing/2014/main" id="{32FDB212-F9B0-45B8-9D6C-F4B26230C676}"/>
+                <a16:creationId xmlns:a16="http://schemas.microsoft.com/office/drawing/2014/main" xmlns="" id="{522F4E51-4D2D-4B1E-90E8-6679EDD15515}"/>
               </a:ext>
             </a:extLst>
           </p:cNvPr>
@@ -4041,26 +4076,44 @@
           <a:lstStyle/>
           <a:p>
             <a:r>
-              <a:rPr lang="de-DE" dirty="0"/>
-              <a:t>Läuft standardmäßig in einem Linux-Prozess</a:t>
-            </a:r>
-          </a:p>
-          <a:p>
-            <a:r>
-              <a:rPr lang="de-DE" dirty="0"/>
-              <a:t>Hat standardmäßig einen Thread</a:t>
-            </a:r>
-          </a:p>
-          <a:p>
-            <a:r>
-              <a:rPr lang="de-DE" dirty="0"/>
-              <a:t>Prozess wird (erneut) gestartet, wenn eine Komponente der App angesprochen wird</a:t>
-            </a:r>
-          </a:p>
-          <a:p>
-            <a:r>
-              <a:rPr lang="de-DE" dirty="0"/>
-              <a:t>Prozess-Layout kann in der </a:t>
+              <a:rPr lang="de-DE" dirty="0" err="1"/>
+              <a:t>Activities</a:t>
+            </a:r>
+            <a:r>
+              <a:rPr lang="de-DE" dirty="0"/>
+              <a:t> repräsentieren die für den Anwender sichtbaren Teile einer App</a:t>
+            </a:r>
+          </a:p>
+          <a:p>
+            <a:r>
+              <a:rPr lang="de-DE" dirty="0"/>
+              <a:t>Services implementieren lang laufende Funktionen ohne Nutzerinteraktion</a:t>
+            </a:r>
+          </a:p>
+          <a:p>
+            <a:r>
+              <a:rPr lang="de-DE" dirty="0"/>
+              <a:t>Broadcast Receiver sind Empfänger von Nachrichten, die das System oder andere Apps an einen oder mehrere Empfänger geschickt haben</a:t>
+            </a:r>
+          </a:p>
+          <a:p>
+            <a:r>
+              <a:rPr lang="de-DE" dirty="0"/>
+              <a:t>Content Provider ermöglichen über Uniform </a:t>
+            </a:r>
+            <a:r>
+              <a:rPr lang="de-DE" dirty="0" err="1"/>
+              <a:t>Resource</a:t>
+            </a:r>
+            <a:r>
+              <a:rPr lang="de-DE" dirty="0"/>
+              <a:t> Identifier den Zugriff auf Kontakte, Termine, …</a:t>
+            </a:r>
+          </a:p>
+          <a:p>
+            <a:r>
+              <a:rPr lang="de-DE" dirty="0"/>
+              <a:t>Sie werden in die </a:t>
             </a:r>
             <a:r>
               <a:rPr lang="de-DE" dirty="0" err="1"/>
@@ -4068,27 +4121,35 @@
             </a:r>
             <a:r>
               <a:rPr lang="de-DE" dirty="0"/>
-              <a:t> angepasst werden (</a:t>
-            </a:r>
-            <a:r>
-              <a:rPr lang="de-DE" dirty="0" err="1">
-                <a:latin typeface="Courier New" charset="0"/>
-                <a:ea typeface="Courier New" charset="0"/>
-                <a:cs typeface="Courier New" charset="0"/>
-              </a:rPr>
+              <a:t> eingetragen</a:t>
+            </a:r>
+          </a:p>
+          <a:p>
+            <a:r>
+              <a:rPr lang="de-DE" dirty="0"/>
+              <a:t>Prozess-Layout kann </a:t>
+            </a:r>
+            <a:r>
+              <a:rPr lang="de-DE" dirty="0" err="1"/>
               <a:t>android:process</a:t>
             </a:r>
             <a:r>
               <a:rPr lang="de-DE" dirty="0"/>
-              <a:t>)</a:t>
-            </a:r>
+              <a:t> angepasst werden</a:t>
+            </a:r>
+          </a:p>
+          <a:p>
+            <a:pPr indent="0">
+              <a:buNone/>
+            </a:pPr>
+            <a:endParaRPr lang="de-DE" dirty="0"/>
           </a:p>
         </p:txBody>
       </p:sp>
     </p:spTree>
     <p:extLst>
       <p:ext uri="{BB962C8B-B14F-4D97-AF65-F5344CB8AC3E}">
-        <p14:creationId xmlns:p14="http://schemas.microsoft.com/office/powerpoint/2010/main" val="453281389"/>
+        <p14:creationId xmlns:p14="http://schemas.microsoft.com/office/powerpoint/2010/main" val="1823296931"/>
       </p:ext>
     </p:extLst>
   </p:cSld>
@@ -4127,7 +4188,7 @@
           <p:cNvPr id="2" name="Titel 1">
             <a:extLst>
               <a:ext uri="{FF2B5EF4-FFF2-40B4-BE49-F238E27FC236}">
-                <a16:creationId xmlns="" xmlns:a16="http://schemas.microsoft.com/office/drawing/2014/main" id="{8E09C70E-67AA-40A2-8702-34C1E37195A4}"/>
+                <a16:creationId xmlns:a16="http://schemas.microsoft.com/office/drawing/2014/main" xmlns="" id="{C7132D7C-F38E-49AF-A967-8F275A033C3C}"/>
               </a:ext>
             </a:extLst>
           </p:cNvPr>
@@ -4144,9 +4205,10 @@
           <a:lstStyle/>
           <a:p>
             <a:r>
-              <a:rPr lang="de-DE" dirty="0"/>
-              <a:t>App-Bausteine</a:t>
-            </a:r>
+              <a:rPr lang="de-DE" dirty="0" smtClean="0"/>
+              <a:t>Nebenläufigkeit</a:t>
+            </a:r>
+            <a:endParaRPr lang="de-DE" dirty="0"/>
           </a:p>
         </p:txBody>
       </p:sp>
@@ -4155,7 +4217,7 @@
           <p:cNvPr id="3" name="Inhaltsplatzhalter 2">
             <a:extLst>
               <a:ext uri="{FF2B5EF4-FFF2-40B4-BE49-F238E27FC236}">
-                <a16:creationId xmlns="" xmlns:a16="http://schemas.microsoft.com/office/drawing/2014/main" id="{522F4E51-4D2D-4B1E-90E8-6679EDD15515}"/>
+                <a16:creationId xmlns:a16="http://schemas.microsoft.com/office/drawing/2014/main" xmlns="" id="{C883700D-EC2C-4D40-98E9-EE3E5C790F48}"/>
               </a:ext>
             </a:extLst>
           </p:cNvPr>
@@ -4171,81 +4233,125 @@
           <a:bodyPr/>
           <a:lstStyle/>
           <a:p>
-            <a:r>
-              <a:rPr lang="de-DE" dirty="0" err="1"/>
-              <a:t>Activities</a:t>
-            </a:r>
-            <a:r>
-              <a:rPr lang="de-DE" dirty="0"/>
-              <a:t> repräsentieren die für den Anwender sichtbaren Teile einer App</a:t>
-            </a:r>
-          </a:p>
-          <a:p>
-            <a:r>
-              <a:rPr lang="de-DE" dirty="0"/>
-              <a:t>Services implementieren lang laufende Funktionen ohne Nutzerinteraktion</a:t>
-            </a:r>
-          </a:p>
-          <a:p>
-            <a:r>
-              <a:rPr lang="de-DE" dirty="0"/>
-              <a:t>Broadcast Receiver sind Empfänger von Nachrichten, die das System oder andere Apps an einen oder mehrere Empfänger geschickt haben</a:t>
-            </a:r>
-          </a:p>
-          <a:p>
-            <a:r>
-              <a:rPr lang="de-DE" dirty="0"/>
-              <a:t>Content Provider ermöglichen über Uniform </a:t>
-            </a:r>
-            <a:r>
-              <a:rPr lang="de-DE" dirty="0" err="1"/>
-              <a:t>Resource</a:t>
-            </a:r>
-            <a:r>
-              <a:rPr lang="de-DE" dirty="0"/>
-              <a:t> Identifier den Zugriff auf Kontakte, Termine, …</a:t>
-            </a:r>
-          </a:p>
-          <a:p>
-            <a:r>
-              <a:rPr lang="de-DE" dirty="0"/>
-              <a:t>Sie werden in die </a:t>
-            </a:r>
-            <a:r>
-              <a:rPr lang="de-DE" dirty="0" err="1"/>
-              <a:t>Manifestdatei</a:t>
-            </a:r>
-            <a:r>
-              <a:rPr lang="de-DE" dirty="0"/>
-              <a:t> eingetragen</a:t>
-            </a:r>
-          </a:p>
-          <a:p>
-            <a:r>
-              <a:rPr lang="de-DE" dirty="0"/>
-              <a:t>Prozess-Layout kann </a:t>
-            </a:r>
-            <a:r>
-              <a:rPr lang="de-DE" dirty="0" err="1"/>
-              <a:t>android:process</a:t>
-            </a:r>
-            <a:r>
-              <a:rPr lang="de-DE" dirty="0"/>
-              <a:t> angepasst werden</a:t>
-            </a:r>
-          </a:p>
-          <a:p>
             <a:pPr indent="0">
               <a:buNone/>
             </a:pPr>
-            <a:endParaRPr lang="de-DE" dirty="0"/>
+            <a:r>
+              <a:rPr lang="en-US" dirty="0">
+                <a:latin typeface="Courier New" panose="02070309020205020404" pitchFamily="49" charset="0"/>
+                <a:cs typeface="Courier New" panose="02070309020205020404" pitchFamily="49" charset="0"/>
+              </a:rPr>
+              <a:t>Thread t = new Thread(() =&gt; </a:t>
+            </a:r>
+            <a:r>
+              <a:rPr lang="en-US" dirty="0" err="1">
+                <a:latin typeface="Courier New" panose="02070309020205020404" pitchFamily="49" charset="0"/>
+                <a:cs typeface="Courier New" panose="02070309020205020404" pitchFamily="49" charset="0"/>
+              </a:rPr>
+              <a:t>DoIt</a:t>
+            </a:r>
+            <a:r>
+              <a:rPr lang="en-US" dirty="0">
+                <a:latin typeface="Courier New" panose="02070309020205020404" pitchFamily="49" charset="0"/>
+                <a:cs typeface="Courier New" panose="02070309020205020404" pitchFamily="49" charset="0"/>
+              </a:rPr>
+              <a:t>() );</a:t>
+            </a:r>
+          </a:p>
+          <a:p>
+            <a:pPr indent="0">
+              <a:buNone/>
+            </a:pPr>
+            <a:r>
+              <a:rPr lang="en-US" dirty="0" err="1">
+                <a:latin typeface="Courier New" panose="02070309020205020404" pitchFamily="49" charset="0"/>
+                <a:cs typeface="Courier New" panose="02070309020205020404" pitchFamily="49" charset="0"/>
+              </a:rPr>
+              <a:t>t.Start</a:t>
+            </a:r>
+            <a:r>
+              <a:rPr lang="en-US" dirty="0">
+                <a:latin typeface="Courier New" panose="02070309020205020404" pitchFamily="49" charset="0"/>
+                <a:cs typeface="Courier New" panose="02070309020205020404" pitchFamily="49" charset="0"/>
+              </a:rPr>
+              <a:t>();</a:t>
+            </a:r>
+          </a:p>
+          <a:p>
+            <a:pPr indent="0">
+              <a:buNone/>
+            </a:pPr>
+            <a:r>
+              <a:rPr lang="en-US" dirty="0" err="1"/>
+              <a:t>oder</a:t>
+            </a:r>
+            <a:endParaRPr lang="en-US" dirty="0"/>
+          </a:p>
+          <a:p>
+            <a:pPr indent="0">
+              <a:buNone/>
+            </a:pPr>
+            <a:r>
+              <a:rPr lang="en-US" dirty="0">
+                <a:latin typeface="Courier New" panose="02070309020205020404" pitchFamily="49" charset="0"/>
+                <a:cs typeface="Courier New" panose="02070309020205020404" pitchFamily="49" charset="0"/>
+              </a:rPr>
+              <a:t>using </a:t>
+            </a:r>
+            <a:r>
+              <a:rPr lang="en-US" dirty="0" err="1">
+                <a:latin typeface="Courier New" panose="02070309020205020404" pitchFamily="49" charset="0"/>
+                <a:cs typeface="Courier New" panose="02070309020205020404" pitchFamily="49" charset="0"/>
+              </a:rPr>
+              <a:t>System.Threading.Tasks</a:t>
+            </a:r>
+            <a:r>
+              <a:rPr lang="en-US" dirty="0">
+                <a:latin typeface="Courier New" panose="02070309020205020404" pitchFamily="49" charset="0"/>
+                <a:cs typeface="Courier New" panose="02070309020205020404" pitchFamily="49" charset="0"/>
+              </a:rPr>
+              <a:t>;</a:t>
+            </a:r>
+          </a:p>
+          <a:p>
+            <a:pPr indent="0">
+              <a:buNone/>
+            </a:pPr>
+            <a:r>
+              <a:rPr lang="de-DE" dirty="0" err="1">
+                <a:latin typeface="Courier New" panose="02070309020205020404" pitchFamily="49" charset="0"/>
+                <a:cs typeface="Courier New" panose="02070309020205020404" pitchFamily="49" charset="0"/>
+              </a:rPr>
+              <a:t>Task.Run</a:t>
+            </a:r>
+            <a:r>
+              <a:rPr lang="de-DE" dirty="0">
+                <a:latin typeface="Courier New" panose="02070309020205020404" pitchFamily="49" charset="0"/>
+                <a:cs typeface="Courier New" panose="02070309020205020404" pitchFamily="49" charset="0"/>
+              </a:rPr>
+              <a:t>(() =&gt; { </a:t>
+            </a:r>
+            <a:r>
+              <a:rPr lang="de-DE" dirty="0" err="1">
+                <a:latin typeface="Courier New" panose="02070309020205020404" pitchFamily="49" charset="0"/>
+                <a:cs typeface="Courier New" panose="02070309020205020404" pitchFamily="49" charset="0"/>
+              </a:rPr>
+              <a:t>DoIt</a:t>
+            </a:r>
+            <a:r>
+              <a:rPr lang="de-DE" dirty="0">
+                <a:latin typeface="Courier New" panose="02070309020205020404" pitchFamily="49" charset="0"/>
+                <a:cs typeface="Courier New" panose="02070309020205020404" pitchFamily="49" charset="0"/>
+              </a:rPr>
+              <a:t>(); });</a:t>
+            </a:r>
           </a:p>
         </p:txBody>
       </p:sp>
     </p:spTree>
     <p:extLst>
       <p:ext uri="{BB962C8B-B14F-4D97-AF65-F5344CB8AC3E}">
-        <p14:creationId xmlns:p14="http://schemas.microsoft.com/office/powerpoint/2010/main" val="1823296931"/>
+        <p14:creationId xmlns:p14="http://schemas.microsoft.com/office/powerpoint/2010/main" val="3649529016"/>
       </p:ext>
     </p:extLst>
   </p:cSld>
@@ -4284,7 +4390,7 @@
           <p:cNvPr id="2" name="Titel 1">
             <a:extLst>
               <a:ext uri="{FF2B5EF4-FFF2-40B4-BE49-F238E27FC236}">
-                <a16:creationId xmlns="" xmlns:a16="http://schemas.microsoft.com/office/drawing/2014/main" id="{C7132D7C-F38E-49AF-A967-8F275A033C3C}"/>
+                <a16:creationId xmlns:a16="http://schemas.microsoft.com/office/drawing/2014/main" xmlns="" id="{AE92F264-3106-4A6C-9A21-A872BF509D1F}"/>
               </a:ext>
             </a:extLst>
           </p:cNvPr>
@@ -4301,8 +4407,28 @@
           <a:lstStyle/>
           <a:p>
             <a:r>
+              <a:rPr lang="de-DE" dirty="0" err="1"/>
+              <a:t>Timer</a:t>
+            </a:r>
+            <a:r>
+              <a:rPr lang="de-DE" dirty="0"/>
+              <a:t> und </a:t>
+            </a:r>
+            <a:r>
+              <a:rPr lang="de-DE" dirty="0" err="1" smtClean="0"/>
+              <a:t>TimerTask</a:t>
+            </a:r>
+            <a:r>
               <a:rPr lang="de-DE" dirty="0" smtClean="0"/>
-              <a:t>Nebenläufigkeit</a:t>
+              <a:t> (</a:t>
+            </a:r>
+            <a:r>
+              <a:rPr lang="de-DE" dirty="0" err="1" smtClean="0"/>
+              <a:t>TimerTaskDemo</a:t>
+            </a:r>
+            <a:r>
+              <a:rPr lang="de-DE" dirty="0" smtClean="0"/>
+              <a:t>)</a:t>
             </a:r>
             <a:endParaRPr lang="de-DE" dirty="0"/>
           </a:p>
@@ -4313,7 +4439,7 @@
           <p:cNvPr id="3" name="Inhaltsplatzhalter 2">
             <a:extLst>
               <a:ext uri="{FF2B5EF4-FFF2-40B4-BE49-F238E27FC236}">
-                <a16:creationId xmlns="" xmlns:a16="http://schemas.microsoft.com/office/drawing/2014/main" id="{C883700D-EC2C-4D40-98E9-EE3E5C790F48}"/>
+                <a16:creationId xmlns:a16="http://schemas.microsoft.com/office/drawing/2014/main" xmlns="" id="{0465664F-82E4-4870-85F1-D658FBBDAAED}"/>
               </a:ext>
             </a:extLst>
           </p:cNvPr>
@@ -4329,125 +4455,95 @@
           <a:bodyPr/>
           <a:lstStyle/>
           <a:p>
-            <a:pPr indent="0">
-              <a:buNone/>
-            </a:pPr>
-            <a:r>
-              <a:rPr lang="en-US" dirty="0">
-                <a:latin typeface="Courier New" panose="02070309020205020404" pitchFamily="49" charset="0"/>
-                <a:cs typeface="Courier New" panose="02070309020205020404" pitchFamily="49" charset="0"/>
+            <a:r>
+              <a:rPr lang="de-DE" dirty="0" err="1" smtClean="0">
+                <a:latin typeface="Courier New" charset="0"/>
+                <a:ea typeface="Courier New" charset="0"/>
+                <a:cs typeface="Courier New" charset="0"/>
               </a:rPr>
-              <a:t>Thread t = new Thread(() =&gt; </a:t>
-            </a:r>
-            <a:r>
-              <a:rPr lang="en-US" dirty="0" err="1">
-                <a:latin typeface="Courier New" panose="02070309020205020404" pitchFamily="49" charset="0"/>
-                <a:cs typeface="Courier New" panose="02070309020205020404" pitchFamily="49" charset="0"/>
+              <a:t>Java.Util.Timer</a:t>
+            </a:r>
+            <a:r>
+              <a:rPr lang="de-DE" dirty="0" smtClean="0"/>
+              <a:t> erzeugen</a:t>
+            </a:r>
+          </a:p>
+          <a:p>
+            <a:r>
+              <a:rPr lang="de-DE" dirty="0" err="1" smtClean="0">
+                <a:latin typeface="Courier New" charset="0"/>
+                <a:ea typeface="Courier New" charset="0"/>
+                <a:cs typeface="Courier New" charset="0"/>
               </a:rPr>
-              <a:t>DoIt</a:t>
-            </a:r>
-            <a:r>
-              <a:rPr lang="en-US" dirty="0">
-                <a:latin typeface="Courier New" panose="02070309020205020404" pitchFamily="49" charset="0"/>
-                <a:cs typeface="Courier New" panose="02070309020205020404" pitchFamily="49" charset="0"/>
+              <a:t>Java.Util.TimerTask</a:t>
+            </a:r>
+            <a:r>
+              <a:rPr lang="de-DE" dirty="0" smtClean="0"/>
+              <a:t> erzeugen</a:t>
+            </a:r>
+          </a:p>
+          <a:p>
+            <a:r>
+              <a:rPr lang="de-DE" dirty="0" smtClean="0"/>
+              <a:t>Starten z. B. mit </a:t>
+            </a:r>
+            <a:r>
+              <a:rPr lang="de-DE" dirty="0" err="1" smtClean="0">
+                <a:latin typeface="Courier New" charset="0"/>
+                <a:ea typeface="Courier New" charset="0"/>
+                <a:cs typeface="Courier New" charset="0"/>
               </a:rPr>
-              <a:t>() );</a:t>
-            </a:r>
-          </a:p>
-          <a:p>
-            <a:pPr indent="0">
-              <a:buNone/>
-            </a:pPr>
-            <a:r>
-              <a:rPr lang="en-US" dirty="0" err="1">
-                <a:latin typeface="Courier New" panose="02070309020205020404" pitchFamily="49" charset="0"/>
-                <a:cs typeface="Courier New" panose="02070309020205020404" pitchFamily="49" charset="0"/>
+              <a:t>ScheduleAtFixedRate</a:t>
+            </a:r>
+            <a:r>
+              <a:rPr lang="de-DE" dirty="0" smtClean="0">
+                <a:latin typeface="Courier New" charset="0"/>
+                <a:ea typeface="Courier New" charset="0"/>
+                <a:cs typeface="Courier New" charset="0"/>
               </a:rPr>
-              <a:t>t.Start</a:t>
-            </a:r>
-            <a:r>
-              <a:rPr lang="en-US" dirty="0">
-                <a:latin typeface="Courier New" panose="02070309020205020404" pitchFamily="49" charset="0"/>
-                <a:cs typeface="Courier New" panose="02070309020205020404" pitchFamily="49" charset="0"/>
+              <a:t>()</a:t>
+            </a:r>
+          </a:p>
+          <a:p>
+            <a:r>
+              <a:rPr lang="de-DE" dirty="0" smtClean="0">
+                <a:latin typeface="Arial" charset="0"/>
+                <a:ea typeface="Arial" charset="0"/>
+                <a:cs typeface="Arial" charset="0"/>
               </a:rPr>
-              <a:t>();</a:t>
-            </a:r>
-          </a:p>
-          <a:p>
-            <a:pPr indent="0">
-              <a:buNone/>
-            </a:pPr>
-            <a:r>
-              <a:rPr lang="en-US" dirty="0" err="1"/>
-              <a:t>oder</a:t>
-            </a:r>
-            <a:endParaRPr lang="en-US" dirty="0"/>
-          </a:p>
-          <a:p>
-            <a:pPr indent="0">
-              <a:buNone/>
-            </a:pPr>
-            <a:r>
-              <a:rPr lang="en-US" dirty="0">
-                <a:latin typeface="Courier New" panose="02070309020205020404" pitchFamily="49" charset="0"/>
-                <a:cs typeface="Courier New" panose="02070309020205020404" pitchFamily="49" charset="0"/>
+              <a:t>Beenden mit </a:t>
+            </a:r>
+            <a:r>
+              <a:rPr lang="de-DE" dirty="0" err="1" smtClean="0">
+                <a:latin typeface="Courier New" charset="0"/>
+                <a:ea typeface="Courier New" charset="0"/>
+                <a:cs typeface="Courier New" charset="0"/>
               </a:rPr>
-              <a:t>using </a:t>
-            </a:r>
-            <a:r>
-              <a:rPr lang="en-US" dirty="0" err="1">
-                <a:latin typeface="Courier New" panose="02070309020205020404" pitchFamily="49" charset="0"/>
-                <a:cs typeface="Courier New" panose="02070309020205020404" pitchFamily="49" charset="0"/>
+              <a:t>Cancel</a:t>
+            </a:r>
+            <a:r>
+              <a:rPr lang="de-DE" dirty="0" smtClean="0">
+                <a:latin typeface="Courier New" charset="0"/>
+                <a:ea typeface="Courier New" charset="0"/>
+                <a:cs typeface="Courier New" charset="0"/>
               </a:rPr>
-              <a:t>System.Threading.Tasks</a:t>
-            </a:r>
-            <a:r>
-              <a:rPr lang="en-US" dirty="0">
-                <a:latin typeface="Courier New" panose="02070309020205020404" pitchFamily="49" charset="0"/>
-                <a:cs typeface="Courier New" panose="02070309020205020404" pitchFamily="49" charset="0"/>
-              </a:rPr>
-              <a:t>;</a:t>
-            </a:r>
-          </a:p>
-          <a:p>
-            <a:pPr indent="0">
-              <a:buNone/>
-            </a:pPr>
-            <a:r>
-              <a:rPr lang="de-DE" dirty="0" err="1">
-                <a:latin typeface="Courier New" panose="02070309020205020404" pitchFamily="49" charset="0"/>
-                <a:cs typeface="Courier New" panose="02070309020205020404" pitchFamily="49" charset="0"/>
-              </a:rPr>
-              <a:t>Task.Run</a:t>
-            </a:r>
-            <a:r>
-              <a:rPr lang="de-DE" dirty="0">
-                <a:latin typeface="Courier New" panose="02070309020205020404" pitchFamily="49" charset="0"/>
-                <a:cs typeface="Courier New" panose="02070309020205020404" pitchFamily="49" charset="0"/>
-              </a:rPr>
-              <a:t>(() =&gt; { </a:t>
-            </a:r>
-            <a:r>
-              <a:rPr lang="de-DE" dirty="0" err="1">
-                <a:latin typeface="Courier New" panose="02070309020205020404" pitchFamily="49" charset="0"/>
-                <a:cs typeface="Courier New" panose="02070309020205020404" pitchFamily="49" charset="0"/>
-              </a:rPr>
-              <a:t>DoIt</a:t>
-            </a:r>
-            <a:r>
-              <a:rPr lang="de-DE" dirty="0">
-                <a:latin typeface="Courier New" panose="02070309020205020404" pitchFamily="49" charset="0"/>
-                <a:cs typeface="Courier New" panose="02070309020205020404" pitchFamily="49" charset="0"/>
-              </a:rPr>
-              <a:t>(); });</a:t>
-            </a:r>
+              <a:t>()</a:t>
+            </a:r>
+            <a:endParaRPr lang="de-DE" dirty="0">
+              <a:latin typeface="Courier New" charset="0"/>
+              <a:ea typeface="Courier New" charset="0"/>
+              <a:cs typeface="Courier New" charset="0"/>
+            </a:endParaRPr>
+          </a:p>
+          <a:p>
+            <a:endParaRPr lang="de-DE" dirty="0"/>
           </a:p>
         </p:txBody>
       </p:sp>
     </p:spTree>
     <p:extLst>
       <p:ext uri="{BB962C8B-B14F-4D97-AF65-F5344CB8AC3E}">
-        <p14:creationId xmlns:p14="http://schemas.microsoft.com/office/powerpoint/2010/main" val="3649529016"/>
+        <p14:creationId xmlns:p14="http://schemas.microsoft.com/office/powerpoint/2010/main" val="2708726509"/>
       </p:ext>
     </p:extLst>
   </p:cSld>
@@ -4486,7 +4582,7 @@
           <p:cNvPr id="2" name="Titel 1">
             <a:extLst>
               <a:ext uri="{FF2B5EF4-FFF2-40B4-BE49-F238E27FC236}">
-                <a16:creationId xmlns="" xmlns:a16="http://schemas.microsoft.com/office/drawing/2014/main" id="{AE92F264-3106-4A6C-9A21-A872BF509D1F}"/>
+                <a16:creationId xmlns:a16="http://schemas.microsoft.com/office/drawing/2014/main" xmlns="" id="{067E190A-5BAC-4785-8D7E-A00CF93320DF}"/>
               </a:ext>
             </a:extLst>
           </p:cNvPr>
@@ -4503,30 +4599,9 @@
           <a:lstStyle/>
           <a:p>
             <a:r>
-              <a:rPr lang="de-DE" dirty="0" err="1"/>
-              <a:t>Timer</a:t>
-            </a:r>
-            <a:r>
-              <a:rPr lang="de-DE" dirty="0"/>
-              <a:t> und </a:t>
-            </a:r>
-            <a:r>
-              <a:rPr lang="de-DE" dirty="0" err="1" smtClean="0"/>
-              <a:t>TimerTask</a:t>
-            </a:r>
-            <a:r>
-              <a:rPr lang="de-DE" dirty="0" smtClean="0"/>
-              <a:t> (</a:t>
-            </a:r>
-            <a:r>
-              <a:rPr lang="de-DE" dirty="0" err="1" smtClean="0"/>
-              <a:t>TimerTaskDemo</a:t>
-            </a:r>
-            <a:r>
-              <a:rPr lang="de-DE" dirty="0" smtClean="0"/>
-              <a:t>)</a:t>
-            </a:r>
-            <a:endParaRPr lang="de-DE" dirty="0"/>
+              <a:rPr lang="de-DE" dirty="0"/>
+              <a:t>Nutzung des UI-Thread</a:t>
+            </a:r>
           </a:p>
         </p:txBody>
       </p:sp>
@@ -4535,7 +4610,7 @@
           <p:cNvPr id="3" name="Inhaltsplatzhalter 2">
             <a:extLst>
               <a:ext uri="{FF2B5EF4-FFF2-40B4-BE49-F238E27FC236}">
-                <a16:creationId xmlns="" xmlns:a16="http://schemas.microsoft.com/office/drawing/2014/main" id="{0465664F-82E4-4870-85F1-D658FBBDAAED}"/>
+                <a16:creationId xmlns:a16="http://schemas.microsoft.com/office/drawing/2014/main" xmlns="" id="{0C1DB834-D1B6-4D5F-AA5D-FD2923047E04}"/>
               </a:ext>
             </a:extLst>
           </p:cNvPr>
@@ -4551,79 +4626,102 @@
           <a:bodyPr/>
           <a:lstStyle/>
           <a:p>
+            <a:r>
+              <a:rPr lang="de-DE" dirty="0"/>
+              <a:t>Muss für alle Änderungen an der Oberfläche verwendet werden</a:t>
+            </a:r>
+          </a:p>
+          <a:p>
+            <a:r>
+              <a:rPr lang="de-DE" dirty="0"/>
+              <a:t>Geht ganz einfach mit …</a:t>
+            </a:r>
+          </a:p>
+          <a:p>
+            <a:pPr lvl="1"/>
+            <a:r>
+              <a:rPr lang="de-DE" dirty="0" err="1">
+                <a:latin typeface="Courier New" charset="0"/>
+                <a:ea typeface="Courier New" charset="0"/>
+                <a:cs typeface="Courier New" charset="0"/>
+              </a:rPr>
+              <a:t>runOnUiThread</a:t>
+            </a:r>
+            <a:r>
+              <a:rPr lang="de-DE" dirty="0">
+                <a:latin typeface="Courier New" charset="0"/>
+                <a:ea typeface="Courier New" charset="0"/>
+                <a:cs typeface="Courier New" charset="0"/>
+              </a:rPr>
+              <a:t>()</a:t>
+            </a:r>
+            <a:r>
+              <a:rPr lang="de-DE" dirty="0"/>
+              <a:t> der Klasse </a:t>
+            </a:r>
             <a:r>
               <a:rPr lang="de-DE" dirty="0" err="1" smtClean="0">
                 <a:latin typeface="Courier New" charset="0"/>
                 <a:ea typeface="Courier New" charset="0"/>
                 <a:cs typeface="Courier New" charset="0"/>
               </a:rPr>
-              <a:t>Java.Util.Timer</a:t>
-            </a:r>
-            <a:r>
-              <a:rPr lang="de-DE" dirty="0" smtClean="0"/>
-              <a:t> erzeugen</a:t>
-            </a:r>
-          </a:p>
-          <a:p>
+              <a:t>Android.App.Activity</a:t>
+            </a:r>
+            <a:endParaRPr lang="de-DE" dirty="0">
+              <a:latin typeface="Courier New" charset="0"/>
+              <a:ea typeface="Courier New" charset="0"/>
+              <a:cs typeface="Courier New" charset="0"/>
+            </a:endParaRPr>
+          </a:p>
+          <a:p>
+            <a:pPr lvl="1"/>
+            <a:r>
+              <a:rPr lang="de-DE" dirty="0" err="1">
+                <a:latin typeface="Courier New" charset="0"/>
+                <a:ea typeface="Courier New" charset="0"/>
+                <a:cs typeface="Courier New" charset="0"/>
+              </a:rPr>
+              <a:t>post</a:t>
+            </a:r>
+            <a:r>
+              <a:rPr lang="de-DE" dirty="0">
+                <a:latin typeface="Courier New" charset="0"/>
+                <a:ea typeface="Courier New" charset="0"/>
+                <a:cs typeface="Courier New" charset="0"/>
+              </a:rPr>
+              <a:t>()</a:t>
+            </a:r>
+            <a:r>
+              <a:rPr lang="de-DE" dirty="0"/>
+              <a:t> und </a:t>
+            </a:r>
+            <a:r>
+              <a:rPr lang="de-DE" dirty="0" err="1">
+                <a:latin typeface="Courier New" charset="0"/>
+                <a:ea typeface="Courier New" charset="0"/>
+                <a:cs typeface="Courier New" charset="0"/>
+              </a:rPr>
+              <a:t>postDelayed</a:t>
+            </a:r>
+            <a:r>
+              <a:rPr lang="de-DE" dirty="0">
+                <a:latin typeface="Courier New" charset="0"/>
+                <a:ea typeface="Courier New" charset="0"/>
+                <a:cs typeface="Courier New" charset="0"/>
+              </a:rPr>
+              <a:t>()</a:t>
+            </a:r>
+            <a:r>
+              <a:rPr lang="de-DE" dirty="0"/>
+              <a:t> von </a:t>
+            </a:r>
             <a:r>
               <a:rPr lang="de-DE" dirty="0" err="1" smtClean="0">
                 <a:latin typeface="Courier New" charset="0"/>
                 <a:ea typeface="Courier New" charset="0"/>
                 <a:cs typeface="Courier New" charset="0"/>
               </a:rPr>
-              <a:t>Java.Util.TimerTask</a:t>
-            </a:r>
-            <a:r>
-              <a:rPr lang="de-DE" dirty="0" smtClean="0"/>
-              <a:t> erzeugen</a:t>
-            </a:r>
-          </a:p>
-          <a:p>
-            <a:r>
-              <a:rPr lang="de-DE" dirty="0" smtClean="0"/>
-              <a:t>Starten z. B. mit </a:t>
-            </a:r>
-            <a:r>
-              <a:rPr lang="de-DE" dirty="0" err="1" smtClean="0">
-                <a:latin typeface="Courier New" charset="0"/>
-                <a:ea typeface="Courier New" charset="0"/>
-                <a:cs typeface="Courier New" charset="0"/>
-              </a:rPr>
-              <a:t>ScheduleAtFixedRate</a:t>
-            </a:r>
-            <a:r>
-              <a:rPr lang="de-DE" dirty="0" smtClean="0">
-                <a:latin typeface="Courier New" charset="0"/>
-                <a:ea typeface="Courier New" charset="0"/>
-                <a:cs typeface="Courier New" charset="0"/>
-              </a:rPr>
-              <a:t>()</a:t>
-            </a:r>
-          </a:p>
-          <a:p>
-            <a:r>
-              <a:rPr lang="de-DE" dirty="0" smtClean="0">
-                <a:latin typeface="Arial" charset="0"/>
-                <a:ea typeface="Arial" charset="0"/>
-                <a:cs typeface="Arial" charset="0"/>
-              </a:rPr>
-              <a:t>Beenden mit </a:t>
-            </a:r>
-            <a:r>
-              <a:rPr lang="de-DE" dirty="0" err="1" smtClean="0">
-                <a:latin typeface="Courier New" charset="0"/>
-                <a:ea typeface="Courier New" charset="0"/>
-                <a:cs typeface="Courier New" charset="0"/>
-              </a:rPr>
-              <a:t>Cancel</a:t>
-            </a:r>
-            <a:r>
-              <a:rPr lang="de-DE" dirty="0" smtClean="0">
-                <a:latin typeface="Courier New" charset="0"/>
-                <a:ea typeface="Courier New" charset="0"/>
-                <a:cs typeface="Courier New" charset="0"/>
-              </a:rPr>
-              <a:t>()</a:t>
+              <a:t>Android.View.View</a:t>
             </a:r>
             <a:endParaRPr lang="de-DE" dirty="0">
               <a:latin typeface="Courier New" charset="0"/>
@@ -4631,15 +4729,12 @@
               <a:cs typeface="Courier New" charset="0"/>
             </a:endParaRPr>
           </a:p>
-          <a:p>
-            <a:endParaRPr lang="de-DE" dirty="0"/>
-          </a:p>
         </p:txBody>
       </p:sp>
     </p:spTree>
     <p:extLst>
       <p:ext uri="{BB962C8B-B14F-4D97-AF65-F5344CB8AC3E}">
-        <p14:creationId xmlns:p14="http://schemas.microsoft.com/office/powerpoint/2010/main" val="2708726509"/>
+        <p14:creationId xmlns:p14="http://schemas.microsoft.com/office/powerpoint/2010/main" val="1341360385"/>
       </p:ext>
     </p:extLst>
   </p:cSld>
@@ -4678,7 +4773,7 @@
           <p:cNvPr id="2" name="Titel 1">
             <a:extLst>
               <a:ext uri="{FF2B5EF4-FFF2-40B4-BE49-F238E27FC236}">
-                <a16:creationId xmlns="" xmlns:a16="http://schemas.microsoft.com/office/drawing/2014/main" id="{067E190A-5BAC-4785-8D7E-A00CF93320DF}"/>
+                <a16:creationId xmlns:a16="http://schemas.microsoft.com/office/drawing/2014/main" xmlns="" id="{03234785-1ED7-4CD8-AD31-76060DA30230}"/>
               </a:ext>
             </a:extLst>
           </p:cNvPr>
@@ -4695,9 +4790,10 @@
           <a:lstStyle/>
           <a:p>
             <a:r>
-              <a:rPr lang="de-DE" dirty="0"/>
-              <a:t>Nutzung des UI-Thread</a:t>
-            </a:r>
+              <a:rPr lang="de-DE" dirty="0" err="1" smtClean="0"/>
+              <a:t>AsyncTaskDemo</a:t>
+            </a:r>
+            <a:endParaRPr lang="de-DE" dirty="0"/>
           </a:p>
         </p:txBody>
       </p:sp>
@@ -4706,7 +4802,7 @@
           <p:cNvPr id="3" name="Inhaltsplatzhalter 2">
             <a:extLst>
               <a:ext uri="{FF2B5EF4-FFF2-40B4-BE49-F238E27FC236}">
-                <a16:creationId xmlns="" xmlns:a16="http://schemas.microsoft.com/office/drawing/2014/main" id="{0C1DB834-D1B6-4D5F-AA5D-FD2923047E04}"/>
+                <a16:creationId xmlns:a16="http://schemas.microsoft.com/office/drawing/2014/main" xmlns="" id="{20C0159A-2D5A-4D3B-99D4-5C989C7BDB6F}"/>
               </a:ext>
             </a:extLst>
           </p:cNvPr>
@@ -4723,28 +4819,37 @@
           <a:lstStyle/>
           <a:p>
             <a:r>
-              <a:rPr lang="de-DE" dirty="0"/>
-              <a:t>Muss für alle Änderungen an der Oberfläche verwendet werden</a:t>
-            </a:r>
-          </a:p>
-          <a:p>
-            <a:r>
-              <a:rPr lang="de-DE" dirty="0"/>
-              <a:t>Geht ganz einfach mit …</a:t>
-            </a:r>
-          </a:p>
-          <a:p>
-            <a:pPr lvl="1"/>
-            <a:r>
-              <a:rPr lang="de-DE" dirty="0" err="1">
+              <a:rPr lang="de-DE" dirty="0" smtClean="0"/>
+              <a:t>Eigene Klasse von </a:t>
+            </a:r>
+            <a:r>
+              <a:rPr lang="de-DE" dirty="0" err="1" smtClean="0">
                 <a:latin typeface="Courier New" charset="0"/>
                 <a:ea typeface="Courier New" charset="0"/>
                 <a:cs typeface="Courier New" charset="0"/>
               </a:rPr>
-              <a:t>runOnUiThread</a:t>
-            </a:r>
-            <a:r>
-              <a:rPr lang="de-DE" dirty="0">
+              <a:t>Android.OS.AsyncTask</a:t>
+            </a:r>
+            <a:r>
+              <a:rPr lang="de-DE" dirty="0" smtClean="0"/>
+              <a:t> ableiten</a:t>
+            </a:r>
+          </a:p>
+          <a:p>
+            <a:r>
+              <a:rPr lang="de-DE" dirty="0" smtClean="0"/>
+              <a:t>Mindestens </a:t>
+            </a:r>
+            <a:r>
+              <a:rPr lang="de-DE" dirty="0" err="1" smtClean="0">
+                <a:latin typeface="Courier New" charset="0"/>
+                <a:ea typeface="Courier New" charset="0"/>
+                <a:cs typeface="Courier New" charset="0"/>
+              </a:rPr>
+              <a:t>DoInBackground</a:t>
+            </a:r>
+            <a:r>
+              <a:rPr lang="de-DE" dirty="0" smtClean="0">
                 <a:latin typeface="Courier New" charset="0"/>
                 <a:ea typeface="Courier New" charset="0"/>
                 <a:cs typeface="Courier New" charset="0"/>
@@ -4752,8 +4857,14 @@
               <a:t>()</a:t>
             </a:r>
             <a:r>
-              <a:rPr lang="de-DE" dirty="0"/>
-              <a:t> der Klasse </a:t>
+              <a:rPr lang="de-DE" dirty="0" smtClean="0"/>
+              <a:t> implementieren</a:t>
+            </a:r>
+          </a:p>
+          <a:p>
+            <a:r>
+              <a:rPr lang="de-DE" dirty="0" smtClean="0"/>
+              <a:t>Darin regelmäßig </a:t>
             </a:r>
             <a:r>
               <a:rPr lang="de-DE" dirty="0" err="1" smtClean="0">
@@ -4761,26 +4872,10 @@
                 <a:ea typeface="Courier New" charset="0"/>
                 <a:cs typeface="Courier New" charset="0"/>
               </a:rPr>
-              <a:t>Android.App.Activity</a:t>
-            </a:r>
-            <a:endParaRPr lang="de-DE" dirty="0">
-              <a:latin typeface="Courier New" charset="0"/>
-              <a:ea typeface="Courier New" charset="0"/>
-              <a:cs typeface="Courier New" charset="0"/>
-            </a:endParaRPr>
-          </a:p>
-          <a:p>
-            <a:pPr lvl="1"/>
-            <a:r>
-              <a:rPr lang="de-DE" dirty="0" err="1">
-                <a:latin typeface="Courier New" charset="0"/>
-                <a:ea typeface="Courier New" charset="0"/>
-                <a:cs typeface="Courier New" charset="0"/>
-              </a:rPr>
-              <a:t>post</a:t>
-            </a:r>
-            <a:r>
-              <a:rPr lang="de-DE" dirty="0">
+              <a:t>IsCancelled</a:t>
+            </a:r>
+            <a:r>
+              <a:rPr lang="de-DE" dirty="0" smtClean="0">
                 <a:latin typeface="Courier New" charset="0"/>
                 <a:ea typeface="Courier New" charset="0"/>
                 <a:cs typeface="Courier New" charset="0"/>
@@ -4788,19 +4883,25 @@
               <a:t>()</a:t>
             </a:r>
             <a:r>
-              <a:rPr lang="de-DE" dirty="0"/>
-              <a:t> und </a:t>
-            </a:r>
-            <a:r>
-              <a:rPr lang="de-DE" dirty="0" err="1">
+              <a:rPr lang="de-DE" dirty="0" smtClean="0"/>
+              <a:t> aufrufen</a:t>
+            </a:r>
+          </a:p>
+          <a:p>
+            <a:r>
+              <a:rPr lang="de-DE" dirty="0" smtClean="0"/>
+              <a:t>Bei Bedarf </a:t>
+            </a:r>
+            <a:r>
+              <a:rPr lang="de-DE" dirty="0" err="1" smtClean="0">
                 <a:latin typeface="Courier New" charset="0"/>
                 <a:ea typeface="Courier New" charset="0"/>
                 <a:cs typeface="Courier New" charset="0"/>
               </a:rPr>
-              <a:t>postDelayed</a:t>
-            </a:r>
-            <a:r>
-              <a:rPr lang="de-DE" dirty="0">
+              <a:t>OnProgressUpdate</a:t>
+            </a:r>
+            <a:r>
+              <a:rPr lang="de-DE" dirty="0" smtClean="0">
                 <a:latin typeface="Courier New" charset="0"/>
                 <a:ea typeface="Courier New" charset="0"/>
                 <a:cs typeface="Courier New" charset="0"/>
@@ -4808,8 +4909,8 @@
               <a:t>()</a:t>
             </a:r>
             <a:r>
-              <a:rPr lang="de-DE" dirty="0"/>
-              <a:t> von </a:t>
+              <a:rPr lang="de-DE" dirty="0" smtClean="0"/>
+              <a:t> implementieren und in </a:t>
             </a:r>
             <a:r>
               <a:rPr lang="de-DE" dirty="0" err="1" smtClean="0">
@@ -4817,20 +4918,48 @@
                 <a:ea typeface="Courier New" charset="0"/>
                 <a:cs typeface="Courier New" charset="0"/>
               </a:rPr>
-              <a:t>Android.View.View</a:t>
-            </a:r>
-            <a:endParaRPr lang="de-DE" dirty="0">
-              <a:latin typeface="Courier New" charset="0"/>
-              <a:ea typeface="Courier New" charset="0"/>
-              <a:cs typeface="Courier New" charset="0"/>
-            </a:endParaRPr>
+              <a:t>DoInBackground</a:t>
+            </a:r>
+            <a:r>
+              <a:rPr lang="de-DE" dirty="0" smtClean="0">
+                <a:latin typeface="Courier New" charset="0"/>
+                <a:ea typeface="Courier New" charset="0"/>
+                <a:cs typeface="Courier New" charset="0"/>
+              </a:rPr>
+              <a:t>()</a:t>
+            </a:r>
+            <a:r>
+              <a:rPr lang="de-DE" dirty="0" smtClean="0"/>
+              <a:t> die Methode </a:t>
+            </a:r>
+            <a:r>
+              <a:rPr lang="de-DE" dirty="0" err="1" smtClean="0">
+                <a:latin typeface="Courier New" charset="0"/>
+                <a:ea typeface="Courier New" charset="0"/>
+                <a:cs typeface="Courier New" charset="0"/>
+              </a:rPr>
+              <a:t>PublishProgress</a:t>
+            </a:r>
+            <a:r>
+              <a:rPr lang="de-DE" dirty="0" smtClean="0">
+                <a:latin typeface="Courier New" charset="0"/>
+                <a:ea typeface="Courier New" charset="0"/>
+                <a:cs typeface="Courier New" charset="0"/>
+              </a:rPr>
+              <a:t>()</a:t>
+            </a:r>
+            <a:r>
+              <a:rPr lang="de-DE" dirty="0" smtClean="0"/>
+              <a:t> aufrufen</a:t>
+            </a:r>
+            <a:endParaRPr lang="de-DE" dirty="0"/>
           </a:p>
         </p:txBody>
       </p:sp>
     </p:spTree>
     <p:extLst>
       <p:ext uri="{BB962C8B-B14F-4D97-AF65-F5344CB8AC3E}">
-        <p14:creationId xmlns:p14="http://schemas.microsoft.com/office/powerpoint/2010/main" val="1341360385"/>
+        <p14:creationId xmlns:p14="http://schemas.microsoft.com/office/powerpoint/2010/main" val="2515296030"/>
       </p:ext>
     </p:extLst>
   </p:cSld>
@@ -4869,7 +4998,7 @@
           <p:cNvPr id="2" name="Titel 1">
             <a:extLst>
               <a:ext uri="{FF2B5EF4-FFF2-40B4-BE49-F238E27FC236}">
-                <a16:creationId xmlns="" xmlns:a16="http://schemas.microsoft.com/office/drawing/2014/main" id="{03234785-1ED7-4CD8-AD31-76060DA30230}"/>
+                <a16:creationId xmlns:a16="http://schemas.microsoft.com/office/drawing/2014/main" xmlns="" id="{51CF2B99-8491-42F1-AC60-B47238792118}"/>
               </a:ext>
             </a:extLst>
           </p:cNvPr>
@@ -4886,10 +5015,9 @@
           <a:lstStyle/>
           <a:p>
             <a:r>
-              <a:rPr lang="de-DE" dirty="0" err="1" smtClean="0"/>
-              <a:t>AsyncTaskDemo</a:t>
-            </a:r>
-            <a:endParaRPr lang="de-DE" dirty="0"/>
+              <a:rPr lang="de-DE" dirty="0"/>
+              <a:t>Gebundene Services</a:t>
+            </a:r>
           </a:p>
         </p:txBody>
       </p:sp>
@@ -4898,7 +5026,7 @@
           <p:cNvPr id="3" name="Inhaltsplatzhalter 2">
             <a:extLst>
               <a:ext uri="{FF2B5EF4-FFF2-40B4-BE49-F238E27FC236}">
-                <a16:creationId xmlns="" xmlns:a16="http://schemas.microsoft.com/office/drawing/2014/main" id="{20C0159A-2D5A-4D3B-99D4-5C989C7BDB6F}"/>
+                <a16:creationId xmlns:a16="http://schemas.microsoft.com/office/drawing/2014/main" xmlns="" id="{6A078299-3F7D-4D7D-9F9B-B11B9CFC8854}"/>
               </a:ext>
             </a:extLst>
           </p:cNvPr>
@@ -4915,37 +5043,31 @@
           <a:lstStyle/>
           <a:p>
             <a:r>
-              <a:rPr lang="de-DE" dirty="0" smtClean="0"/>
-              <a:t>Eigene Klasse von </a:t>
-            </a:r>
-            <a:r>
-              <a:rPr lang="de-DE" dirty="0" err="1" smtClean="0">
+              <a:rPr lang="de-DE" dirty="0"/>
+              <a:t>Werden für die bidirektionale Kommunikation mit einem oder mehreren Aufrufern verwendet</a:t>
+            </a:r>
+          </a:p>
+          <a:p>
+            <a:r>
+              <a:rPr lang="de-DE" dirty="0"/>
+              <a:t>Stellen ihre Dienste über klassische Serviceoperationen einschließlich Parametern und Rückgabewerten zur Verfügung</a:t>
+            </a:r>
+          </a:p>
+          <a:p>
+            <a:r>
+              <a:rPr lang="de-DE" dirty="0"/>
+              <a:t>Werden gestartet, wenn sich eine andere Anwendungskomponente durch den Aufruf von </a:t>
+            </a:r>
+            <a:r>
+              <a:rPr lang="de-DE" dirty="0" err="1">
                 <a:latin typeface="Courier New" charset="0"/>
                 <a:ea typeface="Courier New" charset="0"/>
                 <a:cs typeface="Courier New" charset="0"/>
               </a:rPr>
-              <a:t>Android.OS.AsyncTask</a:t>
-            </a:r>
-            <a:r>
-              <a:rPr lang="de-DE" dirty="0" smtClean="0"/>
-              <a:t> ableiten</a:t>
-            </a:r>
-          </a:p>
-          <a:p>
-            <a:r>
-              <a:rPr lang="de-DE" dirty="0" smtClean="0"/>
-              <a:t>Mindestens </a:t>
-            </a:r>
-            <a:r>
-              <a:rPr lang="de-DE" dirty="0" err="1" smtClean="0">
-                <a:latin typeface="Courier New" charset="0"/>
-                <a:ea typeface="Courier New" charset="0"/>
-                <a:cs typeface="Courier New" charset="0"/>
-              </a:rPr>
-              <a:t>DoInBackground</a:t>
-            </a:r>
-            <a:r>
-              <a:rPr lang="de-DE" dirty="0" smtClean="0">
+              <a:t>bindService</a:t>
+            </a:r>
+            <a:r>
+              <a:rPr lang="de-DE" dirty="0">
                 <a:latin typeface="Courier New" charset="0"/>
                 <a:ea typeface="Courier New" charset="0"/>
                 <a:cs typeface="Courier New" charset="0"/>
@@ -4953,109 +5075,36 @@
               <a:t>()</a:t>
             </a:r>
             <a:r>
-              <a:rPr lang="de-DE" dirty="0" smtClean="0"/>
-              <a:t> implementieren</a:t>
-            </a:r>
-          </a:p>
-          <a:p>
-            <a:r>
-              <a:rPr lang="de-DE" dirty="0" smtClean="0"/>
-              <a:t>Darin regelmäßig </a:t>
-            </a:r>
-            <a:r>
-              <a:rPr lang="de-DE" dirty="0" err="1" smtClean="0">
-                <a:latin typeface="Courier New" charset="0"/>
-                <a:ea typeface="Courier New" charset="0"/>
-                <a:cs typeface="Courier New" charset="0"/>
-              </a:rPr>
-              <a:t>IsCancelled</a:t>
-            </a:r>
-            <a:r>
-              <a:rPr lang="de-DE" dirty="0" smtClean="0">
-                <a:latin typeface="Courier New" charset="0"/>
-                <a:ea typeface="Courier New" charset="0"/>
-                <a:cs typeface="Courier New" charset="0"/>
-              </a:rPr>
-              <a:t>()</a:t>
-            </a:r>
-            <a:r>
-              <a:rPr lang="de-DE" dirty="0" smtClean="0"/>
-              <a:t> aufrufen</a:t>
-            </a:r>
-          </a:p>
-          <a:p>
-            <a:r>
-              <a:rPr lang="de-DE" dirty="0" smtClean="0"/>
-              <a:t>Bei Bedarf </a:t>
-            </a:r>
-            <a:r>
-              <a:rPr lang="de-DE" dirty="0" err="1" smtClean="0">
-                <a:latin typeface="Courier New" charset="0"/>
-                <a:ea typeface="Courier New" charset="0"/>
-                <a:cs typeface="Courier New" charset="0"/>
-              </a:rPr>
-              <a:t>OnProgressUpdate</a:t>
-            </a:r>
-            <a:r>
-              <a:rPr lang="de-DE" dirty="0" smtClean="0">
-                <a:latin typeface="Courier New" charset="0"/>
-                <a:ea typeface="Courier New" charset="0"/>
-                <a:cs typeface="Courier New" charset="0"/>
-              </a:rPr>
-              <a:t>()</a:t>
-            </a:r>
-            <a:r>
-              <a:rPr lang="de-DE" dirty="0" smtClean="0"/>
-              <a:t> implementieren und in </a:t>
-            </a:r>
-            <a:r>
-              <a:rPr lang="de-DE" dirty="0" err="1" smtClean="0">
-                <a:latin typeface="Courier New" charset="0"/>
-                <a:ea typeface="Courier New" charset="0"/>
-                <a:cs typeface="Courier New" charset="0"/>
-              </a:rPr>
-              <a:t>DoInBackground</a:t>
-            </a:r>
-            <a:r>
-              <a:rPr lang="de-DE" dirty="0" smtClean="0">
-                <a:latin typeface="Courier New" charset="0"/>
-                <a:ea typeface="Courier New" charset="0"/>
-                <a:cs typeface="Courier New" charset="0"/>
-              </a:rPr>
-              <a:t>()</a:t>
-            </a:r>
-            <a:r>
-              <a:rPr lang="de-DE" dirty="0" smtClean="0"/>
-              <a:t> die Methode </a:t>
-            </a:r>
-            <a:r>
-              <a:rPr lang="de-DE" dirty="0" err="1" smtClean="0">
-                <a:latin typeface="Courier New" charset="0"/>
-                <a:ea typeface="Courier New" charset="0"/>
-                <a:cs typeface="Courier New" charset="0"/>
-              </a:rPr>
-              <a:t>PublishProgress</a:t>
-            </a:r>
-            <a:r>
-              <a:rPr lang="de-DE" dirty="0" smtClean="0">
-                <a:latin typeface="Courier New" charset="0"/>
-                <a:ea typeface="Courier New" charset="0"/>
-                <a:cs typeface="Courier New" charset="0"/>
-              </a:rPr>
-              <a:t>()</a:t>
-            </a:r>
-            <a:r>
-              <a:rPr lang="de-DE" dirty="0" smtClean="0"/>
-              <a:t> aufrufen</a:t>
-            </a:r>
-            <a:endParaRPr lang="de-DE" dirty="0"/>
+              <a:rPr lang="de-DE" dirty="0"/>
+              <a:t> an sie bindet</a:t>
+            </a:r>
+          </a:p>
+          <a:p>
+            <a:r>
+              <a:rPr lang="de-DE" dirty="0"/>
+              <a:t>Werden beendet, wenn keine solche Bindung mehr besteht. </a:t>
+            </a:r>
+          </a:p>
+          <a:p>
+            <a:r>
+              <a:rPr lang="de-DE" dirty="0"/>
+              <a:t>Ähneln klassischen </a:t>
+            </a:r>
+            <a:r>
+              <a:rPr lang="de-DE" dirty="0" err="1"/>
+              <a:t>Remoting</a:t>
+            </a:r>
+            <a:r>
+              <a:rPr lang="de-DE" dirty="0"/>
+              <a:t>-Schnittstellen (u. a. weil Aufrufe auch über Prozessgrenzen hinweg möglich sind)</a:t>
+            </a:r>
           </a:p>
         </p:txBody>
       </p:sp>
     </p:spTree>
     <p:extLst>
       <p:ext uri="{BB962C8B-B14F-4D97-AF65-F5344CB8AC3E}">
-        <p14:creationId xmlns:p14="http://schemas.microsoft.com/office/powerpoint/2010/main" val="2515296030"/>
+        <p14:creationId xmlns:p14="http://schemas.microsoft.com/office/powerpoint/2010/main" val="19868841"/>
       </p:ext>
     </p:extLst>
   </p:cSld>
@@ -5094,7 +5143,7 @@
           <p:cNvPr id="2" name="Titel 1">
             <a:extLst>
               <a:ext uri="{FF2B5EF4-FFF2-40B4-BE49-F238E27FC236}">
-                <a16:creationId xmlns="" xmlns:a16="http://schemas.microsoft.com/office/drawing/2014/main" id="{51CF2B99-8491-42F1-AC60-B47238792118}"/>
+                <a16:creationId xmlns:a16="http://schemas.microsoft.com/office/drawing/2014/main" xmlns="" id="{5F3DA215-C693-42B1-A611-50521B7EC8DD}"/>
               </a:ext>
             </a:extLst>
           </p:cNvPr>
@@ -5112,7 +5161,7 @@
           <a:p>
             <a:r>
               <a:rPr lang="de-DE" dirty="0"/>
-              <a:t>Gebundene Services</a:t>
+              <a:t>Gestartete Services</a:t>
             </a:r>
           </a:p>
         </p:txBody>
@@ -5122,7 +5171,7 @@
           <p:cNvPr id="3" name="Inhaltsplatzhalter 2">
             <a:extLst>
               <a:ext uri="{FF2B5EF4-FFF2-40B4-BE49-F238E27FC236}">
-                <a16:creationId xmlns="" xmlns:a16="http://schemas.microsoft.com/office/drawing/2014/main" id="{6A078299-3F7D-4D7D-9F9B-B11B9CFC8854}"/>
+                <a16:creationId xmlns:a16="http://schemas.microsoft.com/office/drawing/2014/main" xmlns="" id="{372DFFD4-697B-4F32-AC0A-600B7028E099}"/>
               </a:ext>
             </a:extLst>
           </p:cNvPr>
@@ -5140,19 +5189,31 @@
           <a:p>
             <a:r>
               <a:rPr lang="de-DE" dirty="0"/>
-              <a:t>Werden für die bidirektionale Kommunikation mit einem oder mehreren Aufrufern verwendet</a:t>
-            </a:r>
-          </a:p>
-          <a:p>
-            <a:r>
-              <a:rPr lang="de-DE" dirty="0"/>
-              <a:t>Stellen ihre Dienste über klassische Serviceoperationen einschließlich Parametern und Rückgabewerten zur Verfügung</a:t>
-            </a:r>
-          </a:p>
-          <a:p>
-            <a:r>
-              <a:rPr lang="de-DE" dirty="0"/>
-              <a:t>Werden gestartet, wenn sich eine andere Anwendungskomponente durch den Aufruf von </a:t>
+              <a:t>Führen üblicherweise genau eine Operation aus (z. B. Up- oder Download von Dateien)</a:t>
+            </a:r>
+          </a:p>
+          <a:p>
+            <a:r>
+              <a:rPr lang="de-DE" dirty="0"/>
+              <a:t>Können beliebig lange im Hintergrund laufen</a:t>
+            </a:r>
+          </a:p>
+          <a:p>
+            <a:r>
+              <a:rPr lang="de-DE" dirty="0"/>
+              <a:t>Bleiben auch dann aktiv, wenn die aufrufwende Komponente zerstört wird</a:t>
+            </a:r>
+          </a:p>
+          <a:p>
+            <a:r>
+              <a:rPr lang="de-DE" dirty="0"/>
+              <a:t>Sollten sich nach dem Abschluss der Operation selbst beenden</a:t>
+            </a:r>
+          </a:p>
+          <a:p>
+            <a:r>
+              <a:rPr lang="de-DE" dirty="0"/>
+              <a:t>Werden explizit von anderen Anwendungskomponenten mittels </a:t>
             </a:r>
             <a:r>
               <a:rPr lang="de-DE" dirty="0" err="1">
@@ -5160,7 +5221,7 @@
                 <a:ea typeface="Courier New" charset="0"/>
                 <a:cs typeface="Courier New" charset="0"/>
               </a:rPr>
-              <a:t>bindService</a:t>
+              <a:t>startService</a:t>
             </a:r>
             <a:r>
               <a:rPr lang="de-DE" dirty="0">
@@ -5172,27 +5233,13 @@
             </a:r>
             <a:r>
               <a:rPr lang="de-DE" dirty="0"/>
-              <a:t> an sie bindet</a:t>
-            </a:r>
-          </a:p>
-          <a:p>
-            <a:r>
-              <a:rPr lang="de-DE" dirty="0"/>
-              <a:t>Werden beendet, wenn keine solche Bindung mehr besteht. </a:t>
-            </a:r>
-          </a:p>
-          <a:p>
-            <a:r>
-              <a:rPr lang="de-DE" dirty="0"/>
-              <a:t>Ähneln klassischen </a:t>
-            </a:r>
-            <a:r>
-              <a:rPr lang="de-DE" dirty="0" err="1"/>
-              <a:t>Remoting</a:t>
-            </a:r>
-            <a:r>
-              <a:rPr lang="de-DE" dirty="0"/>
-              <a:t>-Schnittstellen (u. a. weil Aufrufe auch über Prozessgrenzen hinweg möglich sind)</a:t>
+              <a:t> gestartet</a:t>
+            </a:r>
+          </a:p>
+          <a:p>
+            <a:r>
+              <a:rPr lang="de-DE" dirty="0"/>
+              <a:t>Geben kein Ergebnis direkt an den Aufrufer zurück</a:t>
             </a:r>
           </a:p>
         </p:txBody>
@@ -5200,7 +5247,7 @@
     </p:spTree>
     <p:extLst>
       <p:ext uri="{BB962C8B-B14F-4D97-AF65-F5344CB8AC3E}">
-        <p14:creationId xmlns:p14="http://schemas.microsoft.com/office/powerpoint/2010/main" val="19868841"/>
+        <p14:creationId xmlns:p14="http://schemas.microsoft.com/office/powerpoint/2010/main" val="955830019"/>
       </p:ext>
     </p:extLst>
   </p:cSld>
@@ -5239,7 +5286,7 @@
           <p:cNvPr id="2" name="Titel 1">
             <a:extLst>
               <a:ext uri="{FF2B5EF4-FFF2-40B4-BE49-F238E27FC236}">
-                <a16:creationId xmlns="" xmlns:a16="http://schemas.microsoft.com/office/drawing/2014/main" id="{5F3DA215-C693-42B1-A611-50521B7EC8DD}"/>
+                <a16:creationId xmlns:a16="http://schemas.microsoft.com/office/drawing/2014/main" xmlns="" id="{01D1207A-FFB5-429C-BC30-3881E84212E2}"/>
               </a:ext>
             </a:extLst>
           </p:cNvPr>
@@ -5256,9 +5303,10 @@
           <a:lstStyle/>
           <a:p>
             <a:r>
-              <a:rPr lang="de-DE" dirty="0"/>
-              <a:t>Gestartete Services</a:t>
-            </a:r>
+              <a:rPr lang="de-DE" dirty="0" err="1"/>
+              <a:t>StartedServiceDemo</a:t>
+            </a:r>
+            <a:endParaRPr lang="de-DE" dirty="0"/>
           </a:p>
         </p:txBody>
       </p:sp>
@@ -5267,7 +5315,7 @@
           <p:cNvPr id="3" name="Inhaltsplatzhalter 2">
             <a:extLst>
               <a:ext uri="{FF2B5EF4-FFF2-40B4-BE49-F238E27FC236}">
-                <a16:creationId xmlns="" xmlns:a16="http://schemas.microsoft.com/office/drawing/2014/main" id="{372DFFD4-697B-4F32-AC0A-600B7028E099}"/>
+                <a16:creationId xmlns:a16="http://schemas.microsoft.com/office/drawing/2014/main" xmlns="" id="{6860374A-E820-4FBC-8DF4-C225867A3AB6}"/>
               </a:ext>
             </a:extLst>
           </p:cNvPr>
@@ -5284,43 +5332,37 @@
           <a:lstStyle/>
           <a:p>
             <a:r>
-              <a:rPr lang="de-DE" dirty="0"/>
-              <a:t>Führen üblicherweise genau eine Operation aus (z. B. Up- oder Download von Dateien)</a:t>
-            </a:r>
-          </a:p>
-          <a:p>
-            <a:r>
-              <a:rPr lang="de-DE" dirty="0"/>
-              <a:t>Können beliebig lange im Hintergrund laufen</a:t>
-            </a:r>
-          </a:p>
-          <a:p>
-            <a:r>
-              <a:rPr lang="de-DE" dirty="0"/>
-              <a:t>Bleiben auch dann aktiv, wenn die aufrufwende Komponente zerstört wird</a:t>
-            </a:r>
-          </a:p>
-          <a:p>
-            <a:r>
-              <a:rPr lang="de-DE" dirty="0"/>
-              <a:t>Sollten sich nach dem Abschluss der Operation selbst beenden</a:t>
-            </a:r>
-          </a:p>
-          <a:p>
-            <a:r>
-              <a:rPr lang="de-DE" dirty="0"/>
-              <a:t>Werden explizit von anderen Anwendungskomponenten mittels </a:t>
-            </a:r>
-            <a:r>
-              <a:rPr lang="de-DE" dirty="0" err="1">
+              <a:rPr lang="de-DE" dirty="0" smtClean="0"/>
+              <a:t>Eigenen Service z. B. von </a:t>
+            </a:r>
+            <a:r>
+              <a:rPr lang="de-DE" dirty="0" err="1" smtClean="0">
                 <a:latin typeface="Courier New" charset="0"/>
                 <a:ea typeface="Courier New" charset="0"/>
                 <a:cs typeface="Courier New" charset="0"/>
               </a:rPr>
-              <a:t>startService</a:t>
-            </a:r>
-            <a:r>
-              <a:rPr lang="de-DE" dirty="0">
+              <a:t>Android.App.IntentService</a:t>
+            </a:r>
+            <a:r>
+              <a:rPr lang="de-DE" dirty="0" smtClean="0"/>
+              <a:t> ab leiten</a:t>
+            </a:r>
+          </a:p>
+          <a:p>
+            <a:r>
+              <a:rPr lang="de-DE" dirty="0" smtClean="0"/>
+              <a:t>Methode </a:t>
+            </a:r>
+            <a:r>
+              <a:rPr lang="de-DE" dirty="0" err="1" smtClean="0">
+                <a:latin typeface="Courier New" charset="0"/>
+                <a:ea typeface="Courier New" charset="0"/>
+                <a:cs typeface="Courier New" charset="0"/>
+              </a:rPr>
+              <a:t>OnHandleIntent</a:t>
+            </a:r>
+            <a:r>
+              <a:rPr lang="de-DE" dirty="0" smtClean="0">
                 <a:latin typeface="Courier New" charset="0"/>
                 <a:ea typeface="Courier New" charset="0"/>
                 <a:cs typeface="Courier New" charset="0"/>
@@ -5328,22 +5370,72 @@
               <a:t>()</a:t>
             </a:r>
             <a:r>
-              <a:rPr lang="de-DE" dirty="0"/>
-              <a:t> gestartet</a:t>
-            </a:r>
-          </a:p>
-          <a:p>
-            <a:r>
-              <a:rPr lang="de-DE" dirty="0"/>
-              <a:t>Geben kein Ergebnis direkt an den Aufrufer zurück</a:t>
-            </a:r>
+              <a:rPr lang="de-DE" dirty="0" smtClean="0"/>
+              <a:t> implementieren</a:t>
+            </a:r>
+          </a:p>
+          <a:p>
+            <a:r>
+              <a:rPr lang="de-DE" dirty="0" smtClean="0"/>
+              <a:t>In </a:t>
+            </a:r>
+            <a:r>
+              <a:rPr lang="de-DE" dirty="0" err="1" smtClean="0">
+                <a:latin typeface="Courier New" charset="0"/>
+                <a:ea typeface="Courier New" charset="0"/>
+                <a:cs typeface="Courier New" charset="0"/>
+              </a:rPr>
+              <a:t>OnHandleIntent</a:t>
+            </a:r>
+            <a:r>
+              <a:rPr lang="de-DE" dirty="0" smtClean="0">
+                <a:latin typeface="Courier New" charset="0"/>
+                <a:ea typeface="Courier New" charset="0"/>
+                <a:cs typeface="Courier New" charset="0"/>
+              </a:rPr>
+              <a:t>()</a:t>
+            </a:r>
+            <a:r>
+              <a:rPr lang="de-DE" dirty="0" smtClean="0"/>
+              <a:t> Ausstiegsbedingung vorsehen</a:t>
+            </a:r>
+          </a:p>
+          <a:p>
+            <a:r>
+              <a:rPr lang="de-DE" dirty="0" smtClean="0"/>
+              <a:t>Ggf. </a:t>
+            </a:r>
+            <a:r>
+              <a:rPr lang="de-DE" dirty="0" err="1" smtClean="0">
+                <a:latin typeface="Courier New" charset="0"/>
+                <a:ea typeface="Courier New" charset="0"/>
+                <a:cs typeface="Courier New" charset="0"/>
+              </a:rPr>
+              <a:t>OnDestroy</a:t>
+            </a:r>
+            <a:r>
+              <a:rPr lang="de-DE" dirty="0" smtClean="0">
+                <a:latin typeface="Courier New" charset="0"/>
+                <a:ea typeface="Courier New" charset="0"/>
+                <a:cs typeface="Courier New" charset="0"/>
+              </a:rPr>
+              <a:t>()</a:t>
+            </a:r>
+            <a:r>
+              <a:rPr lang="de-DE" dirty="0" smtClean="0"/>
+              <a:t> implementieren und dort Austrittsbedingung setzen</a:t>
+            </a:r>
+            <a:endParaRPr lang="de-DE" dirty="0"/>
+          </a:p>
+          <a:p>
+            <a:endParaRPr lang="de-DE" dirty="0"/>
           </a:p>
         </p:txBody>
       </p:sp>
     </p:spTree>
     <p:extLst>
       <p:ext uri="{BB962C8B-B14F-4D97-AF65-F5344CB8AC3E}">
-        <p14:creationId xmlns:p14="http://schemas.microsoft.com/office/powerpoint/2010/main" val="955830019"/>
+        <p14:creationId xmlns:p14="http://schemas.microsoft.com/office/powerpoint/2010/main" val="1503693138"/>
       </p:ext>
     </p:extLst>
   </p:cSld>
@@ -5382,7 +5474,7 @@
           <p:cNvPr id="2" name="Titel 1">
             <a:extLst>
               <a:ext uri="{FF2B5EF4-FFF2-40B4-BE49-F238E27FC236}">
-                <a16:creationId xmlns="" xmlns:a16="http://schemas.microsoft.com/office/drawing/2014/main" id="{01D1207A-FFB5-429C-BC30-3881E84212E2}"/>
+                <a16:creationId xmlns:a16="http://schemas.microsoft.com/office/drawing/2014/main" xmlns="" id="{CCF19AE8-BE90-4B95-8BCA-EF7925AD3CDE}"/>
               </a:ext>
             </a:extLst>
           </p:cNvPr>
@@ -5400,7 +5492,7 @@
           <a:p>
             <a:r>
               <a:rPr lang="de-DE" dirty="0" err="1"/>
-              <a:t>StartedServiceDemo</a:t>
+              <a:t>AlarmDemo</a:t>
             </a:r>
             <a:endParaRPr lang="de-DE" dirty="0"/>
           </a:p>
@@ -5411,7 +5503,7 @@
           <p:cNvPr id="3" name="Inhaltsplatzhalter 2">
             <a:extLst>
               <a:ext uri="{FF2B5EF4-FFF2-40B4-BE49-F238E27FC236}">
-                <a16:creationId xmlns="" xmlns:a16="http://schemas.microsoft.com/office/drawing/2014/main" id="{6860374A-E820-4FBC-8DF4-C225867A3AB6}"/>
+                <a16:creationId xmlns:a16="http://schemas.microsoft.com/office/drawing/2014/main" xmlns="" id="{66D9716B-E669-4268-97D9-930307518867}"/>
               </a:ext>
             </a:extLst>
           </p:cNvPr>
@@ -5429,7 +5521,7 @@
           <a:p>
             <a:r>
               <a:rPr lang="de-DE" dirty="0" smtClean="0"/>
-              <a:t>Eigenen Service z. B. von </a:t>
+              <a:t>Eigene Klasse von </a:t>
             </a:r>
             <a:r>
               <a:rPr lang="de-DE" dirty="0" err="1" smtClean="0">
@@ -5437,11 +5529,11 @@
                 <a:ea typeface="Courier New" charset="0"/>
                 <a:cs typeface="Courier New" charset="0"/>
               </a:rPr>
-              <a:t>Android.App.IntentService</a:t>
+              <a:t>Android.Content.BroadcastReceiver</a:t>
             </a:r>
             <a:r>
               <a:rPr lang="de-DE" dirty="0" smtClean="0"/>
-              <a:t> ab leiten</a:t>
+              <a:t> ableiten</a:t>
             </a:r>
           </a:p>
           <a:p>
@@ -5455,7 +5547,7 @@
                 <a:ea typeface="Courier New" charset="0"/>
                 <a:cs typeface="Courier New" charset="0"/>
               </a:rPr>
-              <a:t>OnHandleIntent</a:t>
+              <a:t>OnReceive</a:t>
             </a:r>
             <a:r>
               <a:rPr lang="de-DE" dirty="0" smtClean="0">
@@ -5472,16 +5564,12 @@
           </a:p>
           <a:p>
             <a:r>
-              <a:rPr lang="de-DE" dirty="0" smtClean="0"/>
-              <a:t>In </a:t>
-            </a:r>
-            <a:r>
               <a:rPr lang="de-DE" dirty="0" err="1" smtClean="0">
                 <a:latin typeface="Courier New" charset="0"/>
                 <a:ea typeface="Courier New" charset="0"/>
                 <a:cs typeface="Courier New" charset="0"/>
               </a:rPr>
-              <a:t>OnHandleIntent</a:t>
+              <a:t>Android.OS.PowerManager</a:t>
             </a:r>
             <a:r>
               <a:rPr lang="de-DE" dirty="0" smtClean="0">
@@ -5489,41 +5577,50 @@
                 <a:ea typeface="Courier New" charset="0"/>
                 <a:cs typeface="Courier New" charset="0"/>
               </a:rPr>
-              <a:t>()</a:t>
+              <a:t>-Instanz</a:t>
             </a:r>
             <a:r>
               <a:rPr lang="de-DE" dirty="0" smtClean="0"/>
-              <a:t> Ausstiegsbedingung vorsehen</a:t>
-            </a:r>
-          </a:p>
-          <a:p>
-            <a:r>
-              <a:rPr lang="de-DE" dirty="0" smtClean="0"/>
-              <a:t>Ggf. </a:t>
-            </a:r>
+              <a:t> holen</a:t>
+            </a:r>
+          </a:p>
+          <a:p>
             <a:r>
               <a:rPr lang="de-DE" dirty="0" err="1" smtClean="0">
                 <a:latin typeface="Courier New" charset="0"/>
                 <a:ea typeface="Courier New" charset="0"/>
                 <a:cs typeface="Courier New" charset="0"/>
               </a:rPr>
-              <a:t>OnDestroy</a:t>
-            </a:r>
-            <a:r>
-              <a:rPr lang="de-DE" dirty="0" smtClean="0">
+              <a:t>WakeLock</a:t>
+            </a:r>
+            <a:r>
+              <a:rPr lang="de-DE" dirty="0" smtClean="0"/>
+              <a:t> erzeugen</a:t>
+            </a:r>
+          </a:p>
+          <a:p>
+            <a:r>
+              <a:rPr lang="de-DE" dirty="0" smtClean="0"/>
+              <a:t>Service starten</a:t>
+            </a:r>
+          </a:p>
+          <a:p>
+            <a:r>
+              <a:rPr lang="de-DE" dirty="0" smtClean="0"/>
+              <a:t>Nach Beendigung des Service </a:t>
+            </a:r>
+            <a:r>
+              <a:rPr lang="de-DE" dirty="0" err="1" smtClean="0">
                 <a:latin typeface="Courier New" charset="0"/>
                 <a:ea typeface="Courier New" charset="0"/>
                 <a:cs typeface="Courier New" charset="0"/>
               </a:rPr>
-              <a:t>()</a:t>
+              <a:t>WakerLock</a:t>
             </a:r>
             <a:r>
               <a:rPr lang="de-DE" dirty="0" smtClean="0"/>
-              <a:t> implementieren und dort Austrittsbedingung setzen</a:t>
-            </a:r>
-            <a:endParaRPr lang="de-DE" dirty="0"/>
-          </a:p>
-          <a:p>
+              <a:t> freigeben</a:t>
+            </a:r>
             <a:endParaRPr lang="de-DE" dirty="0"/>
           </a:p>
         </p:txBody>
@@ -5531,7 +5628,7 @@
     </p:spTree>
     <p:extLst>
       <p:ext uri="{BB962C8B-B14F-4D97-AF65-F5344CB8AC3E}">
-        <p14:creationId xmlns:p14="http://schemas.microsoft.com/office/powerpoint/2010/main" val="1503693138"/>
+        <p14:creationId xmlns:p14="http://schemas.microsoft.com/office/powerpoint/2010/main" val="494415678"/>
       </p:ext>
     </p:extLst>
   </p:cSld>
@@ -5625,46 +5722,7 @@
           <a:p>
             <a:r>
               <a:rPr lang="de-DE" dirty="0" smtClean="0"/>
-              <a:t>Gute Apps schreiben </a:t>
-            </a:r>
-            <a:r>
-              <a:rPr lang="de-DE" dirty="0" smtClean="0"/>
-              <a:t>heißt: </a:t>
-            </a:r>
-            <a:r>
-              <a:rPr lang="de-DE" dirty="0" smtClean="0"/>
-              <a:t>die Plattform kennen und richtig </a:t>
-            </a:r>
-            <a:r>
-              <a:rPr lang="de-DE" dirty="0" smtClean="0"/>
-              <a:t>einsetzen</a:t>
-            </a:r>
-          </a:p>
-          <a:p>
-            <a:r>
-              <a:rPr lang="de-DE" dirty="0"/>
-              <a:t>Herausforderungen:</a:t>
-            </a:r>
-          </a:p>
-          <a:p>
-            <a:pPr lvl="1"/>
-            <a:r>
-              <a:rPr lang="de-DE" dirty="0"/>
-              <a:t>Die Plattform ist 10 Jahre alt</a:t>
-            </a:r>
-          </a:p>
-          <a:p>
-            <a:pPr lvl="1"/>
-            <a:r>
-              <a:rPr lang="de-DE" dirty="0"/>
-              <a:t>Vieles ist gereift... einiges in die Jahre gekommen</a:t>
-            </a:r>
-          </a:p>
-          <a:p>
-            <a:pPr lvl="1"/>
-            <a:r>
-              <a:rPr lang="de-DE" dirty="0"/>
-              <a:t>Oft gibt es nicht einen Weg, sondern viele</a:t>
+              <a:t>Gute Apps schreiben heißt: die Plattform kennen und richtig einsetzen</a:t>
             </a:r>
           </a:p>
           <a:p>
@@ -5714,7 +5772,7 @@
           <p:cNvPr id="2" name="Titel 1">
             <a:extLst>
               <a:ext uri="{FF2B5EF4-FFF2-40B4-BE49-F238E27FC236}">
-                <a16:creationId xmlns="" xmlns:a16="http://schemas.microsoft.com/office/drawing/2014/main" id="{CCF19AE8-BE90-4B95-8BCA-EF7925AD3CDE}"/>
+                <a16:creationId xmlns:a16="http://schemas.microsoft.com/office/drawing/2014/main" xmlns="" id="{7E697613-A620-4D3D-99DF-DEEAA83D5D1F}"/>
               </a:ext>
             </a:extLst>
           </p:cNvPr>
@@ -5731,10 +5789,9 @@
           <a:lstStyle/>
           <a:p>
             <a:r>
-              <a:rPr lang="de-DE" dirty="0" err="1"/>
-              <a:t>AlarmDemo</a:t>
-            </a:r>
-            <a:endParaRPr lang="de-DE" dirty="0"/>
+              <a:rPr lang="de-DE" dirty="0"/>
+              <a:t>Erhöhter Batterieverbrauch und Performanceengpässe</a:t>
+            </a:r>
           </a:p>
         </p:txBody>
       </p:sp>
@@ -5743,7 +5800,7 @@
           <p:cNvPr id="3" name="Inhaltsplatzhalter 2">
             <a:extLst>
               <a:ext uri="{FF2B5EF4-FFF2-40B4-BE49-F238E27FC236}">
-                <a16:creationId xmlns="" xmlns:a16="http://schemas.microsoft.com/office/drawing/2014/main" id="{66D9716B-E669-4268-97D9-930307518867}"/>
+                <a16:creationId xmlns:a16="http://schemas.microsoft.com/office/drawing/2014/main" xmlns="" id="{FB5190AA-9C9B-433B-A104-3C2B56A53DDF}"/>
               </a:ext>
             </a:extLst>
           </p:cNvPr>
@@ -5761,106 +5818,42 @@
           <a:p>
             <a:r>
               <a:rPr lang="de-DE" dirty="0" smtClean="0"/>
-              <a:t>Eigene Klasse von </a:t>
-            </a:r>
-            <a:r>
-              <a:rPr lang="de-DE" dirty="0" err="1" smtClean="0">
-                <a:latin typeface="Courier New" charset="0"/>
-                <a:ea typeface="Courier New" charset="0"/>
-                <a:cs typeface="Courier New" charset="0"/>
-              </a:rPr>
-              <a:t>Android.Content.BroadcastReceiver</a:t>
+              <a:t>In der Vergangenheit haben Entwickler gestartete Services oft falsch verwendet </a:t>
+            </a:r>
+            <a:r>
+              <a:rPr lang="mr-IN" dirty="0" smtClean="0"/>
+              <a:t>–</a:t>
             </a:r>
             <a:r>
               <a:rPr lang="de-DE" dirty="0" smtClean="0"/>
-              <a:t> ableiten</a:t>
+              <a:t> zum Beispiel für wiederkehrende Wartungsarbeiten</a:t>
+            </a:r>
+            <a:endParaRPr lang="de-DE" dirty="0"/>
+          </a:p>
+          <a:p>
+            <a:r>
+              <a:rPr lang="de-DE" dirty="0"/>
+              <a:t>Android 8 wird Hintergrundaktivitäten einschränken</a:t>
             </a:r>
           </a:p>
           <a:p>
             <a:r>
               <a:rPr lang="de-DE" dirty="0" smtClean="0"/>
-              <a:t>Methode </a:t>
-            </a:r>
-            <a:r>
-              <a:rPr lang="de-DE" dirty="0" err="1" smtClean="0">
-                <a:latin typeface="Courier New" charset="0"/>
-                <a:ea typeface="Courier New" charset="0"/>
-                <a:cs typeface="Courier New" charset="0"/>
-              </a:rPr>
-              <a:t>OnReceive</a:t>
-            </a:r>
-            <a:r>
-              <a:rPr lang="de-DE" dirty="0" smtClean="0">
-                <a:latin typeface="Courier New" charset="0"/>
-                <a:ea typeface="Courier New" charset="0"/>
-                <a:cs typeface="Courier New" charset="0"/>
-              </a:rPr>
-              <a:t>()</a:t>
+              <a:t>Google </a:t>
+            </a:r>
+            <a:r>
+              <a:rPr lang="de-DE" dirty="0"/>
+              <a:t>möchte, dass Entwickler für solche Aufgaben geplante Services </a:t>
             </a:r>
             <a:r>
               <a:rPr lang="de-DE" dirty="0" smtClean="0"/>
-              <a:t> implementieren</a:t>
-            </a:r>
-          </a:p>
-          <a:p>
-            <a:r>
-              <a:rPr lang="de-DE" dirty="0" err="1" smtClean="0">
-                <a:latin typeface="Courier New" charset="0"/>
-                <a:ea typeface="Courier New" charset="0"/>
-                <a:cs typeface="Courier New" charset="0"/>
-              </a:rPr>
-              <a:t>Android.OS.PowerManager</a:t>
-            </a:r>
-            <a:r>
-              <a:rPr lang="de-DE" dirty="0" smtClean="0">
-                <a:latin typeface="Courier New" charset="0"/>
-                <a:ea typeface="Courier New" charset="0"/>
-                <a:cs typeface="Courier New" charset="0"/>
-              </a:rPr>
-              <a:t>-Instanz</a:t>
-            </a:r>
-            <a:r>
-              <a:rPr lang="de-DE" dirty="0" smtClean="0"/>
-              <a:t> holen</a:t>
-            </a:r>
-          </a:p>
-          <a:p>
-            <a:r>
-              <a:rPr lang="de-DE" dirty="0" err="1" smtClean="0">
-                <a:latin typeface="Courier New" charset="0"/>
-                <a:ea typeface="Courier New" charset="0"/>
-                <a:cs typeface="Courier New" charset="0"/>
-              </a:rPr>
-              <a:t>WakeLock</a:t>
-            </a:r>
-            <a:r>
-              <a:rPr lang="de-DE" dirty="0" smtClean="0"/>
-              <a:t> erzeugen</a:t>
-            </a:r>
-          </a:p>
-          <a:p>
-            <a:r>
-              <a:rPr lang="de-DE" dirty="0" smtClean="0"/>
-              <a:t>Service starten</a:t>
-            </a:r>
-          </a:p>
-          <a:p>
-            <a:r>
-              <a:rPr lang="de-DE" dirty="0" smtClean="0"/>
-              <a:t>Nach Beendigung des Service </a:t>
-            </a:r>
-            <a:r>
-              <a:rPr lang="de-DE" dirty="0" err="1" smtClean="0">
-                <a:latin typeface="Courier New" charset="0"/>
-                <a:ea typeface="Courier New" charset="0"/>
-                <a:cs typeface="Courier New" charset="0"/>
-              </a:rPr>
-              <a:t>WakerLock</a:t>
-            </a:r>
-            <a:r>
-              <a:rPr lang="de-DE" dirty="0" smtClean="0"/>
-              <a:t> freigeben</a:t>
-            </a:r>
+              <a:t>verwenden</a:t>
+            </a:r>
+          </a:p>
+          <a:p>
+            <a:pPr indent="0">
+              <a:buNone/>
+            </a:pPr>
             <a:endParaRPr lang="de-DE" dirty="0"/>
           </a:p>
         </p:txBody>
@@ -5868,7 +5861,7 @@
     </p:spTree>
     <p:extLst>
       <p:ext uri="{BB962C8B-B14F-4D97-AF65-F5344CB8AC3E}">
-        <p14:creationId xmlns:p14="http://schemas.microsoft.com/office/powerpoint/2010/main" val="494415678"/>
+        <p14:creationId xmlns:p14="http://schemas.microsoft.com/office/powerpoint/2010/main" val="1530569348"/>
       </p:ext>
     </p:extLst>
   </p:cSld>
@@ -5907,7 +5900,7 @@
           <p:cNvPr id="2" name="Titel 1">
             <a:extLst>
               <a:ext uri="{FF2B5EF4-FFF2-40B4-BE49-F238E27FC236}">
-                <a16:creationId xmlns="" xmlns:a16="http://schemas.microsoft.com/office/drawing/2014/main" id="{7E697613-A620-4D3D-99DF-DEEAA83D5D1F}"/>
+                <a16:creationId xmlns:a16="http://schemas.microsoft.com/office/drawing/2014/main" xmlns="" id="{D62218AF-BF92-4795-841F-CAF75B11C71B}"/>
               </a:ext>
             </a:extLst>
           </p:cNvPr>
@@ -5925,7 +5918,7 @@
           <a:p>
             <a:r>
               <a:rPr lang="de-DE" dirty="0"/>
-              <a:t>Erhöhter Batterieverbrauch und Performanceengpässe</a:t>
+              <a:t>Geplante Services</a:t>
             </a:r>
           </a:p>
         </p:txBody>
@@ -5935,7 +5928,7 @@
           <p:cNvPr id="3" name="Inhaltsplatzhalter 2">
             <a:extLst>
               <a:ext uri="{FF2B5EF4-FFF2-40B4-BE49-F238E27FC236}">
-                <a16:creationId xmlns="" xmlns:a16="http://schemas.microsoft.com/office/drawing/2014/main" id="{FB5190AA-9C9B-433B-A104-3C2B56A53DDF}"/>
+                <a16:creationId xmlns:a16="http://schemas.microsoft.com/office/drawing/2014/main" xmlns="" id="{46E9461E-08FE-4113-8BF1-A79B5B1D63D5}"/>
               </a:ext>
             </a:extLst>
           </p:cNvPr>
@@ -5952,51 +5945,34 @@
           <a:lstStyle/>
           <a:p>
             <a:r>
-              <a:rPr lang="de-DE" dirty="0" smtClean="0"/>
-              <a:t>In der Vergangenheit haben Entwickler gestartete Services oft falsch verwendet </a:t>
-            </a:r>
-            <a:r>
-              <a:rPr lang="mr-IN" dirty="0" smtClean="0"/>
-              <a:t>–</a:t>
-            </a:r>
-            <a:r>
-              <a:rPr lang="de-DE" dirty="0" smtClean="0"/>
-              <a:t> zum Beispiel für wiederkehrende Wartungsarbeiten</a:t>
-            </a:r>
-            <a:endParaRPr lang="de-DE" dirty="0"/>
-          </a:p>
-          <a:p>
-            <a:r>
-              <a:rPr lang="de-DE" dirty="0"/>
-              <a:t>Android 8 wird Hintergrundaktivitäten einschränken</a:t>
-            </a:r>
-          </a:p>
-          <a:p>
-            <a:r>
-              <a:rPr lang="de-DE" dirty="0" smtClean="0"/>
-              <a:t>Google </a:t>
-            </a:r>
-            <a:r>
-              <a:rPr lang="de-DE" dirty="0"/>
-              <a:t>möchte, dass Entwickler für solche Aufgaben geplante Services </a:t>
-            </a:r>
-            <a:r>
-              <a:rPr lang="de-DE" dirty="0" smtClean="0"/>
-              <a:t>verwenden</a:t>
-            </a:r>
-          </a:p>
-          <a:p>
-            <a:pPr indent="0">
-              <a:buNone/>
-            </a:pPr>
-            <a:endParaRPr lang="de-DE" dirty="0"/>
+              <a:rPr lang="de-DE" dirty="0"/>
+              <a:t>Stehen seit Android 5 zur Verfügung</a:t>
+            </a:r>
+          </a:p>
+          <a:p>
+            <a:r>
+              <a:rPr lang="de-DE" dirty="0"/>
+              <a:t>Werden verwendet, um beim Eintreten bestimmter Bedingungen Aufräumarbeiten oder Aktualisierungsläufe zu starten</a:t>
+            </a:r>
+          </a:p>
+          <a:p>
+            <a:r>
+              <a:rPr lang="de-DE" dirty="0"/>
+              <a:t>Beispiel: eine Datenbank dann optimieren, wenn der Benutzer nicht mit ihr arbeitet (das Gerät lädt und der Bildschirm ist ausgeschaltet</a:t>
+            </a:r>
+          </a:p>
+          <a:p>
+            <a:r>
+              <a:rPr lang="de-DE" dirty="0"/>
+              <a:t>Wann ein solcher Job gestartet wird, steuert das System auf Basis der von Service definierten Startbedingungen und dem Nutzerverhalten</a:t>
+            </a:r>
           </a:p>
         </p:txBody>
       </p:sp>
     </p:spTree>
     <p:extLst>
       <p:ext uri="{BB962C8B-B14F-4D97-AF65-F5344CB8AC3E}">
-        <p14:creationId xmlns:p14="http://schemas.microsoft.com/office/powerpoint/2010/main" val="1530569348"/>
+        <p14:creationId xmlns:p14="http://schemas.microsoft.com/office/powerpoint/2010/main" val="736742619"/>
       </p:ext>
     </p:extLst>
   </p:cSld>
@@ -6035,7 +6011,7 @@
           <p:cNvPr id="2" name="Titel 1">
             <a:extLst>
               <a:ext uri="{FF2B5EF4-FFF2-40B4-BE49-F238E27FC236}">
-                <a16:creationId xmlns="" xmlns:a16="http://schemas.microsoft.com/office/drawing/2014/main" id="{D62218AF-BF92-4795-841F-CAF75B11C71B}"/>
+                <a16:creationId xmlns:a16="http://schemas.microsoft.com/office/drawing/2014/main" xmlns="" id="{6F3286F1-F302-47DC-83FE-350315740503}"/>
               </a:ext>
             </a:extLst>
           </p:cNvPr>
@@ -6052,9 +6028,10 @@
           <a:lstStyle/>
           <a:p>
             <a:r>
-              <a:rPr lang="de-DE" dirty="0"/>
-              <a:t>Geplante Services</a:t>
-            </a:r>
+              <a:rPr lang="de-DE" dirty="0" err="1"/>
+              <a:t>JobSchedulerDemo</a:t>
+            </a:r>
+            <a:endParaRPr lang="de-DE" dirty="0"/>
           </a:p>
         </p:txBody>
       </p:sp>
@@ -6063,7 +6040,7 @@
           <p:cNvPr id="3" name="Inhaltsplatzhalter 2">
             <a:extLst>
               <a:ext uri="{FF2B5EF4-FFF2-40B4-BE49-F238E27FC236}">
-                <a16:creationId xmlns="" xmlns:a16="http://schemas.microsoft.com/office/drawing/2014/main" id="{46E9461E-08FE-4113-8BF1-A79B5B1D63D5}"/>
+                <a16:creationId xmlns:a16="http://schemas.microsoft.com/office/drawing/2014/main" xmlns="" id="{A98BA5C1-1DDF-44B1-80C7-9B1AAB872590}"/>
               </a:ext>
             </a:extLst>
           </p:cNvPr>
@@ -6080,34 +6057,93 @@
           <a:lstStyle/>
           <a:p>
             <a:r>
-              <a:rPr lang="de-DE" dirty="0"/>
-              <a:t>Stehen seit Android 5 zur Verfügung</a:t>
-            </a:r>
-          </a:p>
-          <a:p>
-            <a:r>
-              <a:rPr lang="de-DE" dirty="0"/>
-              <a:t>Werden verwendet, um beim Eintreten bestimmter Bedingungen Aufräumarbeiten oder Aktualisierungsläufe zu starten</a:t>
-            </a:r>
-          </a:p>
-          <a:p>
-            <a:r>
-              <a:rPr lang="de-DE" dirty="0"/>
-              <a:t>Beispiel: eine Datenbank dann optimieren, wenn der Benutzer nicht mit ihr arbeitet (das Gerät lädt und der Bildschirm ist ausgeschaltet</a:t>
-            </a:r>
-          </a:p>
-          <a:p>
-            <a:r>
-              <a:rPr lang="de-DE" dirty="0"/>
-              <a:t>Wann ein solcher Job gestartet wird, steuert das System auf Basis der von Service definierten Startbedingungen und dem Nutzerverhalten</a:t>
-            </a:r>
+              <a:rPr lang="de-DE" dirty="0" smtClean="0"/>
+              <a:t>Eigene Klasse von </a:t>
+            </a:r>
+            <a:r>
+              <a:rPr lang="de-DE" dirty="0" err="1" smtClean="0">
+                <a:latin typeface="Courier New" charset="0"/>
+                <a:ea typeface="Courier New" charset="0"/>
+                <a:cs typeface="Courier New" charset="0"/>
+              </a:rPr>
+              <a:t>Android.App.Job.JobService</a:t>
+            </a:r>
+            <a:r>
+              <a:rPr lang="de-DE" dirty="0" smtClean="0"/>
+              <a:t> ableiten</a:t>
+            </a:r>
+          </a:p>
+          <a:p>
+            <a:r>
+              <a:rPr lang="de-DE" dirty="0" smtClean="0"/>
+              <a:t>Methoden </a:t>
+            </a:r>
+            <a:r>
+              <a:rPr lang="de-DE" dirty="0" err="1" smtClean="0">
+                <a:latin typeface="Courier New" charset="0"/>
+                <a:ea typeface="Courier New" charset="0"/>
+                <a:cs typeface="Courier New" charset="0"/>
+              </a:rPr>
+              <a:t>OnStartJob</a:t>
+            </a:r>
+            <a:r>
+              <a:rPr lang="de-DE" dirty="0" smtClean="0">
+                <a:latin typeface="Courier New" charset="0"/>
+                <a:ea typeface="Courier New" charset="0"/>
+                <a:cs typeface="Courier New" charset="0"/>
+              </a:rPr>
+              <a:t>()</a:t>
+            </a:r>
+            <a:r>
+              <a:rPr lang="de-DE" dirty="0" smtClean="0"/>
+              <a:t> und </a:t>
+            </a:r>
+            <a:r>
+              <a:rPr lang="de-DE" dirty="0" err="1" smtClean="0">
+                <a:latin typeface="Courier New" charset="0"/>
+                <a:ea typeface="Courier New" charset="0"/>
+                <a:cs typeface="Courier New" charset="0"/>
+              </a:rPr>
+              <a:t>OnEndJob</a:t>
+            </a:r>
+            <a:r>
+              <a:rPr lang="de-DE" dirty="0" smtClean="0">
+                <a:latin typeface="Courier New" charset="0"/>
+                <a:ea typeface="Courier New" charset="0"/>
+                <a:cs typeface="Courier New" charset="0"/>
+              </a:rPr>
+              <a:t>()</a:t>
+            </a:r>
+            <a:r>
+              <a:rPr lang="de-DE" dirty="0" smtClean="0"/>
+              <a:t> implementieren</a:t>
+            </a:r>
+          </a:p>
+          <a:p>
+            <a:r>
+              <a:rPr lang="de-DE" dirty="0" smtClean="0"/>
+              <a:t>Ausführungsszenarien mit </a:t>
+            </a:r>
+            <a:r>
+              <a:rPr lang="de-DE" dirty="0" err="1" smtClean="0">
+                <a:latin typeface="Courier New" charset="0"/>
+                <a:ea typeface="Courier New" charset="0"/>
+                <a:cs typeface="Courier New" charset="0"/>
+              </a:rPr>
+              <a:t>Android.App.Job.JobScheduler.Builder</a:t>
+            </a:r>
+            <a:r>
+              <a:rPr lang="de-DE" dirty="0" smtClean="0"/>
+              <a:t> definieren</a:t>
+            </a:r>
+            <a:endParaRPr lang="de-DE" dirty="0"/>
           </a:p>
         </p:txBody>
       </p:sp>
     </p:spTree>
     <p:extLst>
       <p:ext uri="{BB962C8B-B14F-4D97-AF65-F5344CB8AC3E}">
-        <p14:creationId xmlns:p14="http://schemas.microsoft.com/office/powerpoint/2010/main" val="736742619"/>
+        <p14:creationId xmlns:p14="http://schemas.microsoft.com/office/powerpoint/2010/main" val="3748230632"/>
       </p:ext>
     </p:extLst>
   </p:cSld>
@@ -6146,7 +6182,7 @@
           <p:cNvPr id="2" name="Titel 1">
             <a:extLst>
               <a:ext uri="{FF2B5EF4-FFF2-40B4-BE49-F238E27FC236}">
-                <a16:creationId xmlns="" xmlns:a16="http://schemas.microsoft.com/office/drawing/2014/main" id="{6F3286F1-F302-47DC-83FE-350315740503}"/>
+                <a16:creationId xmlns:a16="http://schemas.microsoft.com/office/drawing/2014/main" xmlns="" id="{21999C01-40E3-482F-B019-502750C3F912}"/>
               </a:ext>
             </a:extLst>
           </p:cNvPr>
@@ -6163,10 +6199,9 @@
           <a:lstStyle/>
           <a:p>
             <a:r>
-              <a:rPr lang="de-DE" dirty="0" err="1"/>
-              <a:t>JobSchedulerDemo</a:t>
-            </a:r>
-            <a:endParaRPr lang="de-DE" dirty="0"/>
+              <a:rPr lang="de-DE" dirty="0"/>
+              <a:t>Unterstützung bei der Entwicklung</a:t>
+            </a:r>
           </a:p>
         </p:txBody>
       </p:sp>
@@ -6175,177 +6210,7 @@
           <p:cNvPr id="3" name="Inhaltsplatzhalter 2">
             <a:extLst>
               <a:ext uri="{FF2B5EF4-FFF2-40B4-BE49-F238E27FC236}">
-                <a16:creationId xmlns="" xmlns:a16="http://schemas.microsoft.com/office/drawing/2014/main" id="{A98BA5C1-1DDF-44B1-80C7-9B1AAB872590}"/>
-              </a:ext>
-            </a:extLst>
-          </p:cNvPr>
-          <p:cNvSpPr>
-            <a:spLocks noGrp="1"/>
-          </p:cNvSpPr>
-          <p:nvPr>
-            <p:ph sz="quarter" idx="13"/>
-          </p:nvPr>
-        </p:nvSpPr>
-        <p:spPr/>
-        <p:txBody>
-          <a:bodyPr/>
-          <a:lstStyle/>
-          <a:p>
-            <a:r>
-              <a:rPr lang="de-DE" dirty="0" smtClean="0"/>
-              <a:t>Eigene Klasse von </a:t>
-            </a:r>
-            <a:r>
-              <a:rPr lang="de-DE" dirty="0" err="1" smtClean="0">
-                <a:latin typeface="Courier New" charset="0"/>
-                <a:ea typeface="Courier New" charset="0"/>
-                <a:cs typeface="Courier New" charset="0"/>
-              </a:rPr>
-              <a:t>Android.App.Job.JobService</a:t>
-            </a:r>
-            <a:r>
-              <a:rPr lang="de-DE" dirty="0" smtClean="0"/>
-              <a:t> ableiten</a:t>
-            </a:r>
-          </a:p>
-          <a:p>
-            <a:r>
-              <a:rPr lang="de-DE" dirty="0" smtClean="0"/>
-              <a:t>Methoden </a:t>
-            </a:r>
-            <a:r>
-              <a:rPr lang="de-DE" dirty="0" err="1" smtClean="0">
-                <a:latin typeface="Courier New" charset="0"/>
-                <a:ea typeface="Courier New" charset="0"/>
-                <a:cs typeface="Courier New" charset="0"/>
-              </a:rPr>
-              <a:t>OnStartJob</a:t>
-            </a:r>
-            <a:r>
-              <a:rPr lang="de-DE" dirty="0" smtClean="0">
-                <a:latin typeface="Courier New" charset="0"/>
-                <a:ea typeface="Courier New" charset="0"/>
-                <a:cs typeface="Courier New" charset="0"/>
-              </a:rPr>
-              <a:t>()</a:t>
-            </a:r>
-            <a:r>
-              <a:rPr lang="de-DE" dirty="0" smtClean="0"/>
-              <a:t> und </a:t>
-            </a:r>
-            <a:r>
-              <a:rPr lang="de-DE" dirty="0" err="1" smtClean="0">
-                <a:latin typeface="Courier New" charset="0"/>
-                <a:ea typeface="Courier New" charset="0"/>
-                <a:cs typeface="Courier New" charset="0"/>
-              </a:rPr>
-              <a:t>OnEndJob</a:t>
-            </a:r>
-            <a:r>
-              <a:rPr lang="de-DE" dirty="0" smtClean="0">
-                <a:latin typeface="Courier New" charset="0"/>
-                <a:ea typeface="Courier New" charset="0"/>
-                <a:cs typeface="Courier New" charset="0"/>
-              </a:rPr>
-              <a:t>()</a:t>
-            </a:r>
-            <a:r>
-              <a:rPr lang="de-DE" dirty="0" smtClean="0"/>
-              <a:t> implementieren</a:t>
-            </a:r>
-          </a:p>
-          <a:p>
-            <a:r>
-              <a:rPr lang="de-DE" dirty="0" smtClean="0"/>
-              <a:t>Ausführungsszenarien mit </a:t>
-            </a:r>
-            <a:r>
-              <a:rPr lang="de-DE" dirty="0" err="1" smtClean="0">
-                <a:latin typeface="Courier New" charset="0"/>
-                <a:ea typeface="Courier New" charset="0"/>
-                <a:cs typeface="Courier New" charset="0"/>
-              </a:rPr>
-              <a:t>Android.App.Job.JobScheduler.Builder</a:t>
-            </a:r>
-            <a:r>
-              <a:rPr lang="de-DE" dirty="0" smtClean="0"/>
-              <a:t> definieren</a:t>
-            </a:r>
-            <a:endParaRPr lang="de-DE" dirty="0"/>
-          </a:p>
-        </p:txBody>
-      </p:sp>
-    </p:spTree>
-    <p:extLst>
-      <p:ext uri="{BB962C8B-B14F-4D97-AF65-F5344CB8AC3E}">
-        <p14:creationId xmlns:p14="http://schemas.microsoft.com/office/powerpoint/2010/main" val="3748230632"/>
-      </p:ext>
-    </p:extLst>
-  </p:cSld>
-  <p:clrMapOvr>
-    <a:masterClrMapping/>
-  </p:clrMapOvr>
-  <p:timing>
-    <p:tnLst>
-      <p:par>
-        <p:cTn id="1" dur="indefinite" restart="never" nodeType="tmRoot"/>
-      </p:par>
-    </p:tnLst>
-  </p:timing>
-</p:sld>
-</file>
-
-<file path=ppt/slides/slide24.xml><?xml version="1.0" encoding="utf-8"?>
-<p:sld xmlns:a="http://schemas.openxmlformats.org/drawingml/2006/main" xmlns:r="http://schemas.openxmlformats.org/officeDocument/2006/relationships" xmlns:p="http://schemas.openxmlformats.org/presentationml/2006/main">
-  <p:cSld>
-    <p:spTree>
-      <p:nvGrpSpPr>
-        <p:cNvPr id="1" name=""/>
-        <p:cNvGrpSpPr/>
-        <p:nvPr/>
-      </p:nvGrpSpPr>
-      <p:grpSpPr>
-        <a:xfrm>
-          <a:off x="0" y="0"/>
-          <a:ext cx="0" cy="0"/>
-          <a:chOff x="0" y="0"/>
-          <a:chExt cx="0" cy="0"/>
-        </a:xfrm>
-      </p:grpSpPr>
-      <p:sp>
-        <p:nvSpPr>
-          <p:cNvPr id="2" name="Titel 1">
-            <a:extLst>
-              <a:ext uri="{FF2B5EF4-FFF2-40B4-BE49-F238E27FC236}">
-                <a16:creationId xmlns="" xmlns:a16="http://schemas.microsoft.com/office/drawing/2014/main" id="{21999C01-40E3-482F-B019-502750C3F912}"/>
-              </a:ext>
-            </a:extLst>
-          </p:cNvPr>
-          <p:cNvSpPr>
-            <a:spLocks noGrp="1"/>
-          </p:cNvSpPr>
-          <p:nvPr>
-            <p:ph type="title"/>
-          </p:nvPr>
-        </p:nvSpPr>
-        <p:spPr/>
-        <p:txBody>
-          <a:bodyPr/>
-          <a:lstStyle/>
-          <a:p>
-            <a:r>
-              <a:rPr lang="de-DE" dirty="0"/>
-              <a:t>Unterstützung bei der Entwicklung</a:t>
-            </a:r>
-          </a:p>
-        </p:txBody>
-      </p:sp>
-      <p:sp>
-        <p:nvSpPr>
-          <p:cNvPr id="3" name="Inhaltsplatzhalter 2">
-            <a:extLst>
-              <a:ext uri="{FF2B5EF4-FFF2-40B4-BE49-F238E27FC236}">
-                <a16:creationId xmlns="" xmlns:a16="http://schemas.microsoft.com/office/drawing/2014/main" id="{834992AE-C693-47B1-A9FC-6D24FD10201C}"/>
+                <a16:creationId xmlns:a16="http://schemas.microsoft.com/office/drawing/2014/main" xmlns="" id="{834992AE-C693-47B1-A9FC-6D24FD10201C}"/>
               </a:ext>
             </a:extLst>
           </p:cNvPr>
@@ -6489,7 +6354,7 @@
           <p:cNvPr id="4" name="Inhaltsplatzhalter 3">
             <a:extLst>
               <a:ext uri="{FF2B5EF4-FFF2-40B4-BE49-F238E27FC236}">
-                <a16:creationId xmlns="" xmlns:a16="http://schemas.microsoft.com/office/drawing/2014/main" id="{F051807D-6FDC-4614-924E-B56B113907F5}"/>
+                <a16:creationId xmlns:a16="http://schemas.microsoft.com/office/drawing/2014/main" xmlns="" id="{F051807D-6FDC-4614-924E-B56B113907F5}"/>
               </a:ext>
             </a:extLst>
           </p:cNvPr>
@@ -6540,7 +6405,7 @@
 </p:sld>
 </file>
 
-<file path=ppt/slides/slide25.xml><?xml version="1.0" encoding="utf-8"?>
+<file path=ppt/slides/slide24.xml><?xml version="1.0" encoding="utf-8"?>
 <p:sld xmlns:a="http://schemas.openxmlformats.org/drawingml/2006/main" xmlns:r="http://schemas.openxmlformats.org/officeDocument/2006/relationships" xmlns:p="http://schemas.openxmlformats.org/presentationml/2006/main">
   <p:cSld>
     <p:spTree>
@@ -6663,6 +6528,10 @@
           <a:bodyPr/>
           <a:lstStyle/>
           <a:p>
+            <a:r>
+              <a:rPr lang="de-DE" dirty="0" smtClean="0"/>
+              <a:t>Agenda</a:t>
+            </a:r>
             <a:endParaRPr lang="de-DE" dirty="0"/>
           </a:p>
         </p:txBody>
@@ -6682,45 +6551,49 @@
           <a:bodyPr/>
           <a:lstStyle/>
           <a:p>
-            <a:endParaRPr lang="de-DE" dirty="0" smtClean="0"/>
-          </a:p>
-          <a:p>
             <a:r>
               <a:rPr lang="de-DE" dirty="0" smtClean="0"/>
-              <a:t>Dank </a:t>
-            </a:r>
-            <a:r>
-              <a:rPr lang="de-DE" dirty="0" err="1" smtClean="0"/>
-              <a:t>Xamarin</a:t>
+              <a:t>Aufwärmrunde: Internationalisierung</a:t>
+            </a:r>
+          </a:p>
+          <a:p>
+            <a:r>
+              <a:rPr lang="de-DE" dirty="0"/>
+              <a:t>Layouts </a:t>
             </a:r>
             <a:r>
               <a:rPr lang="de-DE" dirty="0" smtClean="0"/>
-              <a:t> steht Android auch C#-Entwicklern offen</a:t>
+              <a:t>optimieren</a:t>
             </a:r>
           </a:p>
           <a:p>
             <a:r>
               <a:rPr lang="de-DE" dirty="0" smtClean="0"/>
-              <a:t>In diesem Talk steht die Plattform im Vordergrund, nicht </a:t>
-            </a:r>
-            <a:r>
-              <a:rPr lang="de-DE" dirty="0" err="1" smtClean="0"/>
-              <a:t>Interop</a:t>
-            </a:r>
+              <a:t>Nebenläufigkeit</a:t>
+            </a:r>
+          </a:p>
+          <a:p>
             <a:r>
               <a:rPr lang="de-DE" dirty="0" smtClean="0"/>
-              <a:t>-Themen</a:t>
-            </a:r>
-          </a:p>
-          <a:p>
-            <a:endParaRPr lang="de-DE" dirty="0"/>
+              <a:t>Services</a:t>
+            </a:r>
+          </a:p>
+          <a:p>
+            <a:r>
+              <a:rPr lang="de-DE" dirty="0" smtClean="0"/>
+              <a:t>Hintergrundverarbeitung </a:t>
+            </a:r>
+            <a:r>
+              <a:rPr lang="de-DE" dirty="0"/>
+              <a:t>8.0</a:t>
+            </a:r>
           </a:p>
         </p:txBody>
       </p:sp>
     </p:spTree>
     <p:extLst>
       <p:ext uri="{BB962C8B-B14F-4D97-AF65-F5344CB8AC3E}">
-        <p14:creationId xmlns:p14="http://schemas.microsoft.com/office/powerpoint/2010/main" val="621627437"/>
+        <p14:creationId xmlns:p14="http://schemas.microsoft.com/office/powerpoint/2010/main" val="926385533"/>
       </p:ext>
     </p:extLst>
   </p:cSld>
@@ -6769,120 +6642,6 @@
           <a:bodyPr/>
           <a:lstStyle/>
           <a:p>
-            <a:r>
-              <a:rPr lang="de-DE" dirty="0" smtClean="0"/>
-              <a:t>Agenda</a:t>
-            </a:r>
-            <a:endParaRPr lang="de-DE" dirty="0"/>
-          </a:p>
-        </p:txBody>
-      </p:sp>
-      <p:sp>
-        <p:nvSpPr>
-          <p:cNvPr id="3" name="Inhaltsplatzhalter 2"/>
-          <p:cNvSpPr>
-            <a:spLocks noGrp="1"/>
-          </p:cNvSpPr>
-          <p:nvPr>
-            <p:ph sz="quarter" idx="13"/>
-          </p:nvPr>
-        </p:nvSpPr>
-        <p:spPr/>
-        <p:txBody>
-          <a:bodyPr/>
-          <a:lstStyle/>
-          <a:p>
-            <a:r>
-              <a:rPr lang="de-DE" dirty="0" smtClean="0"/>
-              <a:t>Aufwärmrunde: Internationalisierung</a:t>
-            </a:r>
-          </a:p>
-          <a:p>
-            <a:r>
-              <a:rPr lang="de-DE" dirty="0"/>
-              <a:t>Layouts </a:t>
-            </a:r>
-            <a:r>
-              <a:rPr lang="de-DE" dirty="0" smtClean="0"/>
-              <a:t>optimieren</a:t>
-            </a:r>
-          </a:p>
-          <a:p>
-            <a:r>
-              <a:rPr lang="de-DE" dirty="0" smtClean="0"/>
-              <a:t>Nebenläufigkeit</a:t>
-            </a:r>
-          </a:p>
-          <a:p>
-            <a:r>
-              <a:rPr lang="de-DE" dirty="0" smtClean="0"/>
-              <a:t>Services</a:t>
-            </a:r>
-          </a:p>
-          <a:p>
-            <a:r>
-              <a:rPr lang="de-DE" dirty="0" smtClean="0"/>
-              <a:t>Hintergrundverarbeitung </a:t>
-            </a:r>
-            <a:r>
-              <a:rPr lang="de-DE" dirty="0"/>
-              <a:t>8.0</a:t>
-            </a:r>
-          </a:p>
-        </p:txBody>
-      </p:sp>
-    </p:spTree>
-    <p:extLst>
-      <p:ext uri="{BB962C8B-B14F-4D97-AF65-F5344CB8AC3E}">
-        <p14:creationId xmlns:p14="http://schemas.microsoft.com/office/powerpoint/2010/main" val="926385533"/>
-      </p:ext>
-    </p:extLst>
-  </p:cSld>
-  <p:clrMapOvr>
-    <a:masterClrMapping/>
-  </p:clrMapOvr>
-  <p:timing>
-    <p:tnLst>
-      <p:par>
-        <p:cTn id="1" dur="indefinite" restart="never" nodeType="tmRoot"/>
-      </p:par>
-    </p:tnLst>
-  </p:timing>
-</p:sld>
-</file>
-
-<file path=ppt/slides/slide5.xml><?xml version="1.0" encoding="utf-8"?>
-<p:sld xmlns:a="http://schemas.openxmlformats.org/drawingml/2006/main" xmlns:r="http://schemas.openxmlformats.org/officeDocument/2006/relationships" xmlns:p="http://schemas.openxmlformats.org/presentationml/2006/main">
-  <p:cSld>
-    <p:spTree>
-      <p:nvGrpSpPr>
-        <p:cNvPr id="1" name=""/>
-        <p:cNvGrpSpPr/>
-        <p:nvPr/>
-      </p:nvGrpSpPr>
-      <p:grpSpPr>
-        <a:xfrm>
-          <a:off x="0" y="0"/>
-          <a:ext cx="0" cy="0"/>
-          <a:chOff x="0" y="0"/>
-          <a:chExt cx="0" cy="0"/>
-        </a:xfrm>
-      </p:grpSpPr>
-      <p:sp>
-        <p:nvSpPr>
-          <p:cNvPr id="2" name="Titel 1"/>
-          <p:cNvSpPr>
-            <a:spLocks noGrp="1"/>
-          </p:cNvSpPr>
-          <p:nvPr>
-            <p:ph type="title"/>
-          </p:nvPr>
-        </p:nvSpPr>
-        <p:spPr/>
-        <p:txBody>
-          <a:bodyPr/>
-          <a:lstStyle/>
-          <a:p>
             <a:endParaRPr lang="de-DE"/>
           </a:p>
         </p:txBody>
@@ -6932,10 +6691,6 @@
             <a:r>
               <a:rPr lang="de-DE" sz="2000" dirty="0"/>
               <a:t>/</a:t>
-            </a:r>
-            <a:r>
-              <a:rPr lang="de-DE" sz="2000" dirty="0"/>
-              <a:t/>
             </a:r>
             <a:br>
               <a:rPr lang="de-DE" sz="2000" dirty="0"/>
@@ -6981,7 +6736,7 @@
           <p:cNvPr id="1026" name="Picture 2" descr="Cover Android 7">
             <a:extLst>
               <a:ext uri="{FF2B5EF4-FFF2-40B4-BE49-F238E27FC236}">
-                <a16:creationId xmlns="" xmlns:a16="http://schemas.microsoft.com/office/drawing/2014/main" id="{B0B9BA2A-78ED-42DC-9F24-F83578B2F513}"/>
+                <a16:creationId xmlns:a16="http://schemas.microsoft.com/office/drawing/2014/main" xmlns="" id="{B0B9BA2A-78ED-42DC-9F24-F83578B2F513}"/>
               </a:ext>
             </a:extLst>
           </p:cNvPr>
@@ -7043,7 +6798,7 @@
 </p:sld>
 </file>
 
-<file path=ppt/slides/slide6.xml><?xml version="1.0" encoding="utf-8"?>
+<file path=ppt/slides/slide5.xml><?xml version="1.0" encoding="utf-8"?>
 <p:sld xmlns:a="http://schemas.openxmlformats.org/drawingml/2006/main" xmlns:r="http://schemas.openxmlformats.org/officeDocument/2006/relationships" xmlns:p="http://schemas.openxmlformats.org/presentationml/2006/main">
   <p:cSld>
     <p:spTree>
@@ -7065,7 +6820,7 @@
           <p:cNvPr id="2" name="Titel 1">
             <a:extLst>
               <a:ext uri="{FF2B5EF4-FFF2-40B4-BE49-F238E27FC236}">
-                <a16:creationId xmlns="" xmlns:a16="http://schemas.microsoft.com/office/drawing/2014/main" id="{AF57D7D0-637A-4912-846B-D3D86AC1380E}"/>
+                <a16:creationId xmlns:a16="http://schemas.microsoft.com/office/drawing/2014/main" xmlns="" id="{AF57D7D0-637A-4912-846B-D3D86AC1380E}"/>
               </a:ext>
             </a:extLst>
           </p:cNvPr>
@@ -7093,7 +6848,7 @@
           <p:cNvPr id="9" name="Inhaltsplatzhalter 8">
             <a:extLst>
               <a:ext uri="{FF2B5EF4-FFF2-40B4-BE49-F238E27FC236}">
-                <a16:creationId xmlns="" xmlns:a16="http://schemas.microsoft.com/office/drawing/2014/main" id="{931A37AF-10E3-41AF-B6AF-4EA696B16E5C}"/>
+                <a16:creationId xmlns:a16="http://schemas.microsoft.com/office/drawing/2014/main" xmlns="" id="{931A37AF-10E3-41AF-B6AF-4EA696B16E5C}"/>
               </a:ext>
             </a:extLst>
           </p:cNvPr>
@@ -7146,6 +6901,149 @@
 </p:sld>
 </file>
 
+<file path=ppt/slides/slide6.xml><?xml version="1.0" encoding="utf-8"?>
+<p:sld xmlns:a="http://schemas.openxmlformats.org/drawingml/2006/main" xmlns:r="http://schemas.openxmlformats.org/officeDocument/2006/relationships" xmlns:p="http://schemas.openxmlformats.org/presentationml/2006/main">
+  <p:cSld>
+    <p:spTree>
+      <p:nvGrpSpPr>
+        <p:cNvPr id="1" name=""/>
+        <p:cNvGrpSpPr/>
+        <p:nvPr/>
+      </p:nvGrpSpPr>
+      <p:grpSpPr>
+        <a:xfrm>
+          <a:off x="0" y="0"/>
+          <a:ext cx="0" cy="0"/>
+          <a:chOff x="0" y="0"/>
+          <a:chExt cx="0" cy="0"/>
+        </a:xfrm>
+      </p:grpSpPr>
+      <p:sp>
+        <p:nvSpPr>
+          <p:cNvPr id="2" name="Titel 1"/>
+          <p:cNvSpPr>
+            <a:spLocks noGrp="1"/>
+          </p:cNvSpPr>
+          <p:nvPr>
+            <p:ph type="title"/>
+          </p:nvPr>
+        </p:nvSpPr>
+        <p:spPr/>
+        <p:txBody>
+          <a:bodyPr/>
+          <a:lstStyle/>
+          <a:p>
+            <a:r>
+              <a:rPr lang="de-DE" dirty="0" smtClean="0"/>
+              <a:t>Basics: Auf </a:t>
+            </a:r>
+            <a:r>
+              <a:rPr lang="de-DE" dirty="0"/>
+              <a:t>Mehrsprachigkeit achten</a:t>
+            </a:r>
+          </a:p>
+        </p:txBody>
+      </p:sp>
+      <p:sp>
+        <p:nvSpPr>
+          <p:cNvPr id="3" name="Inhaltsplatzhalter 2"/>
+          <p:cNvSpPr>
+            <a:spLocks noGrp="1"/>
+          </p:cNvSpPr>
+          <p:nvPr>
+            <p:ph sz="quarter" idx="13"/>
+          </p:nvPr>
+        </p:nvSpPr>
+        <p:spPr/>
+        <p:txBody>
+          <a:bodyPr/>
+          <a:lstStyle/>
+          <a:p>
+            <a:r>
+              <a:rPr lang="de-DE" dirty="0"/>
+              <a:t>Strings werden in </a:t>
+            </a:r>
+            <a:r>
+              <a:rPr lang="de-DE" b="1" dirty="0"/>
+              <a:t>Resources/</a:t>
+            </a:r>
+            <a:r>
+              <a:rPr lang="de-DE" b="1" dirty="0" err="1"/>
+              <a:t>values</a:t>
+            </a:r>
+            <a:r>
+              <a:rPr lang="de-DE" b="1" dirty="0"/>
+              <a:t>/Strings.xml</a:t>
+            </a:r>
+            <a:r>
+              <a:rPr lang="de-DE" dirty="0"/>
+              <a:t> abgelegt</a:t>
+            </a:r>
+          </a:p>
+          <a:p>
+            <a:r>
+              <a:rPr lang="de-DE" dirty="0"/>
+              <a:t>Internationalisierung durch zusätzliche Verzeichnisse </a:t>
+            </a:r>
+            <a:r>
+              <a:rPr lang="de-DE" b="1" dirty="0" err="1"/>
+              <a:t>values</a:t>
+            </a:r>
+            <a:r>
+              <a:rPr lang="de-DE" b="1" dirty="0"/>
+              <a:t>-&lt;ISO-Ländercode&gt;</a:t>
+            </a:r>
+          </a:p>
+          <a:p>
+            <a:r>
+              <a:rPr lang="de-DE" dirty="0"/>
+              <a:t>Kann im Emulator mit der App </a:t>
+            </a:r>
+            <a:r>
+              <a:rPr lang="de-DE" b="1" dirty="0"/>
+              <a:t>Custom </a:t>
+            </a:r>
+            <a:r>
+              <a:rPr lang="de-DE" b="1" dirty="0" err="1"/>
+              <a:t>Locales</a:t>
+            </a:r>
+            <a:r>
+              <a:rPr lang="de-DE" dirty="0"/>
+              <a:t> getestet werden</a:t>
+            </a:r>
+          </a:p>
+          <a:p>
+            <a:r>
+              <a:rPr lang="de-DE" dirty="0" smtClean="0"/>
+              <a:t>Tipp: funktioniert </a:t>
+            </a:r>
+            <a:r>
+              <a:rPr lang="de-DE" dirty="0"/>
+              <a:t>auch mit Grafiken</a:t>
+            </a:r>
+          </a:p>
+        </p:txBody>
+      </p:sp>
+    </p:spTree>
+    <p:extLst>
+      <p:ext uri="{BB962C8B-B14F-4D97-AF65-F5344CB8AC3E}">
+        <p14:creationId xmlns:p14="http://schemas.microsoft.com/office/powerpoint/2010/main" val="839986925"/>
+      </p:ext>
+    </p:extLst>
+  </p:cSld>
+  <p:clrMapOvr>
+    <a:masterClrMapping/>
+  </p:clrMapOvr>
+  <p:timing>
+    <p:tnLst>
+      <p:par>
+        <p:cTn id="1" dur="indefinite" restart="never" nodeType="tmRoot"/>
+      </p:par>
+    </p:tnLst>
+  </p:timing>
+</p:sld>
+</file>
+
 <file path=ppt/slides/slide7.xml><?xml version="1.0" encoding="utf-8"?>
 <p:sld xmlns:a="http://schemas.openxmlformats.org/drawingml/2006/main" xmlns:r="http://schemas.openxmlformats.org/officeDocument/2006/relationships" xmlns:p="http://schemas.openxmlformats.org/presentationml/2006/main">
   <p:cSld>
@@ -7165,7 +7063,13 @@
       </p:grpSpPr>
       <p:sp>
         <p:nvSpPr>
-          <p:cNvPr id="2" name="Titel 1"/>
+          <p:cNvPr id="2" name="Titel 1">
+            <a:extLst>
+              <a:ext uri="{FF2B5EF4-FFF2-40B4-BE49-F238E27FC236}">
+                <a16:creationId xmlns:a16="http://schemas.microsoft.com/office/drawing/2014/main" xmlns="" id="{B6D54FA7-29D8-4FA7-93DB-9C8AE8022113}"/>
+              </a:ext>
+            </a:extLst>
+          </p:cNvPr>
           <p:cNvSpPr>
             <a:spLocks noGrp="1"/>
           </p:cNvSpPr>
@@ -7179,19 +7083,21 @@
           <a:lstStyle/>
           <a:p>
             <a:r>
-              <a:rPr lang="de-DE" dirty="0" smtClean="0"/>
-              <a:t>Basics: Auf </a:t>
-            </a:r>
-            <a:r>
-              <a:rPr lang="de-DE" dirty="0"/>
-              <a:t>Mehrsprachigkeit achten</a:t>
-            </a:r>
-          </a:p>
-        </p:txBody>
-      </p:sp>
-      <p:sp>
-        <p:nvSpPr>
-          <p:cNvPr id="3" name="Inhaltsplatzhalter 2"/>
+              <a:rPr lang="de-DE" dirty="0"/>
+              <a:t>Grafiken optimieren</a:t>
+            </a:r>
+          </a:p>
+        </p:txBody>
+      </p:sp>
+      <p:sp>
+        <p:nvSpPr>
+          <p:cNvPr id="3" name="Inhaltsplatzhalter 2">
+            <a:extLst>
+              <a:ext uri="{FF2B5EF4-FFF2-40B4-BE49-F238E27FC236}">
+                <a16:creationId xmlns:a16="http://schemas.microsoft.com/office/drawing/2014/main" xmlns="" id="{33903689-D7D3-47E1-BA5F-54C302EB9F26}"/>
+              </a:ext>
+            </a:extLst>
+          </p:cNvPr>
           <p:cNvSpPr>
             <a:spLocks noGrp="1"/>
           </p:cNvSpPr>
@@ -7206,73 +7112,97 @@
           <a:p>
             <a:r>
               <a:rPr lang="de-DE" dirty="0"/>
-              <a:t>Strings werden in </a:t>
-            </a:r>
-            <a:r>
-              <a:rPr lang="de-DE" b="1" dirty="0"/>
-              <a:t>Resources/</a:t>
+              <a:t>Bitmaps in verschiedenen Auflösungen bereitstellen (</a:t>
+            </a:r>
+            <a:r>
+              <a:rPr lang="de-DE" dirty="0">
+                <a:hlinkClick r:id="rId2"/>
+              </a:rPr>
+              <a:t>https://romannurik.github.io/AndroidAssetStudio/</a:t>
+            </a:r>
+            <a:r>
+              <a:rPr lang="de-DE" dirty="0"/>
+              <a:t>)</a:t>
+            </a:r>
+          </a:p>
+          <a:p>
+            <a:r>
+              <a:rPr lang="de-DE" dirty="0"/>
+              <a:t>Launcher-Icons in </a:t>
             </a:r>
             <a:r>
               <a:rPr lang="de-DE" b="1" dirty="0" err="1"/>
-              <a:t>values</a:t>
-            </a:r>
-            <a:r>
-              <a:rPr lang="de-DE" b="1" dirty="0"/>
-              <a:t>/Strings.xml</a:t>
-            </a:r>
-            <a:r>
-              <a:rPr lang="de-DE" dirty="0"/>
-              <a:t> abgelegt</a:t>
-            </a:r>
-          </a:p>
-          <a:p>
-            <a:r>
-              <a:rPr lang="de-DE" dirty="0"/>
-              <a:t>Internationalisierung durch zusätzliche Verzeichnisse </a:t>
+              <a:t>mipmap</a:t>
+            </a:r>
+            <a:r>
+              <a:rPr lang="de-DE" dirty="0"/>
+              <a:t>-Verzeichnisse, alle anderen nach </a:t>
             </a:r>
             <a:r>
               <a:rPr lang="de-DE" b="1" dirty="0" err="1"/>
-              <a:t>values</a:t>
-            </a:r>
-            <a:r>
-              <a:rPr lang="de-DE" b="1" dirty="0"/>
-              <a:t>-&lt;ISO-Ländercode&gt;</a:t>
-            </a:r>
-          </a:p>
-          <a:p>
-            <a:r>
-              <a:rPr lang="de-DE" dirty="0"/>
-              <a:t>Kann im Emulator mit der App </a:t>
-            </a:r>
-            <a:r>
-              <a:rPr lang="de-DE" b="1" dirty="0"/>
-              <a:t>Custom </a:t>
-            </a:r>
-            <a:r>
-              <a:rPr lang="de-DE" b="1" dirty="0" err="1"/>
-              <a:t>Locales</a:t>
-            </a:r>
-            <a:r>
-              <a:rPr lang="de-DE" dirty="0"/>
-              <a:t> getestet werden</a:t>
-            </a:r>
-          </a:p>
-          <a:p>
-            <a:r>
-              <a:rPr lang="de-DE" dirty="0" smtClean="0"/>
-              <a:t>Tipp: funktioniert </a:t>
-            </a:r>
-            <a:r>
-              <a:rPr lang="de-DE" dirty="0"/>
-              <a:t>auch mit Grafiken</a:t>
-            </a:r>
+              <a:t>drawable</a:t>
+            </a:r>
+            <a:endParaRPr lang="de-DE" b="1" dirty="0"/>
+          </a:p>
+          <a:p>
+            <a:r>
+              <a:rPr lang="de-DE" dirty="0"/>
+              <a:t>Ggf. </a:t>
+            </a:r>
+            <a:r>
+              <a:rPr lang="de-DE" dirty="0" err="1"/>
+              <a:t>Vector</a:t>
+            </a:r>
+            <a:r>
+              <a:rPr lang="de-DE" dirty="0"/>
+              <a:t> </a:t>
+            </a:r>
+            <a:r>
+              <a:rPr lang="de-DE" dirty="0" err="1"/>
+              <a:t>Drawables</a:t>
+            </a:r>
+            <a:r>
+              <a:rPr lang="de-DE" dirty="0"/>
+              <a:t> verwenden</a:t>
+            </a:r>
+          </a:p>
+          <a:p>
+            <a:pPr lvl="1"/>
+            <a:r>
+              <a:rPr lang="de-DE" dirty="0"/>
+              <a:t>nativ ab Android 5.0 oder mit Support Library: </a:t>
+            </a:r>
+            <a:r>
+              <a:rPr lang="de-DE" dirty="0">
+                <a:hlinkClick r:id="rId3"/>
+              </a:rPr>
+              <a:t>https://components.xamarin.com/gettingstarted/xamandroidsupportvectordrawable?version=23.2.1</a:t>
+            </a:r>
+            <a:endParaRPr lang="de-DE" dirty="0"/>
+          </a:p>
+          <a:p>
+            <a:pPr lvl="1"/>
+            <a:r>
+              <a:rPr lang="de-DE" dirty="0"/>
+              <a:t>Konvertierungstools: z. B. Android Studio oder </a:t>
+            </a:r>
+            <a:r>
+              <a:rPr lang="de-DE" dirty="0">
+                <a:hlinkClick r:id="rId4"/>
+              </a:rPr>
+              <a:t>https://github.com/a-student/SvgToVectorDrawableConverter</a:t>
+            </a:r>
+            <a:endParaRPr lang="de-DE" dirty="0"/>
+          </a:p>
+          <a:p>
+            <a:endParaRPr lang="de-DE" dirty="0"/>
           </a:p>
         </p:txBody>
       </p:sp>
     </p:spTree>
     <p:extLst>
       <p:ext uri="{BB962C8B-B14F-4D97-AF65-F5344CB8AC3E}">
-        <p14:creationId xmlns:p14="http://schemas.microsoft.com/office/powerpoint/2010/main" val="839986925"/>
+        <p14:creationId xmlns:p14="http://schemas.microsoft.com/office/powerpoint/2010/main" val="2902312155"/>
       </p:ext>
     </p:extLst>
   </p:cSld>
@@ -7308,146 +7238,79 @@
       </p:grpSpPr>
       <p:sp>
         <p:nvSpPr>
-          <p:cNvPr id="2" name="Titel 1">
+          <p:cNvPr id="2" name="Titel 1"/>
+          <p:cNvSpPr>
+            <a:spLocks noGrp="1"/>
+          </p:cNvSpPr>
+          <p:nvPr>
+            <p:ph type="title"/>
+          </p:nvPr>
+        </p:nvSpPr>
+        <p:spPr/>
+        <p:txBody>
+          <a:bodyPr/>
+          <a:lstStyle/>
+          <a:p>
+            <a:r>
+              <a:rPr lang="de-DE" dirty="0" smtClean="0"/>
+              <a:t>Es gibt nicht nur </a:t>
+            </a:r>
+            <a:r>
+              <a:rPr lang="de-DE" dirty="0" err="1" smtClean="0"/>
+              <a:t>LinearLayout</a:t>
+            </a:r>
+            <a:r>
+              <a:rPr lang="de-DE" dirty="0" smtClean="0"/>
+              <a:t> (</a:t>
+            </a:r>
+            <a:r>
+              <a:rPr lang="de-DE" dirty="0" err="1" smtClean="0"/>
+              <a:t>LayoutDemo</a:t>
+            </a:r>
+            <a:r>
+              <a:rPr lang="de-DE" dirty="0" smtClean="0"/>
+              <a:t>)</a:t>
+            </a:r>
+            <a:endParaRPr lang="de-DE" dirty="0"/>
+          </a:p>
+        </p:txBody>
+      </p:sp>
+      <p:pic>
+        <p:nvPicPr>
+          <p:cNvPr id="4" name="Inhaltsplatzhalter 3"/>
+          <p:cNvPicPr>
+            <a:picLocks noGrp="1" noChangeAspect="1"/>
+          </p:cNvPicPr>
+          <p:nvPr>
+            <p:ph sz="quarter" idx="13"/>
+          </p:nvPr>
+        </p:nvPicPr>
+        <p:blipFill>
+          <a:blip r:embed="rId2" cstate="screen">
             <a:extLst>
-              <a:ext uri="{FF2B5EF4-FFF2-40B4-BE49-F238E27FC236}">
-                <a16:creationId xmlns="" xmlns:a16="http://schemas.microsoft.com/office/drawing/2014/main" id="{B6D54FA7-29D8-4FA7-93DB-9C8AE8022113}"/>
+              <a:ext uri="{28A0092B-C50C-407E-A947-70E740481C1C}">
+                <a14:useLocalDpi xmlns:a14="http://schemas.microsoft.com/office/drawing/2010/main"/>
               </a:ext>
             </a:extLst>
-          </p:cNvPr>
-          <p:cNvSpPr>
-            <a:spLocks noGrp="1"/>
-          </p:cNvSpPr>
-          <p:nvPr>
-            <p:ph type="title"/>
-          </p:nvPr>
-        </p:nvSpPr>
-        <p:spPr/>
-        <p:txBody>
-          <a:bodyPr/>
-          <a:lstStyle/>
-          <a:p>
-            <a:r>
-              <a:rPr lang="de-DE" dirty="0"/>
-              <a:t>Grafiken optimieren</a:t>
-            </a:r>
-          </a:p>
-        </p:txBody>
-      </p:sp>
-      <p:sp>
-        <p:nvSpPr>
-          <p:cNvPr id="3" name="Inhaltsplatzhalter 2">
-            <a:extLst>
-              <a:ext uri="{FF2B5EF4-FFF2-40B4-BE49-F238E27FC236}">
-                <a16:creationId xmlns="" xmlns:a16="http://schemas.microsoft.com/office/drawing/2014/main" id="{33903689-D7D3-47E1-BA5F-54C302EB9F26}"/>
-              </a:ext>
-            </a:extLst>
-          </p:cNvPr>
-          <p:cNvSpPr>
-            <a:spLocks noGrp="1"/>
-          </p:cNvSpPr>
-          <p:nvPr>
-            <p:ph sz="quarter" idx="13"/>
-          </p:nvPr>
-        </p:nvSpPr>
-        <p:spPr/>
-        <p:txBody>
-          <a:bodyPr/>
-          <a:lstStyle/>
-          <a:p>
-            <a:r>
-              <a:rPr lang="de-DE" dirty="0"/>
-              <a:t>Bitmaps in verschiedenen Auflösungen bereitstellen (</a:t>
-            </a:r>
-            <a:r>
-              <a:rPr lang="de-DE" dirty="0">
-                <a:hlinkClick r:id="rId2"/>
-              </a:rPr>
-              <a:t>https://romannurik.github.io/AndroidAssetStudio/</a:t>
-            </a:r>
-            <a:r>
-              <a:rPr lang="de-DE" dirty="0"/>
-              <a:t>)</a:t>
-            </a:r>
-          </a:p>
-          <a:p>
-            <a:r>
-              <a:rPr lang="de-DE" dirty="0"/>
-              <a:t>Launcher-Icons in </a:t>
-            </a:r>
-            <a:r>
-              <a:rPr lang="de-DE" b="1" dirty="0" err="1"/>
-              <a:t>mipmap</a:t>
-            </a:r>
-            <a:r>
-              <a:rPr lang="de-DE" dirty="0"/>
-              <a:t>-Verzeichnisse, alle anderen nach </a:t>
-            </a:r>
-            <a:r>
-              <a:rPr lang="de-DE" b="1" dirty="0" err="1"/>
-              <a:t>drawable</a:t>
-            </a:r>
-            <a:endParaRPr lang="de-DE" b="1" dirty="0"/>
-          </a:p>
-          <a:p>
-            <a:r>
-              <a:rPr lang="de-DE" dirty="0"/>
-              <a:t>Ggf. </a:t>
-            </a:r>
-            <a:r>
-              <a:rPr lang="de-DE" dirty="0" err="1"/>
-              <a:t>Vector</a:t>
-            </a:r>
-            <a:r>
-              <a:rPr lang="de-DE" dirty="0"/>
-              <a:t> </a:t>
-            </a:r>
-            <a:r>
-              <a:rPr lang="de-DE" dirty="0" err="1"/>
-              <a:t>Drawables</a:t>
-            </a:r>
-            <a:r>
-              <a:rPr lang="de-DE" dirty="0"/>
-              <a:t> verwenden</a:t>
-            </a:r>
-          </a:p>
-          <a:p>
-            <a:pPr lvl="1"/>
-            <a:r>
-              <a:rPr lang="de-DE" dirty="0"/>
-              <a:t>nativ ab Android 5.0 oder mit Support Library: </a:t>
-            </a:r>
-            <a:r>
-              <a:rPr lang="de-DE" dirty="0">
-                <a:hlinkClick r:id="rId3"/>
-              </a:rPr>
-              <a:t>https://components.xamarin.com/gettingstarted/xamandroidsupportvectordrawable?version=23.2.1</a:t>
-            </a:r>
-            <a:endParaRPr lang="de-DE" dirty="0"/>
-          </a:p>
-          <a:p>
-            <a:pPr lvl="1"/>
-            <a:r>
-              <a:rPr lang="de-DE" dirty="0"/>
-              <a:t>Konvertierungstools: z. B. Android Studio oder </a:t>
-            </a:r>
-            <a:r>
-              <a:rPr lang="de-DE" dirty="0">
-                <a:hlinkClick r:id="rId4"/>
-              </a:rPr>
-              <a:t>https://github.com/a-student/SvgToVectorDrawableConverter</a:t>
-            </a:r>
-            <a:endParaRPr lang="de-DE" dirty="0"/>
-          </a:p>
-          <a:p>
-            <a:endParaRPr lang="de-DE" dirty="0"/>
-          </a:p>
-        </p:txBody>
-      </p:sp>
+          </a:blip>
+          <a:stretch>
+            <a:fillRect/>
+          </a:stretch>
+        </p:blipFill>
+        <p:spPr>
+          <a:xfrm>
+            <a:off x="3141519" y="1589977"/>
+            <a:ext cx="2860962" cy="4564062"/>
+          </a:xfrm>
+          <a:prstGeom prst="rect">
+            <a:avLst/>
+          </a:prstGeom>
+        </p:spPr>
+      </p:pic>
     </p:spTree>
     <p:extLst>
       <p:ext uri="{BB962C8B-B14F-4D97-AF65-F5344CB8AC3E}">
-        <p14:creationId xmlns:p14="http://schemas.microsoft.com/office/powerpoint/2010/main" val="2902312155"/>
+        <p14:creationId xmlns:p14="http://schemas.microsoft.com/office/powerpoint/2010/main" val="1975098736"/>
       </p:ext>
     </p:extLst>
   </p:cSld>
@@ -7483,7 +7346,13 @@
       </p:grpSpPr>
       <p:sp>
         <p:nvSpPr>
-          <p:cNvPr id="2" name="Titel 1"/>
+          <p:cNvPr id="2" name="Titel 1">
+            <a:extLst>
+              <a:ext uri="{FF2B5EF4-FFF2-40B4-BE49-F238E27FC236}">
+                <a16:creationId xmlns:a16="http://schemas.microsoft.com/office/drawing/2014/main" xmlns="" id="{2B5FF3A6-3600-411C-8FC0-2A69441AFEF5}"/>
+              </a:ext>
+            </a:extLst>
+          </p:cNvPr>
           <p:cNvSpPr>
             <a:spLocks noGrp="1"/>
           </p:cNvSpPr>
@@ -7497,38 +7366,19 @@
           <a:lstStyle/>
           <a:p>
             <a:r>
-              <a:rPr lang="de-DE" dirty="0" smtClean="0"/>
-              <a:t>Es gibt nicht nur </a:t>
-            </a:r>
-            <a:r>
-              <a:rPr lang="de-DE" dirty="0" err="1" smtClean="0"/>
-              <a:t>LinearLayout</a:t>
-            </a:r>
-            <a:r>
-              <a:rPr lang="de-DE" dirty="0" smtClean="0"/>
-              <a:t> (</a:t>
-            </a:r>
-            <a:r>
-              <a:rPr lang="de-DE" dirty="0" err="1" smtClean="0"/>
-              <a:t>LayoutDemo</a:t>
-            </a:r>
-            <a:r>
-              <a:rPr lang="de-DE" dirty="0" smtClean="0"/>
-              <a:t>)</a:t>
-            </a:r>
-            <a:endParaRPr lang="de-DE" dirty="0"/>
+              <a:rPr lang="de-DE" dirty="0"/>
+              <a:t>Träge reagierende UI vermeiden</a:t>
+            </a:r>
           </a:p>
         </p:txBody>
       </p:sp>
       <p:pic>
         <p:nvPicPr>
-          <p:cNvPr id="4" name="Inhaltsplatzhalter 3"/>
+          <p:cNvPr id="7" name="Bild 6"/>
           <p:cNvPicPr>
-            <a:picLocks noGrp="1" noChangeAspect="1"/>
+            <a:picLocks noChangeAspect="1"/>
           </p:cNvPicPr>
-          <p:nvPr>
-            <p:ph sz="quarter" idx="13"/>
-          </p:nvPr>
+          <p:nvPr/>
         </p:nvPicPr>
         <p:blipFill>
           <a:blip r:embed="rId2" cstate="screen">
@@ -7544,8 +7394,8 @@
         </p:blipFill>
         <p:spPr>
           <a:xfrm>
-            <a:off x="3141519" y="1589977"/>
-            <a:ext cx="2860962" cy="4564062"/>
+            <a:off x="3141287" y="1589977"/>
+            <a:ext cx="2861425" cy="4564800"/>
           </a:xfrm>
           <a:prstGeom prst="rect">
             <a:avLst/>
@@ -7555,7 +7405,7 @@
     </p:spTree>
     <p:extLst>
       <p:ext uri="{BB962C8B-B14F-4D97-AF65-F5344CB8AC3E}">
-        <p14:creationId xmlns:p14="http://schemas.microsoft.com/office/powerpoint/2010/main" val="1975098736"/>
+        <p14:creationId xmlns:p14="http://schemas.microsoft.com/office/powerpoint/2010/main" val="1423969898"/>
       </p:ext>
     </p:extLst>
   </p:cSld>

</xml_diff>